<commit_message>
adding the project folder to delivery
</commit_message>
<xml_diff>
--- a/starter/DevOpsPipeline.pptx
+++ b/starter/DevOpsPipeline.pptx
@@ -1,19 +1,19 @@
 
 <file path=ppt/presentation.xml><?xml version="1.0" encoding="utf-8"?>
-<p:presentation xmlns:a="http://schemas.openxmlformats.org/drawingml/2006/main" xmlns:r="http://schemas.openxmlformats.org/officeDocument/2006/relationships" xmlns:mc="http://schemas.openxmlformats.org/markup-compatibility/2006" xmlns:mv="urn:schemas-microsoft-com:mac:vml" xmlns:p="http://schemas.openxmlformats.org/presentationml/2006/main" xmlns:c="http://schemas.openxmlformats.org/drawingml/2006/chart" xmlns:dgm="http://schemas.openxmlformats.org/drawingml/2006/diagram" xmlns:o="urn:schemas-microsoft-com:office:office" xmlns:v="urn:schemas-microsoft-com:vml" xmlns:pvml="urn:schemas-microsoft-com:office:powerpoint" xmlns:com="http://schemas.openxmlformats.org/drawingml/2006/compatibility" xmlns:p14="http://schemas.microsoft.com/office/powerpoint/2010/main" xmlns:p15="http://schemas.microsoft.com/office/powerpoint/2012/main" autoCompressPictures="0" strictFirstAndLastChars="0" saveSubsetFonts="1">
+<p:presentation xmlns:a="http://schemas.openxmlformats.org/drawingml/2006/main" xmlns:r="http://schemas.openxmlformats.org/officeDocument/2006/relationships" xmlns:p="http://schemas.openxmlformats.org/presentationml/2006/main" strictFirstAndLastChars="0" saveSubsetFonts="1" autoCompressPictures="0">
   <p:sldMasterIdLst>
-    <p:sldMasterId id="2147483659" r:id="rId4"/>
+    <p:sldMasterId id="2147483659" r:id="rId1"/>
   </p:sldMasterIdLst>
   <p:notesMasterIdLst>
-    <p:notesMasterId r:id="rId5"/>
+    <p:notesMasterId r:id="rId3"/>
   </p:notesMasterIdLst>
   <p:sldIdLst>
-    <p:sldId id="256" r:id="rId6"/>
+    <p:sldId id="256" r:id="rId2"/>
   </p:sldIdLst>
-  <p:sldSz cy="5143500" cx="9144000"/>
+  <p:sldSz cx="9144000" cy="5143500" type="screen16x9"/>
   <p:notesSz cx="6858000" cy="9144000"/>
   <p:defaultTextStyle>
-    <a:defPPr lvl="0" marR="0" rtl="0" algn="l">
+    <a:defPPr marR="0" lvl="0" algn="l" rtl="0">
       <a:lnSpc>
         <a:spcPct val="100000"/>
       </a:lnSpc>
@@ -24,7 +24,7 @@
         <a:spcPts val="0"/>
       </a:spcAft>
     </a:defPPr>
-    <a:lvl1pPr lvl="0" marR="0" rtl="0" algn="l">
+    <a:lvl1pPr marR="0" lvl="0" algn="l" rtl="0">
       <a:lnSpc>
         <a:spcPct val="100000"/>
       </a:lnSpc>
@@ -38,7 +38,7 @@
         <a:srgbClr val="000000"/>
       </a:buClr>
       <a:buFont typeface="Arial"/>
-      <a:defRPr b="0" i="0" sz="1400" u="none" cap="none" strike="noStrike">
+      <a:defRPr sz="1400" b="0" i="0" u="none" strike="noStrike" cap="none">
         <a:solidFill>
           <a:srgbClr val="000000"/>
         </a:solidFill>
@@ -48,7 +48,7 @@
         <a:sym typeface="Arial"/>
       </a:defRPr>
     </a:lvl1pPr>
-    <a:lvl2pPr lvl="1" marR="0" rtl="0" algn="l">
+    <a:lvl2pPr marR="0" lvl="1" algn="l" rtl="0">
       <a:lnSpc>
         <a:spcPct val="100000"/>
       </a:lnSpc>
@@ -62,7 +62,7 @@
         <a:srgbClr val="000000"/>
       </a:buClr>
       <a:buFont typeface="Arial"/>
-      <a:defRPr b="0" i="0" sz="1400" u="none" cap="none" strike="noStrike">
+      <a:defRPr sz="1400" b="0" i="0" u="none" strike="noStrike" cap="none">
         <a:solidFill>
           <a:srgbClr val="000000"/>
         </a:solidFill>
@@ -72,7 +72,7 @@
         <a:sym typeface="Arial"/>
       </a:defRPr>
     </a:lvl2pPr>
-    <a:lvl3pPr lvl="2" marR="0" rtl="0" algn="l">
+    <a:lvl3pPr marR="0" lvl="2" algn="l" rtl="0">
       <a:lnSpc>
         <a:spcPct val="100000"/>
       </a:lnSpc>
@@ -86,7 +86,7 @@
         <a:srgbClr val="000000"/>
       </a:buClr>
       <a:buFont typeface="Arial"/>
-      <a:defRPr b="0" i="0" sz="1400" u="none" cap="none" strike="noStrike">
+      <a:defRPr sz="1400" b="0" i="0" u="none" strike="noStrike" cap="none">
         <a:solidFill>
           <a:srgbClr val="000000"/>
         </a:solidFill>
@@ -96,7 +96,7 @@
         <a:sym typeface="Arial"/>
       </a:defRPr>
     </a:lvl3pPr>
-    <a:lvl4pPr lvl="3" marR="0" rtl="0" algn="l">
+    <a:lvl4pPr marR="0" lvl="3" algn="l" rtl="0">
       <a:lnSpc>
         <a:spcPct val="100000"/>
       </a:lnSpc>
@@ -110,7 +110,7 @@
         <a:srgbClr val="000000"/>
       </a:buClr>
       <a:buFont typeface="Arial"/>
-      <a:defRPr b="0" i="0" sz="1400" u="none" cap="none" strike="noStrike">
+      <a:defRPr sz="1400" b="0" i="0" u="none" strike="noStrike" cap="none">
         <a:solidFill>
           <a:srgbClr val="000000"/>
         </a:solidFill>
@@ -120,7 +120,7 @@
         <a:sym typeface="Arial"/>
       </a:defRPr>
     </a:lvl4pPr>
-    <a:lvl5pPr lvl="4" marR="0" rtl="0" algn="l">
+    <a:lvl5pPr marR="0" lvl="4" algn="l" rtl="0">
       <a:lnSpc>
         <a:spcPct val="100000"/>
       </a:lnSpc>
@@ -134,7 +134,7 @@
         <a:srgbClr val="000000"/>
       </a:buClr>
       <a:buFont typeface="Arial"/>
-      <a:defRPr b="0" i="0" sz="1400" u="none" cap="none" strike="noStrike">
+      <a:defRPr sz="1400" b="0" i="0" u="none" strike="noStrike" cap="none">
         <a:solidFill>
           <a:srgbClr val="000000"/>
         </a:solidFill>
@@ -144,7 +144,7 @@
         <a:sym typeface="Arial"/>
       </a:defRPr>
     </a:lvl5pPr>
-    <a:lvl6pPr lvl="5" marR="0" rtl="0" algn="l">
+    <a:lvl6pPr marR="0" lvl="5" algn="l" rtl="0">
       <a:lnSpc>
         <a:spcPct val="100000"/>
       </a:lnSpc>
@@ -158,7 +158,7 @@
         <a:srgbClr val="000000"/>
       </a:buClr>
       <a:buFont typeface="Arial"/>
-      <a:defRPr b="0" i="0" sz="1400" u="none" cap="none" strike="noStrike">
+      <a:defRPr sz="1400" b="0" i="0" u="none" strike="noStrike" cap="none">
         <a:solidFill>
           <a:srgbClr val="000000"/>
         </a:solidFill>
@@ -168,7 +168,7 @@
         <a:sym typeface="Arial"/>
       </a:defRPr>
     </a:lvl6pPr>
-    <a:lvl7pPr lvl="6" marR="0" rtl="0" algn="l">
+    <a:lvl7pPr marR="0" lvl="6" algn="l" rtl="0">
       <a:lnSpc>
         <a:spcPct val="100000"/>
       </a:lnSpc>
@@ -182,7 +182,7 @@
         <a:srgbClr val="000000"/>
       </a:buClr>
       <a:buFont typeface="Arial"/>
-      <a:defRPr b="0" i="0" sz="1400" u="none" cap="none" strike="noStrike">
+      <a:defRPr sz="1400" b="0" i="0" u="none" strike="noStrike" cap="none">
         <a:solidFill>
           <a:srgbClr val="000000"/>
         </a:solidFill>
@@ -192,7 +192,7 @@
         <a:sym typeface="Arial"/>
       </a:defRPr>
     </a:lvl7pPr>
-    <a:lvl8pPr lvl="7" marR="0" rtl="0" algn="l">
+    <a:lvl8pPr marR="0" lvl="7" algn="l" rtl="0">
       <a:lnSpc>
         <a:spcPct val="100000"/>
       </a:lnSpc>
@@ -206,7 +206,7 @@
         <a:srgbClr val="000000"/>
       </a:buClr>
       <a:buFont typeface="Arial"/>
-      <a:defRPr b="0" i="0" sz="1400" u="none" cap="none" strike="noStrike">
+      <a:defRPr sz="1400" b="0" i="0" u="none" strike="noStrike" cap="none">
         <a:solidFill>
           <a:srgbClr val="000000"/>
         </a:solidFill>
@@ -216,7 +216,7 @@
         <a:sym typeface="Arial"/>
       </a:defRPr>
     </a:lvl8pPr>
-    <a:lvl9pPr lvl="8" marR="0" rtl="0" algn="l">
+    <a:lvl9pPr marR="0" lvl="8" algn="l" rtl="0">
       <a:lnSpc>
         <a:spcPct val="100000"/>
       </a:lnSpc>
@@ -230,7 +230,7 @@
         <a:srgbClr val="000000"/>
       </a:buClr>
       <a:buFont typeface="Arial"/>
-      <a:defRPr b="0" i="0" sz="1400" u="none" cap="none" strike="noStrike">
+      <a:defRPr sz="1400" b="0" i="0" u="none" strike="noStrike" cap="none">
         <a:solidFill>
           <a:srgbClr val="000000"/>
         </a:solidFill>
@@ -243,7 +243,7 @@
   </p:defaultTextStyle>
   <p:extLst>
     <p:ext uri="{EFAFB233-063F-42B5-8137-9DF3F51BA10A}">
-      <p15:sldGuideLst>
+      <p15:sldGuideLst xmlns:p15="http://schemas.microsoft.com/office/powerpoint/2012/main">
         <p15:guide id="1" orient="horz" pos="1620">
           <p15:clr>
             <a:srgbClr val="A4A3A4"/>
@@ -261,11 +261,16 @@
 </file>
 
 <file path=ppt/notesMasters/notesMaster1.xml><?xml version="1.0" encoding="utf-8"?>
-<p:notesMaster xmlns:a="http://schemas.openxmlformats.org/drawingml/2006/main" xmlns:r="http://schemas.openxmlformats.org/officeDocument/2006/relationships" xmlns:mc="http://schemas.openxmlformats.org/markup-compatibility/2006" xmlns:mv="urn:schemas-microsoft-com:mac:vml" xmlns:p="http://schemas.openxmlformats.org/presentationml/2006/main" xmlns:c="http://schemas.openxmlformats.org/drawingml/2006/chart" xmlns:dgm="http://schemas.openxmlformats.org/drawingml/2006/diagram" xmlns:o="urn:schemas-microsoft-com:office:office" xmlns:v="urn:schemas-microsoft-com:vml" xmlns:pvml="urn:schemas-microsoft-com:office:powerpoint" xmlns:com="http://schemas.openxmlformats.org/drawingml/2006/compatibility" xmlns:p14="http://schemas.microsoft.com/office/powerpoint/2010/main" xmlns:p15="http://schemas.microsoft.com/office/powerpoint/2012/main">
+<p:notesMaster xmlns:a="http://schemas.openxmlformats.org/drawingml/2006/main" xmlns:r="http://schemas.openxmlformats.org/officeDocument/2006/relationships" xmlns:p="http://schemas.openxmlformats.org/presentationml/2006/main">
   <p:cSld>
+    <p:bg>
+      <p:bgRef idx="1001">
+        <a:schemeClr val="bg1"/>
+      </p:bgRef>
+    </p:bg>
     <p:spTree>
       <p:nvGrpSpPr>
-        <p:cNvPr id="2" name="Shape 2"/>
+        <p:cNvPr id="1" name="Shape 2"/>
         <p:cNvGrpSpPr/>
         <p:nvPr/>
       </p:nvGrpSpPr>
@@ -280,9 +285,11 @@
       <p:sp>
         <p:nvSpPr>
           <p:cNvPr id="3" name="Google Shape;3;n"/>
-          <p:cNvSpPr/>
+          <p:cNvSpPr>
+            <a:spLocks noGrp="1" noRot="1" noChangeAspect="1"/>
+          </p:cNvSpPr>
           <p:nvPr>
-            <p:ph idx="2" type="sldImg"/>
+            <p:ph type="sldImg" idx="2"/>
           </p:nvPr>
         </p:nvSpPr>
         <p:spPr>
@@ -291,9 +298,13 @@
             <a:ext cx="6096075" cy="3429000"/>
           </a:xfrm>
           <a:custGeom>
-            <a:rect b="b" l="l" r="r" t="t"/>
+            <a:avLst/>
+            <a:gdLst/>
+            <a:ahLst/>
+            <a:cxnLst/>
+            <a:rect l="l" t="t" r="r" b="b"/>
             <a:pathLst>
-              <a:path extrusionOk="0" h="120000" w="120000">
+              <a:path w="120000" h="120000" extrusionOk="0">
                 <a:moveTo>
                   <a:pt x="0" y="0"/>
                 </a:moveTo>
@@ -311,23 +322,25 @@
             </a:pathLst>
           </a:custGeom>
           <a:noFill/>
-          <a:ln cap="flat" cmpd="sng" w="9525">
+          <a:ln w="9525" cap="flat" cmpd="sng">
             <a:solidFill>
               <a:srgbClr val="000000"/>
             </a:solidFill>
             <a:prstDash val="solid"/>
             <a:round/>
-            <a:headEnd len="sm" w="sm" type="none"/>
-            <a:tailEnd len="sm" w="sm" type="none"/>
+            <a:headEnd type="none" w="sm" len="sm"/>
+            <a:tailEnd type="none" w="sm" len="sm"/>
           </a:ln>
         </p:spPr>
       </p:sp>
       <p:sp>
         <p:nvSpPr>
           <p:cNvPr id="4" name="Google Shape;4;n"/>
-          <p:cNvSpPr txBox="1"/>
+          <p:cNvSpPr txBox="1">
+            <a:spLocks noGrp="1"/>
+          </p:cNvSpPr>
           <p:nvPr>
-            <p:ph idx="1" type="body"/>
+            <p:ph type="body" idx="1"/>
           </p:nvPr>
         </p:nvSpPr>
         <p:spPr>
@@ -344,11 +357,11 @@
           </a:ln>
         </p:spPr>
         <p:txBody>
-          <a:bodyPr anchorCtr="0" anchor="t" bIns="91425" lIns="91425" spcFirstLastPara="1" rIns="91425" wrap="square" tIns="91425">
+          <a:bodyPr spcFirstLastPara="1" wrap="square" lIns="91425" tIns="91425" rIns="91425" bIns="91425" anchor="t" anchorCtr="0">
             <a:noAutofit/>
           </a:bodyPr>
           <a:lstStyle>
-            <a:lvl1pPr indent="-298450" lvl="0" marL="457200">
+            <a:lvl1pPr marL="457200" lvl="0" indent="-298450">
               <a:spcBef>
                 <a:spcPts val="0"/>
               </a:spcBef>
@@ -359,7 +372,7 @@
               <a:buChar char="●"/>
               <a:defRPr sz="1100"/>
             </a:lvl1pPr>
-            <a:lvl2pPr indent="-298450" lvl="1" marL="914400">
+            <a:lvl2pPr marL="914400" lvl="1" indent="-298450">
               <a:spcBef>
                 <a:spcPts val="0"/>
               </a:spcBef>
@@ -370,7 +383,7 @@
               <a:buChar char="○"/>
               <a:defRPr sz="1100"/>
             </a:lvl2pPr>
-            <a:lvl3pPr indent="-298450" lvl="2" marL="1371600">
+            <a:lvl3pPr marL="1371600" lvl="2" indent="-298450">
               <a:spcBef>
                 <a:spcPts val="0"/>
               </a:spcBef>
@@ -381,7 +394,7 @@
               <a:buChar char="■"/>
               <a:defRPr sz="1100"/>
             </a:lvl3pPr>
-            <a:lvl4pPr indent="-298450" lvl="3" marL="1828800">
+            <a:lvl4pPr marL="1828800" lvl="3" indent="-298450">
               <a:spcBef>
                 <a:spcPts val="0"/>
               </a:spcBef>
@@ -392,7 +405,7 @@
               <a:buChar char="●"/>
               <a:defRPr sz="1100"/>
             </a:lvl4pPr>
-            <a:lvl5pPr indent="-298450" lvl="4" marL="2286000">
+            <a:lvl5pPr marL="2286000" lvl="4" indent="-298450">
               <a:spcBef>
                 <a:spcPts val="0"/>
               </a:spcBef>
@@ -403,7 +416,7 @@
               <a:buChar char="○"/>
               <a:defRPr sz="1100"/>
             </a:lvl5pPr>
-            <a:lvl6pPr indent="-298450" lvl="5" marL="2743200">
+            <a:lvl6pPr marL="2743200" lvl="5" indent="-298450">
               <a:spcBef>
                 <a:spcPts val="0"/>
               </a:spcBef>
@@ -414,7 +427,7 @@
               <a:buChar char="■"/>
               <a:defRPr sz="1100"/>
             </a:lvl6pPr>
-            <a:lvl7pPr indent="-298450" lvl="6" marL="3200400">
+            <a:lvl7pPr marL="3200400" lvl="6" indent="-298450">
               <a:spcBef>
                 <a:spcPts val="0"/>
               </a:spcBef>
@@ -425,7 +438,7 @@
               <a:buChar char="●"/>
               <a:defRPr sz="1100"/>
             </a:lvl7pPr>
-            <a:lvl8pPr indent="-298450" lvl="7" marL="3657600">
+            <a:lvl8pPr marL="3657600" lvl="7" indent="-298450">
               <a:spcBef>
                 <a:spcPts val="0"/>
               </a:spcBef>
@@ -436,7 +449,7 @@
               <a:buChar char="○"/>
               <a:defRPr sz="1100"/>
             </a:lvl8pPr>
-            <a:lvl9pPr indent="-298450" lvl="8" marL="4114800">
+            <a:lvl9pPr marL="4114800" lvl="8" indent="-298450">
               <a:spcBef>
                 <a:spcPts val="0"/>
               </a:spcBef>
@@ -448,14 +461,16 @@
               <a:defRPr sz="1100"/>
             </a:lvl9pPr>
           </a:lstStyle>
-          <a:p/>
+          <a:p>
+            <a:endParaRPr/>
+          </a:p>
         </p:txBody>
       </p:sp>
     </p:spTree>
   </p:cSld>
-  <p:clrMap accent1="accent1" accent2="accent2" accent3="accent3" accent4="accent4" accent5="accent5" accent6="accent6" bg1="lt1" bg2="dk2" tx1="dk1" tx2="lt2" folHlink="folHlink" hlink="hlink"/>
+  <p:clrMap bg1="lt1" tx1="dk1" bg2="dk2" tx2="lt2" accent1="accent1" accent2="accent2" accent3="accent3" accent4="accent4" accent5="accent5" accent6="accent6" hlink="hlink" folHlink="folHlink"/>
   <p:notesStyle>
-    <a:defPPr lvl="0" marR="0" rtl="0" algn="l">
+    <a:defPPr marR="0" lvl="0" algn="l" rtl="0">
       <a:lnSpc>
         <a:spcPct val="100000"/>
       </a:lnSpc>
@@ -466,7 +481,7 @@
         <a:spcPts val="0"/>
       </a:spcAft>
     </a:defPPr>
-    <a:lvl1pPr lvl="0" marR="0" rtl="0" algn="l">
+    <a:lvl1pPr marR="0" lvl="0" algn="l" rtl="0">
       <a:lnSpc>
         <a:spcPct val="100000"/>
       </a:lnSpc>
@@ -480,7 +495,7 @@
         <a:srgbClr val="000000"/>
       </a:buClr>
       <a:buFont typeface="Arial"/>
-      <a:defRPr b="0" i="0" sz="1400" u="none" cap="none" strike="noStrike">
+      <a:defRPr sz="1400" b="0" i="0" u="none" strike="noStrike" cap="none">
         <a:solidFill>
           <a:srgbClr val="000000"/>
         </a:solidFill>
@@ -490,7 +505,7 @@
         <a:sym typeface="Arial"/>
       </a:defRPr>
     </a:lvl1pPr>
-    <a:lvl2pPr lvl="1" marR="0" rtl="0" algn="l">
+    <a:lvl2pPr marR="0" lvl="1" algn="l" rtl="0">
       <a:lnSpc>
         <a:spcPct val="100000"/>
       </a:lnSpc>
@@ -504,7 +519,7 @@
         <a:srgbClr val="000000"/>
       </a:buClr>
       <a:buFont typeface="Arial"/>
-      <a:defRPr b="0" i="0" sz="1400" u="none" cap="none" strike="noStrike">
+      <a:defRPr sz="1400" b="0" i="0" u="none" strike="noStrike" cap="none">
         <a:solidFill>
           <a:srgbClr val="000000"/>
         </a:solidFill>
@@ -514,7 +529,7 @@
         <a:sym typeface="Arial"/>
       </a:defRPr>
     </a:lvl2pPr>
-    <a:lvl3pPr lvl="2" marR="0" rtl="0" algn="l">
+    <a:lvl3pPr marR="0" lvl="2" algn="l" rtl="0">
       <a:lnSpc>
         <a:spcPct val="100000"/>
       </a:lnSpc>
@@ -528,7 +543,7 @@
         <a:srgbClr val="000000"/>
       </a:buClr>
       <a:buFont typeface="Arial"/>
-      <a:defRPr b="0" i="0" sz="1400" u="none" cap="none" strike="noStrike">
+      <a:defRPr sz="1400" b="0" i="0" u="none" strike="noStrike" cap="none">
         <a:solidFill>
           <a:srgbClr val="000000"/>
         </a:solidFill>
@@ -538,7 +553,7 @@
         <a:sym typeface="Arial"/>
       </a:defRPr>
     </a:lvl3pPr>
-    <a:lvl4pPr lvl="3" marR="0" rtl="0" algn="l">
+    <a:lvl4pPr marR="0" lvl="3" algn="l" rtl="0">
       <a:lnSpc>
         <a:spcPct val="100000"/>
       </a:lnSpc>
@@ -552,7 +567,7 @@
         <a:srgbClr val="000000"/>
       </a:buClr>
       <a:buFont typeface="Arial"/>
-      <a:defRPr b="0" i="0" sz="1400" u="none" cap="none" strike="noStrike">
+      <a:defRPr sz="1400" b="0" i="0" u="none" strike="noStrike" cap="none">
         <a:solidFill>
           <a:srgbClr val="000000"/>
         </a:solidFill>
@@ -562,7 +577,7 @@
         <a:sym typeface="Arial"/>
       </a:defRPr>
     </a:lvl4pPr>
-    <a:lvl5pPr lvl="4" marR="0" rtl="0" algn="l">
+    <a:lvl5pPr marR="0" lvl="4" algn="l" rtl="0">
       <a:lnSpc>
         <a:spcPct val="100000"/>
       </a:lnSpc>
@@ -576,7 +591,7 @@
         <a:srgbClr val="000000"/>
       </a:buClr>
       <a:buFont typeface="Arial"/>
-      <a:defRPr b="0" i="0" sz="1400" u="none" cap="none" strike="noStrike">
+      <a:defRPr sz="1400" b="0" i="0" u="none" strike="noStrike" cap="none">
         <a:solidFill>
           <a:srgbClr val="000000"/>
         </a:solidFill>
@@ -586,7 +601,7 @@
         <a:sym typeface="Arial"/>
       </a:defRPr>
     </a:lvl5pPr>
-    <a:lvl6pPr lvl="5" marR="0" rtl="0" algn="l">
+    <a:lvl6pPr marR="0" lvl="5" algn="l" rtl="0">
       <a:lnSpc>
         <a:spcPct val="100000"/>
       </a:lnSpc>
@@ -600,7 +615,7 @@
         <a:srgbClr val="000000"/>
       </a:buClr>
       <a:buFont typeface="Arial"/>
-      <a:defRPr b="0" i="0" sz="1400" u="none" cap="none" strike="noStrike">
+      <a:defRPr sz="1400" b="0" i="0" u="none" strike="noStrike" cap="none">
         <a:solidFill>
           <a:srgbClr val="000000"/>
         </a:solidFill>
@@ -610,7 +625,7 @@
         <a:sym typeface="Arial"/>
       </a:defRPr>
     </a:lvl6pPr>
-    <a:lvl7pPr lvl="6" marR="0" rtl="0" algn="l">
+    <a:lvl7pPr marR="0" lvl="6" algn="l" rtl="0">
       <a:lnSpc>
         <a:spcPct val="100000"/>
       </a:lnSpc>
@@ -624,7 +639,7 @@
         <a:srgbClr val="000000"/>
       </a:buClr>
       <a:buFont typeface="Arial"/>
-      <a:defRPr b="0" i="0" sz="1400" u="none" cap="none" strike="noStrike">
+      <a:defRPr sz="1400" b="0" i="0" u="none" strike="noStrike" cap="none">
         <a:solidFill>
           <a:srgbClr val="000000"/>
         </a:solidFill>
@@ -634,7 +649,7 @@
         <a:sym typeface="Arial"/>
       </a:defRPr>
     </a:lvl7pPr>
-    <a:lvl8pPr lvl="7" marR="0" rtl="0" algn="l">
+    <a:lvl8pPr marR="0" lvl="7" algn="l" rtl="0">
       <a:lnSpc>
         <a:spcPct val="100000"/>
       </a:lnSpc>
@@ -648,7 +663,7 @@
         <a:srgbClr val="000000"/>
       </a:buClr>
       <a:buFont typeface="Arial"/>
-      <a:defRPr b="0" i="0" sz="1400" u="none" cap="none" strike="noStrike">
+      <a:defRPr sz="1400" b="0" i="0" u="none" strike="noStrike" cap="none">
         <a:solidFill>
           <a:srgbClr val="000000"/>
         </a:solidFill>
@@ -658,7 +673,7 @@
         <a:sym typeface="Arial"/>
       </a:defRPr>
     </a:lvl8pPr>
-    <a:lvl9pPr lvl="8" marR="0" rtl="0" algn="l">
+    <a:lvl9pPr marR="0" lvl="8" algn="l" rtl="0">
       <a:lnSpc>
         <a:spcPct val="100000"/>
       </a:lnSpc>
@@ -672,7 +687,7 @@
         <a:srgbClr val="000000"/>
       </a:buClr>
       <a:buFont typeface="Arial"/>
-      <a:defRPr b="0" i="0" sz="1400" u="none" cap="none" strike="noStrike">
+      <a:defRPr sz="1400" b="0" i="0" u="none" strike="noStrike" cap="none">
         <a:solidFill>
           <a:srgbClr val="000000"/>
         </a:solidFill>
@@ -687,11 +702,11 @@
 </file>
 
 <file path=ppt/notesSlides/notesSlide1.xml><?xml version="1.0" encoding="utf-8"?>
-<p:notes xmlns:a="http://schemas.openxmlformats.org/drawingml/2006/main" xmlns:r="http://schemas.openxmlformats.org/officeDocument/2006/relationships" xmlns:mc="http://schemas.openxmlformats.org/markup-compatibility/2006" xmlns:mv="urn:schemas-microsoft-com:mac:vml" xmlns:p="http://schemas.openxmlformats.org/presentationml/2006/main" xmlns:c="http://schemas.openxmlformats.org/drawingml/2006/chart" xmlns:dgm="http://schemas.openxmlformats.org/drawingml/2006/diagram" xmlns:o="urn:schemas-microsoft-com:office:office" xmlns:v="urn:schemas-microsoft-com:vml" xmlns:pvml="urn:schemas-microsoft-com:office:powerpoint" xmlns:com="http://schemas.openxmlformats.org/drawingml/2006/compatibility" xmlns:p14="http://schemas.microsoft.com/office/powerpoint/2010/main" xmlns:p15="http://schemas.microsoft.com/office/powerpoint/2012/main" showMasterPhAnim="0" showMasterSp="0">
+<p:notes xmlns:a="http://schemas.openxmlformats.org/drawingml/2006/main" xmlns:r="http://schemas.openxmlformats.org/officeDocument/2006/relationships" xmlns:p="http://schemas.openxmlformats.org/presentationml/2006/main" showMasterSp="0" showMasterPhAnim="0">
   <p:cSld>
     <p:spTree>
       <p:nvGrpSpPr>
-        <p:cNvPr id="50" name="Shape 50"/>
+        <p:cNvPr id="1" name="Shape 50"/>
         <p:cNvGrpSpPr/>
         <p:nvPr/>
       </p:nvGrpSpPr>
@@ -706,20 +721,26 @@
       <p:sp>
         <p:nvSpPr>
           <p:cNvPr id="51" name="Google Shape;51;p:notes"/>
-          <p:cNvSpPr/>
+          <p:cNvSpPr>
+            <a:spLocks noGrp="1" noRot="1" noChangeAspect="1"/>
+          </p:cNvSpPr>
           <p:nvPr>
-            <p:ph idx="2" type="sldImg"/>
+            <p:ph type="sldImg" idx="2"/>
           </p:nvPr>
         </p:nvSpPr>
         <p:spPr>
           <a:xfrm>
-            <a:off x="381300" y="685800"/>
-            <a:ext cx="6096075" cy="3429000"/>
+            <a:off x="381000" y="685800"/>
+            <a:ext cx="6096000" cy="3429000"/>
           </a:xfrm>
           <a:custGeom>
-            <a:rect b="b" l="l" r="r" t="t"/>
+            <a:avLst/>
+            <a:gdLst/>
+            <a:ahLst/>
+            <a:cxnLst/>
+            <a:rect l="l" t="t" r="r" b="b"/>
             <a:pathLst>
-              <a:path extrusionOk="0" h="120000" w="120000">
+              <a:path w="120000" h="120000" extrusionOk="0">
                 <a:moveTo>
                   <a:pt x="0" y="0"/>
                 </a:moveTo>
@@ -741,9 +762,11 @@
       <p:sp>
         <p:nvSpPr>
           <p:cNvPr id="52" name="Google Shape;52;p:notes"/>
-          <p:cNvSpPr txBox="1"/>
+          <p:cNvSpPr txBox="1">
+            <a:spLocks noGrp="1"/>
+          </p:cNvSpPr>
           <p:nvPr>
-            <p:ph idx="1" type="body"/>
+            <p:ph type="body" idx="1"/>
           </p:nvPr>
         </p:nvSpPr>
         <p:spPr>
@@ -756,12 +779,12 @@
           </a:prstGeom>
         </p:spPr>
         <p:txBody>
-          <a:bodyPr anchorCtr="0" anchor="t" bIns="91425" lIns="91425" spcFirstLastPara="1" rIns="91425" wrap="square" tIns="91425">
+          <a:bodyPr spcFirstLastPara="1" wrap="square" lIns="91425" tIns="91425" rIns="91425" bIns="91425" anchor="t" anchorCtr="0">
             <a:noAutofit/>
           </a:bodyPr>
           <a:lstStyle/>
           <a:p>
-            <a:pPr indent="0" lvl="0" marL="0" rtl="0" algn="l">
+            <a:pPr marL="0" lvl="0" indent="0" algn="l" rtl="0">
               <a:spcBef>
                 <a:spcPts val="0"/>
               </a:spcBef>
@@ -770,9 +793,6 @@
               </a:spcAft>
               <a:buNone/>
             </a:pPr>
-            <a:r>
-              <a:t/>
-            </a:r>
             <a:endParaRPr/>
           </a:p>
         </p:txBody>
@@ -786,11 +806,11 @@
 </file>
 
 <file path=ppt/slideLayouts/slideLayout1.xml><?xml version="1.0" encoding="utf-8"?>
-<p:sldLayout xmlns:a="http://schemas.openxmlformats.org/drawingml/2006/main" xmlns:r="http://schemas.openxmlformats.org/officeDocument/2006/relationships" xmlns:mc="http://schemas.openxmlformats.org/markup-compatibility/2006" xmlns:mv="urn:schemas-microsoft-com:mac:vml" xmlns:p="http://schemas.openxmlformats.org/presentationml/2006/main" xmlns:c="http://schemas.openxmlformats.org/drawingml/2006/chart" xmlns:dgm="http://schemas.openxmlformats.org/drawingml/2006/diagram" xmlns:o="urn:schemas-microsoft-com:office:office" xmlns:v="urn:schemas-microsoft-com:vml" xmlns:pvml="urn:schemas-microsoft-com:office:powerpoint" xmlns:com="http://schemas.openxmlformats.org/drawingml/2006/compatibility" xmlns:p14="http://schemas.microsoft.com/office/powerpoint/2010/main" xmlns:p15="http://schemas.microsoft.com/office/powerpoint/2012/main" matchingName="Title slide" type="title">
+<p:sldLayout xmlns:a="http://schemas.openxmlformats.org/drawingml/2006/main" xmlns:r="http://schemas.openxmlformats.org/officeDocument/2006/relationships" xmlns:p="http://schemas.openxmlformats.org/presentationml/2006/main" matchingName="Title slide" type="title">
   <p:cSld name="TITLE">
     <p:spTree>
       <p:nvGrpSpPr>
-        <p:cNvPr id="9" name="Shape 9"/>
+        <p:cNvPr id="1" name="Shape 9"/>
         <p:cNvGrpSpPr/>
         <p:nvPr/>
       </p:nvGrpSpPr>
@@ -805,7 +825,9 @@
       <p:sp>
         <p:nvSpPr>
           <p:cNvPr id="10" name="Google Shape;10;p2"/>
-          <p:cNvSpPr txBox="1"/>
+          <p:cNvSpPr txBox="1">
+            <a:spLocks noGrp="1"/>
+          </p:cNvSpPr>
           <p:nvPr>
             <p:ph type="ctrTitle"/>
           </p:nvPr>
@@ -820,7 +842,7 @@
           </a:prstGeom>
         </p:spPr>
         <p:txBody>
-          <a:bodyPr anchorCtr="0" anchor="b" bIns="91425" lIns="91425" spcFirstLastPara="1" rIns="91425" wrap="square" tIns="91425">
+          <a:bodyPr spcFirstLastPara="1" wrap="square" lIns="91425" tIns="91425" rIns="91425" bIns="91425" anchor="b" anchorCtr="0">
             <a:noAutofit/>
           </a:bodyPr>
           <a:lstStyle>
@@ -924,15 +946,19 @@
               <a:defRPr sz="5200"/>
             </a:lvl9pPr>
           </a:lstStyle>
-          <a:p/>
+          <a:p>
+            <a:endParaRPr/>
+          </a:p>
         </p:txBody>
       </p:sp>
       <p:sp>
         <p:nvSpPr>
           <p:cNvPr id="11" name="Google Shape;11;p2"/>
-          <p:cNvSpPr txBox="1"/>
+          <p:cNvSpPr txBox="1">
+            <a:spLocks noGrp="1"/>
+          </p:cNvSpPr>
           <p:nvPr>
-            <p:ph idx="1" type="subTitle"/>
+            <p:ph type="subTitle" idx="1"/>
           </p:nvPr>
         </p:nvSpPr>
         <p:spPr>
@@ -945,7 +971,7 @@
           </a:prstGeom>
         </p:spPr>
         <p:txBody>
-          <a:bodyPr anchorCtr="0" anchor="t" bIns="91425" lIns="91425" spcFirstLastPara="1" rIns="91425" wrap="square" tIns="91425">
+          <a:bodyPr spcFirstLastPara="1" wrap="square" lIns="91425" tIns="91425" rIns="91425" bIns="91425" anchor="t" anchorCtr="0">
             <a:noAutofit/>
           </a:bodyPr>
           <a:lstStyle>
@@ -1076,15 +1102,19 @@
               <a:defRPr sz="2800"/>
             </a:lvl9pPr>
           </a:lstStyle>
-          <a:p/>
+          <a:p>
+            <a:endParaRPr/>
+          </a:p>
         </p:txBody>
       </p:sp>
       <p:sp>
         <p:nvSpPr>
           <p:cNvPr id="12" name="Google Shape;12;p2"/>
-          <p:cNvSpPr txBox="1"/>
+          <p:cNvSpPr txBox="1">
+            <a:spLocks noGrp="1"/>
+          </p:cNvSpPr>
           <p:nvPr>
-            <p:ph idx="12" type="sldNum"/>
+            <p:ph type="sldNum" idx="12"/>
           </p:nvPr>
         </p:nvSpPr>
         <p:spPr>
@@ -1097,7 +1127,7 @@
           </a:prstGeom>
         </p:spPr>
         <p:txBody>
-          <a:bodyPr anchorCtr="0" anchor="ctr" bIns="91425" lIns="91425" spcFirstLastPara="1" rIns="91425" wrap="square" tIns="91425">
+          <a:bodyPr spcFirstLastPara="1" wrap="square" lIns="91425" tIns="91425" rIns="91425" bIns="91425" anchor="ctr" anchorCtr="0">
             <a:noAutofit/>
           </a:bodyPr>
           <a:lstStyle>
@@ -1139,7 +1169,7 @@
             </a:lvl9pPr>
           </a:lstStyle>
           <a:p>
-            <a:pPr indent="0" lvl="0" marL="0" rtl="0" algn="r">
+            <a:pPr marL="0" lvl="0" indent="0" algn="r" rtl="0">
               <a:spcBef>
                 <a:spcPts val="0"/>
               </a:spcBef>
@@ -1150,7 +1180,7 @@
             </a:pPr>
             <a:fld id="{00000000-1234-1234-1234-123412341234}" type="slidenum">
               <a:rPr lang="en"/>
-              <a:t>‹#›</a:t>
+              <a:t>‹nº›</a:t>
             </a:fld>
             <a:endParaRPr/>
           </a:p>
@@ -1165,11 +1195,11 @@
 </file>
 
 <file path=ppt/slideLayouts/slideLayout10.xml><?xml version="1.0" encoding="utf-8"?>
-<p:sldLayout xmlns:a="http://schemas.openxmlformats.org/drawingml/2006/main" xmlns:r="http://schemas.openxmlformats.org/officeDocument/2006/relationships" xmlns:mc="http://schemas.openxmlformats.org/markup-compatibility/2006" xmlns:mv="urn:schemas-microsoft-com:mac:vml" xmlns:p="http://schemas.openxmlformats.org/presentationml/2006/main" xmlns:c="http://schemas.openxmlformats.org/drawingml/2006/chart" xmlns:dgm="http://schemas.openxmlformats.org/drawingml/2006/diagram" xmlns:o="urn:schemas-microsoft-com:office:office" xmlns:v="urn:schemas-microsoft-com:vml" xmlns:pvml="urn:schemas-microsoft-com:office:powerpoint" xmlns:com="http://schemas.openxmlformats.org/drawingml/2006/compatibility" xmlns:p14="http://schemas.microsoft.com/office/powerpoint/2010/main" xmlns:p15="http://schemas.microsoft.com/office/powerpoint/2012/main" matchingName="Big number">
+<p:sldLayout xmlns:a="http://schemas.openxmlformats.org/drawingml/2006/main" xmlns:r="http://schemas.openxmlformats.org/officeDocument/2006/relationships" xmlns:p="http://schemas.openxmlformats.org/presentationml/2006/main" matchingName="Big number">
   <p:cSld name="BIG_NUMBER">
     <p:spTree>
       <p:nvGrpSpPr>
-        <p:cNvPr id="44" name="Shape 44"/>
+        <p:cNvPr id="1" name="Shape 44"/>
         <p:cNvGrpSpPr/>
         <p:nvPr/>
       </p:nvGrpSpPr>
@@ -1184,9 +1214,11 @@
       <p:sp>
         <p:nvSpPr>
           <p:cNvPr id="45" name="Google Shape;45;p11"/>
-          <p:cNvSpPr txBox="1"/>
+          <p:cNvSpPr txBox="1">
+            <a:spLocks noGrp="1"/>
+          </p:cNvSpPr>
           <p:nvPr>
-            <p:ph hasCustomPrompt="1" type="title"/>
+            <p:ph type="title" hasCustomPrompt="1"/>
           </p:nvPr>
         </p:nvSpPr>
         <p:spPr>
@@ -1199,7 +1231,7 @@
           </a:prstGeom>
         </p:spPr>
         <p:txBody>
-          <a:bodyPr anchorCtr="0" anchor="b" bIns="91425" lIns="91425" spcFirstLastPara="1" rIns="91425" wrap="square" tIns="91425">
+          <a:bodyPr spcFirstLastPara="1" wrap="square" lIns="91425" tIns="91425" rIns="91425" bIns="91425" anchor="b" anchorCtr="0">
             <a:noAutofit/>
           </a:bodyPr>
           <a:lstStyle>
@@ -1313,9 +1345,11 @@
       <p:sp>
         <p:nvSpPr>
           <p:cNvPr id="46" name="Google Shape;46;p11"/>
-          <p:cNvSpPr txBox="1"/>
+          <p:cNvSpPr txBox="1">
+            <a:spLocks noGrp="1"/>
+          </p:cNvSpPr>
           <p:nvPr>
-            <p:ph idx="1" type="body"/>
+            <p:ph type="body" idx="1"/>
           </p:nvPr>
         </p:nvSpPr>
         <p:spPr>
@@ -1328,11 +1362,11 @@
           </a:prstGeom>
         </p:spPr>
         <p:txBody>
-          <a:bodyPr anchorCtr="0" anchor="t" bIns="91425" lIns="91425" spcFirstLastPara="1" rIns="91425" wrap="square" tIns="91425">
+          <a:bodyPr spcFirstLastPara="1" wrap="square" lIns="91425" tIns="91425" rIns="91425" bIns="91425" anchor="t" anchorCtr="0">
             <a:noAutofit/>
           </a:bodyPr>
           <a:lstStyle>
-            <a:lvl1pPr indent="-342900" lvl="0" marL="457200" algn="ctr">
+            <a:lvl1pPr marL="457200" lvl="0" indent="-342900" algn="ctr">
               <a:spcBef>
                 <a:spcPts val="0"/>
               </a:spcBef>
@@ -1343,7 +1377,7 @@
               <a:buChar char="●"/>
               <a:defRPr/>
             </a:lvl1pPr>
-            <a:lvl2pPr indent="-317500" lvl="1" marL="914400" algn="ctr">
+            <a:lvl2pPr marL="914400" lvl="1" indent="-317500" algn="ctr">
               <a:spcBef>
                 <a:spcPts val="1600"/>
               </a:spcBef>
@@ -1354,7 +1388,7 @@
               <a:buChar char="○"/>
               <a:defRPr/>
             </a:lvl2pPr>
-            <a:lvl3pPr indent="-317500" lvl="2" marL="1371600" algn="ctr">
+            <a:lvl3pPr marL="1371600" lvl="2" indent="-317500" algn="ctr">
               <a:spcBef>
                 <a:spcPts val="1600"/>
               </a:spcBef>
@@ -1365,7 +1399,7 @@
               <a:buChar char="■"/>
               <a:defRPr/>
             </a:lvl3pPr>
-            <a:lvl4pPr indent="-317500" lvl="3" marL="1828800" algn="ctr">
+            <a:lvl4pPr marL="1828800" lvl="3" indent="-317500" algn="ctr">
               <a:spcBef>
                 <a:spcPts val="1600"/>
               </a:spcBef>
@@ -1376,7 +1410,7 @@
               <a:buChar char="●"/>
               <a:defRPr/>
             </a:lvl4pPr>
-            <a:lvl5pPr indent="-317500" lvl="4" marL="2286000" algn="ctr">
+            <a:lvl5pPr marL="2286000" lvl="4" indent="-317500" algn="ctr">
               <a:spcBef>
                 <a:spcPts val="1600"/>
               </a:spcBef>
@@ -1387,7 +1421,7 @@
               <a:buChar char="○"/>
               <a:defRPr/>
             </a:lvl5pPr>
-            <a:lvl6pPr indent="-317500" lvl="5" marL="2743200" algn="ctr">
+            <a:lvl6pPr marL="2743200" lvl="5" indent="-317500" algn="ctr">
               <a:spcBef>
                 <a:spcPts val="1600"/>
               </a:spcBef>
@@ -1398,7 +1432,7 @@
               <a:buChar char="■"/>
               <a:defRPr/>
             </a:lvl6pPr>
-            <a:lvl7pPr indent="-317500" lvl="6" marL="3200400" algn="ctr">
+            <a:lvl7pPr marL="3200400" lvl="6" indent="-317500" algn="ctr">
               <a:spcBef>
                 <a:spcPts val="1600"/>
               </a:spcBef>
@@ -1409,7 +1443,7 @@
               <a:buChar char="●"/>
               <a:defRPr/>
             </a:lvl7pPr>
-            <a:lvl8pPr indent="-317500" lvl="7" marL="3657600" algn="ctr">
+            <a:lvl8pPr marL="3657600" lvl="7" indent="-317500" algn="ctr">
               <a:spcBef>
                 <a:spcPts val="1600"/>
               </a:spcBef>
@@ -1420,7 +1454,7 @@
               <a:buChar char="○"/>
               <a:defRPr/>
             </a:lvl8pPr>
-            <a:lvl9pPr indent="-317500" lvl="8" marL="4114800" algn="ctr">
+            <a:lvl9pPr marL="4114800" lvl="8" indent="-317500" algn="ctr">
               <a:spcBef>
                 <a:spcPts val="1600"/>
               </a:spcBef>
@@ -1432,15 +1466,19 @@
               <a:defRPr/>
             </a:lvl9pPr>
           </a:lstStyle>
-          <a:p/>
+          <a:p>
+            <a:endParaRPr/>
+          </a:p>
         </p:txBody>
       </p:sp>
       <p:sp>
         <p:nvSpPr>
           <p:cNvPr id="47" name="Google Shape;47;p11"/>
-          <p:cNvSpPr txBox="1"/>
+          <p:cNvSpPr txBox="1">
+            <a:spLocks noGrp="1"/>
+          </p:cNvSpPr>
           <p:nvPr>
-            <p:ph idx="12" type="sldNum"/>
+            <p:ph type="sldNum" idx="12"/>
           </p:nvPr>
         </p:nvSpPr>
         <p:spPr>
@@ -1453,7 +1491,7 @@
           </a:prstGeom>
         </p:spPr>
         <p:txBody>
-          <a:bodyPr anchorCtr="0" anchor="ctr" bIns="91425" lIns="91425" spcFirstLastPara="1" rIns="91425" wrap="square" tIns="91425">
+          <a:bodyPr spcFirstLastPara="1" wrap="square" lIns="91425" tIns="91425" rIns="91425" bIns="91425" anchor="ctr" anchorCtr="0">
             <a:noAutofit/>
           </a:bodyPr>
           <a:lstStyle>
@@ -1495,7 +1533,7 @@
             </a:lvl9pPr>
           </a:lstStyle>
           <a:p>
-            <a:pPr indent="0" lvl="0" marL="0" rtl="0" algn="r">
+            <a:pPr marL="0" lvl="0" indent="0" algn="r" rtl="0">
               <a:spcBef>
                 <a:spcPts val="0"/>
               </a:spcBef>
@@ -1506,7 +1544,7 @@
             </a:pPr>
             <a:fld id="{00000000-1234-1234-1234-123412341234}" type="slidenum">
               <a:rPr lang="en"/>
-              <a:t>‹#›</a:t>
+              <a:t>‹nº›</a:t>
             </a:fld>
             <a:endParaRPr/>
           </a:p>
@@ -1521,11 +1559,11 @@
 </file>
 
 <file path=ppt/slideLayouts/slideLayout11.xml><?xml version="1.0" encoding="utf-8"?>
-<p:sldLayout xmlns:a="http://schemas.openxmlformats.org/drawingml/2006/main" xmlns:r="http://schemas.openxmlformats.org/officeDocument/2006/relationships" xmlns:mc="http://schemas.openxmlformats.org/markup-compatibility/2006" xmlns:mv="urn:schemas-microsoft-com:mac:vml" xmlns:p="http://schemas.openxmlformats.org/presentationml/2006/main" xmlns:c="http://schemas.openxmlformats.org/drawingml/2006/chart" xmlns:dgm="http://schemas.openxmlformats.org/drawingml/2006/diagram" xmlns:o="urn:schemas-microsoft-com:office:office" xmlns:v="urn:schemas-microsoft-com:vml" xmlns:pvml="urn:schemas-microsoft-com:office:powerpoint" xmlns:com="http://schemas.openxmlformats.org/drawingml/2006/compatibility" xmlns:p14="http://schemas.microsoft.com/office/powerpoint/2010/main" xmlns:p15="http://schemas.microsoft.com/office/powerpoint/2012/main" matchingName="Blank" type="blank">
+<p:sldLayout xmlns:a="http://schemas.openxmlformats.org/drawingml/2006/main" xmlns:r="http://schemas.openxmlformats.org/officeDocument/2006/relationships" xmlns:p="http://schemas.openxmlformats.org/presentationml/2006/main" matchingName="Blank" type="blank">
   <p:cSld name="BLANK">
     <p:spTree>
       <p:nvGrpSpPr>
-        <p:cNvPr id="48" name="Shape 48"/>
+        <p:cNvPr id="1" name="Shape 48"/>
         <p:cNvGrpSpPr/>
         <p:nvPr/>
       </p:nvGrpSpPr>
@@ -1540,9 +1578,11 @@
       <p:sp>
         <p:nvSpPr>
           <p:cNvPr id="49" name="Google Shape;49;p12"/>
-          <p:cNvSpPr txBox="1"/>
+          <p:cNvSpPr txBox="1">
+            <a:spLocks noGrp="1"/>
+          </p:cNvSpPr>
           <p:nvPr>
-            <p:ph idx="12" type="sldNum"/>
+            <p:ph type="sldNum" idx="12"/>
           </p:nvPr>
         </p:nvSpPr>
         <p:spPr>
@@ -1555,7 +1595,7 @@
           </a:prstGeom>
         </p:spPr>
         <p:txBody>
-          <a:bodyPr anchorCtr="0" anchor="ctr" bIns="91425" lIns="91425" spcFirstLastPara="1" rIns="91425" wrap="square" tIns="91425">
+          <a:bodyPr spcFirstLastPara="1" wrap="square" lIns="91425" tIns="91425" rIns="91425" bIns="91425" anchor="ctr" anchorCtr="0">
             <a:noAutofit/>
           </a:bodyPr>
           <a:lstStyle>
@@ -1597,7 +1637,7 @@
             </a:lvl9pPr>
           </a:lstStyle>
           <a:p>
-            <a:pPr indent="0" lvl="0" marL="0" rtl="0" algn="r">
+            <a:pPr marL="0" lvl="0" indent="0" algn="r" rtl="0">
               <a:spcBef>
                 <a:spcPts val="0"/>
               </a:spcBef>
@@ -1608,7 +1648,7 @@
             </a:pPr>
             <a:fld id="{00000000-1234-1234-1234-123412341234}" type="slidenum">
               <a:rPr lang="en"/>
-              <a:t>‹#›</a:t>
+              <a:t>‹nº›</a:t>
             </a:fld>
             <a:endParaRPr/>
           </a:p>
@@ -1623,11 +1663,11 @@
 </file>
 
 <file path=ppt/slideLayouts/slideLayout2.xml><?xml version="1.0" encoding="utf-8"?>
-<p:sldLayout xmlns:a="http://schemas.openxmlformats.org/drawingml/2006/main" xmlns:r="http://schemas.openxmlformats.org/officeDocument/2006/relationships" xmlns:mc="http://schemas.openxmlformats.org/markup-compatibility/2006" xmlns:mv="urn:schemas-microsoft-com:mac:vml" xmlns:p="http://schemas.openxmlformats.org/presentationml/2006/main" xmlns:c="http://schemas.openxmlformats.org/drawingml/2006/chart" xmlns:dgm="http://schemas.openxmlformats.org/drawingml/2006/diagram" xmlns:o="urn:schemas-microsoft-com:office:office" xmlns:v="urn:schemas-microsoft-com:vml" xmlns:pvml="urn:schemas-microsoft-com:office:powerpoint" xmlns:com="http://schemas.openxmlformats.org/drawingml/2006/compatibility" xmlns:p14="http://schemas.microsoft.com/office/powerpoint/2010/main" xmlns:p15="http://schemas.microsoft.com/office/powerpoint/2012/main" matchingName="Section header" type="secHead">
+<p:sldLayout xmlns:a="http://schemas.openxmlformats.org/drawingml/2006/main" xmlns:r="http://schemas.openxmlformats.org/officeDocument/2006/relationships" xmlns:p="http://schemas.openxmlformats.org/presentationml/2006/main" matchingName="Section header" type="secHead">
   <p:cSld name="SECTION_HEADER">
     <p:spTree>
       <p:nvGrpSpPr>
-        <p:cNvPr id="13" name="Shape 13"/>
+        <p:cNvPr id="1" name="Shape 13"/>
         <p:cNvGrpSpPr/>
         <p:nvPr/>
       </p:nvGrpSpPr>
@@ -1642,7 +1682,9 @@
       <p:sp>
         <p:nvSpPr>
           <p:cNvPr id="14" name="Google Shape;14;p3"/>
-          <p:cNvSpPr txBox="1"/>
+          <p:cNvSpPr txBox="1">
+            <a:spLocks noGrp="1"/>
+          </p:cNvSpPr>
           <p:nvPr>
             <p:ph type="title"/>
           </p:nvPr>
@@ -1657,7 +1699,7 @@
           </a:prstGeom>
         </p:spPr>
         <p:txBody>
-          <a:bodyPr anchorCtr="0" anchor="ctr" bIns="91425" lIns="91425" spcFirstLastPara="1" rIns="91425" wrap="square" tIns="91425">
+          <a:bodyPr spcFirstLastPara="1" wrap="square" lIns="91425" tIns="91425" rIns="91425" bIns="91425" anchor="ctr" anchorCtr="0">
             <a:noAutofit/>
           </a:bodyPr>
           <a:lstStyle>
@@ -1761,15 +1803,19 @@
               <a:defRPr sz="3600"/>
             </a:lvl9pPr>
           </a:lstStyle>
-          <a:p/>
+          <a:p>
+            <a:endParaRPr/>
+          </a:p>
         </p:txBody>
       </p:sp>
       <p:sp>
         <p:nvSpPr>
           <p:cNvPr id="15" name="Google Shape;15;p3"/>
-          <p:cNvSpPr txBox="1"/>
+          <p:cNvSpPr txBox="1">
+            <a:spLocks noGrp="1"/>
+          </p:cNvSpPr>
           <p:nvPr>
-            <p:ph idx="12" type="sldNum"/>
+            <p:ph type="sldNum" idx="12"/>
           </p:nvPr>
         </p:nvSpPr>
         <p:spPr>
@@ -1782,7 +1828,7 @@
           </a:prstGeom>
         </p:spPr>
         <p:txBody>
-          <a:bodyPr anchorCtr="0" anchor="ctr" bIns="91425" lIns="91425" spcFirstLastPara="1" rIns="91425" wrap="square" tIns="91425">
+          <a:bodyPr spcFirstLastPara="1" wrap="square" lIns="91425" tIns="91425" rIns="91425" bIns="91425" anchor="ctr" anchorCtr="0">
             <a:noAutofit/>
           </a:bodyPr>
           <a:lstStyle>
@@ -1824,7 +1870,7 @@
             </a:lvl9pPr>
           </a:lstStyle>
           <a:p>
-            <a:pPr indent="0" lvl="0" marL="0" rtl="0" algn="r">
+            <a:pPr marL="0" lvl="0" indent="0" algn="r" rtl="0">
               <a:spcBef>
                 <a:spcPts val="0"/>
               </a:spcBef>
@@ -1835,7 +1881,7 @@
             </a:pPr>
             <a:fld id="{00000000-1234-1234-1234-123412341234}" type="slidenum">
               <a:rPr lang="en"/>
-              <a:t>‹#›</a:t>
+              <a:t>‹nº›</a:t>
             </a:fld>
             <a:endParaRPr/>
           </a:p>
@@ -1850,11 +1896,11 @@
 </file>
 
 <file path=ppt/slideLayouts/slideLayout3.xml><?xml version="1.0" encoding="utf-8"?>
-<p:sldLayout xmlns:a="http://schemas.openxmlformats.org/drawingml/2006/main" xmlns:r="http://schemas.openxmlformats.org/officeDocument/2006/relationships" xmlns:mc="http://schemas.openxmlformats.org/markup-compatibility/2006" xmlns:mv="urn:schemas-microsoft-com:mac:vml" xmlns:p="http://schemas.openxmlformats.org/presentationml/2006/main" xmlns:c="http://schemas.openxmlformats.org/drawingml/2006/chart" xmlns:dgm="http://schemas.openxmlformats.org/drawingml/2006/diagram" xmlns:o="urn:schemas-microsoft-com:office:office" xmlns:v="urn:schemas-microsoft-com:vml" xmlns:pvml="urn:schemas-microsoft-com:office:powerpoint" xmlns:com="http://schemas.openxmlformats.org/drawingml/2006/compatibility" xmlns:p14="http://schemas.microsoft.com/office/powerpoint/2010/main" xmlns:p15="http://schemas.microsoft.com/office/powerpoint/2012/main" matchingName="Title and body" type="tx">
+<p:sldLayout xmlns:a="http://schemas.openxmlformats.org/drawingml/2006/main" xmlns:r="http://schemas.openxmlformats.org/officeDocument/2006/relationships" xmlns:p="http://schemas.openxmlformats.org/presentationml/2006/main" matchingName="Title and body" type="tx">
   <p:cSld name="TITLE_AND_BODY">
     <p:spTree>
       <p:nvGrpSpPr>
-        <p:cNvPr id="16" name="Shape 16"/>
+        <p:cNvPr id="1" name="Shape 16"/>
         <p:cNvGrpSpPr/>
         <p:nvPr/>
       </p:nvGrpSpPr>
@@ -1869,7 +1915,9 @@
       <p:sp>
         <p:nvSpPr>
           <p:cNvPr id="17" name="Google Shape;17;p4"/>
-          <p:cNvSpPr txBox="1"/>
+          <p:cNvSpPr txBox="1">
+            <a:spLocks noGrp="1"/>
+          </p:cNvSpPr>
           <p:nvPr>
             <p:ph type="title"/>
           </p:nvPr>
@@ -1884,7 +1932,7 @@
           </a:prstGeom>
         </p:spPr>
         <p:txBody>
-          <a:bodyPr anchorCtr="0" anchor="t" bIns="91425" lIns="91425" spcFirstLastPara="1" rIns="91425" wrap="square" tIns="91425">
+          <a:bodyPr spcFirstLastPara="1" wrap="square" lIns="91425" tIns="91425" rIns="91425" bIns="91425" anchor="t" anchorCtr="0">
             <a:noAutofit/>
           </a:bodyPr>
           <a:lstStyle>
@@ -1988,15 +2036,19 @@
               <a:defRPr/>
             </a:lvl9pPr>
           </a:lstStyle>
-          <a:p/>
+          <a:p>
+            <a:endParaRPr/>
+          </a:p>
         </p:txBody>
       </p:sp>
       <p:sp>
         <p:nvSpPr>
           <p:cNvPr id="18" name="Google Shape;18;p4"/>
-          <p:cNvSpPr txBox="1"/>
+          <p:cNvSpPr txBox="1">
+            <a:spLocks noGrp="1"/>
+          </p:cNvSpPr>
           <p:nvPr>
-            <p:ph idx="1" type="body"/>
+            <p:ph type="body" idx="1"/>
           </p:nvPr>
         </p:nvSpPr>
         <p:spPr>
@@ -2009,11 +2061,11 @@
           </a:prstGeom>
         </p:spPr>
         <p:txBody>
-          <a:bodyPr anchorCtr="0" anchor="t" bIns="91425" lIns="91425" spcFirstLastPara="1" rIns="91425" wrap="square" tIns="91425">
+          <a:bodyPr spcFirstLastPara="1" wrap="square" lIns="91425" tIns="91425" rIns="91425" bIns="91425" anchor="t" anchorCtr="0">
             <a:noAutofit/>
           </a:bodyPr>
           <a:lstStyle>
-            <a:lvl1pPr indent="-342900" lvl="0" marL="457200">
+            <a:lvl1pPr marL="457200" lvl="0" indent="-342900">
               <a:spcBef>
                 <a:spcPts val="0"/>
               </a:spcBef>
@@ -2024,7 +2076,7 @@
               <a:buChar char="●"/>
               <a:defRPr/>
             </a:lvl1pPr>
-            <a:lvl2pPr indent="-317500" lvl="1" marL="914400">
+            <a:lvl2pPr marL="914400" lvl="1" indent="-317500">
               <a:spcBef>
                 <a:spcPts val="1600"/>
               </a:spcBef>
@@ -2035,7 +2087,7 @@
               <a:buChar char="○"/>
               <a:defRPr/>
             </a:lvl2pPr>
-            <a:lvl3pPr indent="-317500" lvl="2" marL="1371600">
+            <a:lvl3pPr marL="1371600" lvl="2" indent="-317500">
               <a:spcBef>
                 <a:spcPts val="1600"/>
               </a:spcBef>
@@ -2046,7 +2098,7 @@
               <a:buChar char="■"/>
               <a:defRPr/>
             </a:lvl3pPr>
-            <a:lvl4pPr indent="-317500" lvl="3" marL="1828800">
+            <a:lvl4pPr marL="1828800" lvl="3" indent="-317500">
               <a:spcBef>
                 <a:spcPts val="1600"/>
               </a:spcBef>
@@ -2057,7 +2109,7 @@
               <a:buChar char="●"/>
               <a:defRPr/>
             </a:lvl4pPr>
-            <a:lvl5pPr indent="-317500" lvl="4" marL="2286000">
+            <a:lvl5pPr marL="2286000" lvl="4" indent="-317500">
               <a:spcBef>
                 <a:spcPts val="1600"/>
               </a:spcBef>
@@ -2068,7 +2120,7 @@
               <a:buChar char="○"/>
               <a:defRPr/>
             </a:lvl5pPr>
-            <a:lvl6pPr indent="-317500" lvl="5" marL="2743200">
+            <a:lvl6pPr marL="2743200" lvl="5" indent="-317500">
               <a:spcBef>
                 <a:spcPts val="1600"/>
               </a:spcBef>
@@ -2079,7 +2131,7 @@
               <a:buChar char="■"/>
               <a:defRPr/>
             </a:lvl6pPr>
-            <a:lvl7pPr indent="-317500" lvl="6" marL="3200400">
+            <a:lvl7pPr marL="3200400" lvl="6" indent="-317500">
               <a:spcBef>
                 <a:spcPts val="1600"/>
               </a:spcBef>
@@ -2090,7 +2142,7 @@
               <a:buChar char="●"/>
               <a:defRPr/>
             </a:lvl7pPr>
-            <a:lvl8pPr indent="-317500" lvl="7" marL="3657600">
+            <a:lvl8pPr marL="3657600" lvl="7" indent="-317500">
               <a:spcBef>
                 <a:spcPts val="1600"/>
               </a:spcBef>
@@ -2101,7 +2153,7 @@
               <a:buChar char="○"/>
               <a:defRPr/>
             </a:lvl8pPr>
-            <a:lvl9pPr indent="-317500" lvl="8" marL="4114800">
+            <a:lvl9pPr marL="4114800" lvl="8" indent="-317500">
               <a:spcBef>
                 <a:spcPts val="1600"/>
               </a:spcBef>
@@ -2113,15 +2165,19 @@
               <a:defRPr/>
             </a:lvl9pPr>
           </a:lstStyle>
-          <a:p/>
+          <a:p>
+            <a:endParaRPr/>
+          </a:p>
         </p:txBody>
       </p:sp>
       <p:sp>
         <p:nvSpPr>
           <p:cNvPr id="19" name="Google Shape;19;p4"/>
-          <p:cNvSpPr txBox="1"/>
+          <p:cNvSpPr txBox="1">
+            <a:spLocks noGrp="1"/>
+          </p:cNvSpPr>
           <p:nvPr>
-            <p:ph idx="12" type="sldNum"/>
+            <p:ph type="sldNum" idx="12"/>
           </p:nvPr>
         </p:nvSpPr>
         <p:spPr>
@@ -2134,7 +2190,7 @@
           </a:prstGeom>
         </p:spPr>
         <p:txBody>
-          <a:bodyPr anchorCtr="0" anchor="ctr" bIns="91425" lIns="91425" spcFirstLastPara="1" rIns="91425" wrap="square" tIns="91425">
+          <a:bodyPr spcFirstLastPara="1" wrap="square" lIns="91425" tIns="91425" rIns="91425" bIns="91425" anchor="ctr" anchorCtr="0">
             <a:noAutofit/>
           </a:bodyPr>
           <a:lstStyle>
@@ -2176,7 +2232,7 @@
             </a:lvl9pPr>
           </a:lstStyle>
           <a:p>
-            <a:pPr indent="0" lvl="0" marL="0" rtl="0" algn="r">
+            <a:pPr marL="0" lvl="0" indent="0" algn="r" rtl="0">
               <a:spcBef>
                 <a:spcPts val="0"/>
               </a:spcBef>
@@ -2187,7 +2243,7 @@
             </a:pPr>
             <a:fld id="{00000000-1234-1234-1234-123412341234}" type="slidenum">
               <a:rPr lang="en"/>
-              <a:t>‹#›</a:t>
+              <a:t>‹nº›</a:t>
             </a:fld>
             <a:endParaRPr/>
           </a:p>
@@ -2202,11 +2258,11 @@
 </file>
 
 <file path=ppt/slideLayouts/slideLayout4.xml><?xml version="1.0" encoding="utf-8"?>
-<p:sldLayout xmlns:a="http://schemas.openxmlformats.org/drawingml/2006/main" xmlns:r="http://schemas.openxmlformats.org/officeDocument/2006/relationships" xmlns:mc="http://schemas.openxmlformats.org/markup-compatibility/2006" xmlns:mv="urn:schemas-microsoft-com:mac:vml" xmlns:p="http://schemas.openxmlformats.org/presentationml/2006/main" xmlns:c="http://schemas.openxmlformats.org/drawingml/2006/chart" xmlns:dgm="http://schemas.openxmlformats.org/drawingml/2006/diagram" xmlns:o="urn:schemas-microsoft-com:office:office" xmlns:v="urn:schemas-microsoft-com:vml" xmlns:pvml="urn:schemas-microsoft-com:office:powerpoint" xmlns:com="http://schemas.openxmlformats.org/drawingml/2006/compatibility" xmlns:p14="http://schemas.microsoft.com/office/powerpoint/2010/main" xmlns:p15="http://schemas.microsoft.com/office/powerpoint/2012/main" matchingName="Title and two columns" type="twoColTx">
+<p:sldLayout xmlns:a="http://schemas.openxmlformats.org/drawingml/2006/main" xmlns:r="http://schemas.openxmlformats.org/officeDocument/2006/relationships" xmlns:p="http://schemas.openxmlformats.org/presentationml/2006/main" matchingName="Title and two columns" type="twoColTx">
   <p:cSld name="TITLE_AND_TWO_COLUMNS">
     <p:spTree>
       <p:nvGrpSpPr>
-        <p:cNvPr id="20" name="Shape 20"/>
+        <p:cNvPr id="1" name="Shape 20"/>
         <p:cNvGrpSpPr/>
         <p:nvPr/>
       </p:nvGrpSpPr>
@@ -2221,7 +2277,9 @@
       <p:sp>
         <p:nvSpPr>
           <p:cNvPr id="21" name="Google Shape;21;p5"/>
-          <p:cNvSpPr txBox="1"/>
+          <p:cNvSpPr txBox="1">
+            <a:spLocks noGrp="1"/>
+          </p:cNvSpPr>
           <p:nvPr>
             <p:ph type="title"/>
           </p:nvPr>
@@ -2236,7 +2294,7 @@
           </a:prstGeom>
         </p:spPr>
         <p:txBody>
-          <a:bodyPr anchorCtr="0" anchor="t" bIns="91425" lIns="91425" spcFirstLastPara="1" rIns="91425" wrap="square" tIns="91425">
+          <a:bodyPr spcFirstLastPara="1" wrap="square" lIns="91425" tIns="91425" rIns="91425" bIns="91425" anchor="t" anchorCtr="0">
             <a:noAutofit/>
           </a:bodyPr>
           <a:lstStyle>
@@ -2340,15 +2398,19 @@
               <a:defRPr/>
             </a:lvl9pPr>
           </a:lstStyle>
-          <a:p/>
+          <a:p>
+            <a:endParaRPr/>
+          </a:p>
         </p:txBody>
       </p:sp>
       <p:sp>
         <p:nvSpPr>
           <p:cNvPr id="22" name="Google Shape;22;p5"/>
-          <p:cNvSpPr txBox="1"/>
+          <p:cNvSpPr txBox="1">
+            <a:spLocks noGrp="1"/>
+          </p:cNvSpPr>
           <p:nvPr>
-            <p:ph idx="1" type="body"/>
+            <p:ph type="body" idx="1"/>
           </p:nvPr>
         </p:nvSpPr>
         <p:spPr>
@@ -2361,11 +2423,11 @@
           </a:prstGeom>
         </p:spPr>
         <p:txBody>
-          <a:bodyPr anchorCtr="0" anchor="t" bIns="91425" lIns="91425" spcFirstLastPara="1" rIns="91425" wrap="square" tIns="91425">
+          <a:bodyPr spcFirstLastPara="1" wrap="square" lIns="91425" tIns="91425" rIns="91425" bIns="91425" anchor="t" anchorCtr="0">
             <a:noAutofit/>
           </a:bodyPr>
           <a:lstStyle>
-            <a:lvl1pPr indent="-317500" lvl="0" marL="457200">
+            <a:lvl1pPr marL="457200" lvl="0" indent="-317500">
               <a:spcBef>
                 <a:spcPts val="0"/>
               </a:spcBef>
@@ -2376,7 +2438,7 @@
               <a:buChar char="●"/>
               <a:defRPr sz="1400"/>
             </a:lvl1pPr>
-            <a:lvl2pPr indent="-304800" lvl="1" marL="914400">
+            <a:lvl2pPr marL="914400" lvl="1" indent="-304800">
               <a:spcBef>
                 <a:spcPts val="1600"/>
               </a:spcBef>
@@ -2387,7 +2449,7 @@
               <a:buChar char="○"/>
               <a:defRPr sz="1200"/>
             </a:lvl2pPr>
-            <a:lvl3pPr indent="-304800" lvl="2" marL="1371600">
+            <a:lvl3pPr marL="1371600" lvl="2" indent="-304800">
               <a:spcBef>
                 <a:spcPts val="1600"/>
               </a:spcBef>
@@ -2398,7 +2460,7 @@
               <a:buChar char="■"/>
               <a:defRPr sz="1200"/>
             </a:lvl3pPr>
-            <a:lvl4pPr indent="-304800" lvl="3" marL="1828800">
+            <a:lvl4pPr marL="1828800" lvl="3" indent="-304800">
               <a:spcBef>
                 <a:spcPts val="1600"/>
               </a:spcBef>
@@ -2409,7 +2471,7 @@
               <a:buChar char="●"/>
               <a:defRPr sz="1200"/>
             </a:lvl4pPr>
-            <a:lvl5pPr indent="-304800" lvl="4" marL="2286000">
+            <a:lvl5pPr marL="2286000" lvl="4" indent="-304800">
               <a:spcBef>
                 <a:spcPts val="1600"/>
               </a:spcBef>
@@ -2420,7 +2482,7 @@
               <a:buChar char="○"/>
               <a:defRPr sz="1200"/>
             </a:lvl5pPr>
-            <a:lvl6pPr indent="-304800" lvl="5" marL="2743200">
+            <a:lvl6pPr marL="2743200" lvl="5" indent="-304800">
               <a:spcBef>
                 <a:spcPts val="1600"/>
               </a:spcBef>
@@ -2431,7 +2493,7 @@
               <a:buChar char="■"/>
               <a:defRPr sz="1200"/>
             </a:lvl6pPr>
-            <a:lvl7pPr indent="-304800" lvl="6" marL="3200400">
+            <a:lvl7pPr marL="3200400" lvl="6" indent="-304800">
               <a:spcBef>
                 <a:spcPts val="1600"/>
               </a:spcBef>
@@ -2442,7 +2504,7 @@
               <a:buChar char="●"/>
               <a:defRPr sz="1200"/>
             </a:lvl7pPr>
-            <a:lvl8pPr indent="-304800" lvl="7" marL="3657600">
+            <a:lvl8pPr marL="3657600" lvl="7" indent="-304800">
               <a:spcBef>
                 <a:spcPts val="1600"/>
               </a:spcBef>
@@ -2453,7 +2515,7 @@
               <a:buChar char="○"/>
               <a:defRPr sz="1200"/>
             </a:lvl8pPr>
-            <a:lvl9pPr indent="-304800" lvl="8" marL="4114800">
+            <a:lvl9pPr marL="4114800" lvl="8" indent="-304800">
               <a:spcBef>
                 <a:spcPts val="1600"/>
               </a:spcBef>
@@ -2465,15 +2527,19 @@
               <a:defRPr sz="1200"/>
             </a:lvl9pPr>
           </a:lstStyle>
-          <a:p/>
+          <a:p>
+            <a:endParaRPr/>
+          </a:p>
         </p:txBody>
       </p:sp>
       <p:sp>
         <p:nvSpPr>
           <p:cNvPr id="23" name="Google Shape;23;p5"/>
-          <p:cNvSpPr txBox="1"/>
+          <p:cNvSpPr txBox="1">
+            <a:spLocks noGrp="1"/>
+          </p:cNvSpPr>
           <p:nvPr>
-            <p:ph idx="2" type="body"/>
+            <p:ph type="body" idx="2"/>
           </p:nvPr>
         </p:nvSpPr>
         <p:spPr>
@@ -2486,11 +2552,11 @@
           </a:prstGeom>
         </p:spPr>
         <p:txBody>
-          <a:bodyPr anchorCtr="0" anchor="t" bIns="91425" lIns="91425" spcFirstLastPara="1" rIns="91425" wrap="square" tIns="91425">
+          <a:bodyPr spcFirstLastPara="1" wrap="square" lIns="91425" tIns="91425" rIns="91425" bIns="91425" anchor="t" anchorCtr="0">
             <a:noAutofit/>
           </a:bodyPr>
           <a:lstStyle>
-            <a:lvl1pPr indent="-317500" lvl="0" marL="457200">
+            <a:lvl1pPr marL="457200" lvl="0" indent="-317500">
               <a:spcBef>
                 <a:spcPts val="0"/>
               </a:spcBef>
@@ -2501,7 +2567,7 @@
               <a:buChar char="●"/>
               <a:defRPr sz="1400"/>
             </a:lvl1pPr>
-            <a:lvl2pPr indent="-304800" lvl="1" marL="914400">
+            <a:lvl2pPr marL="914400" lvl="1" indent="-304800">
               <a:spcBef>
                 <a:spcPts val="1600"/>
               </a:spcBef>
@@ -2512,7 +2578,7 @@
               <a:buChar char="○"/>
               <a:defRPr sz="1200"/>
             </a:lvl2pPr>
-            <a:lvl3pPr indent="-304800" lvl="2" marL="1371600">
+            <a:lvl3pPr marL="1371600" lvl="2" indent="-304800">
               <a:spcBef>
                 <a:spcPts val="1600"/>
               </a:spcBef>
@@ -2523,7 +2589,7 @@
               <a:buChar char="■"/>
               <a:defRPr sz="1200"/>
             </a:lvl3pPr>
-            <a:lvl4pPr indent="-304800" lvl="3" marL="1828800">
+            <a:lvl4pPr marL="1828800" lvl="3" indent="-304800">
               <a:spcBef>
                 <a:spcPts val="1600"/>
               </a:spcBef>
@@ -2534,7 +2600,7 @@
               <a:buChar char="●"/>
               <a:defRPr sz="1200"/>
             </a:lvl4pPr>
-            <a:lvl5pPr indent="-304800" lvl="4" marL="2286000">
+            <a:lvl5pPr marL="2286000" lvl="4" indent="-304800">
               <a:spcBef>
                 <a:spcPts val="1600"/>
               </a:spcBef>
@@ -2545,7 +2611,7 @@
               <a:buChar char="○"/>
               <a:defRPr sz="1200"/>
             </a:lvl5pPr>
-            <a:lvl6pPr indent="-304800" lvl="5" marL="2743200">
+            <a:lvl6pPr marL="2743200" lvl="5" indent="-304800">
               <a:spcBef>
                 <a:spcPts val="1600"/>
               </a:spcBef>
@@ -2556,7 +2622,7 @@
               <a:buChar char="■"/>
               <a:defRPr sz="1200"/>
             </a:lvl6pPr>
-            <a:lvl7pPr indent="-304800" lvl="6" marL="3200400">
+            <a:lvl7pPr marL="3200400" lvl="6" indent="-304800">
               <a:spcBef>
                 <a:spcPts val="1600"/>
               </a:spcBef>
@@ -2567,7 +2633,7 @@
               <a:buChar char="●"/>
               <a:defRPr sz="1200"/>
             </a:lvl7pPr>
-            <a:lvl8pPr indent="-304800" lvl="7" marL="3657600">
+            <a:lvl8pPr marL="3657600" lvl="7" indent="-304800">
               <a:spcBef>
                 <a:spcPts val="1600"/>
               </a:spcBef>
@@ -2578,7 +2644,7 @@
               <a:buChar char="○"/>
               <a:defRPr sz="1200"/>
             </a:lvl8pPr>
-            <a:lvl9pPr indent="-304800" lvl="8" marL="4114800">
+            <a:lvl9pPr marL="4114800" lvl="8" indent="-304800">
               <a:spcBef>
                 <a:spcPts val="1600"/>
               </a:spcBef>
@@ -2590,15 +2656,19 @@
               <a:defRPr sz="1200"/>
             </a:lvl9pPr>
           </a:lstStyle>
-          <a:p/>
+          <a:p>
+            <a:endParaRPr/>
+          </a:p>
         </p:txBody>
       </p:sp>
       <p:sp>
         <p:nvSpPr>
           <p:cNvPr id="24" name="Google Shape;24;p5"/>
-          <p:cNvSpPr txBox="1"/>
+          <p:cNvSpPr txBox="1">
+            <a:spLocks noGrp="1"/>
+          </p:cNvSpPr>
           <p:nvPr>
-            <p:ph idx="12" type="sldNum"/>
+            <p:ph type="sldNum" idx="12"/>
           </p:nvPr>
         </p:nvSpPr>
         <p:spPr>
@@ -2611,7 +2681,7 @@
           </a:prstGeom>
         </p:spPr>
         <p:txBody>
-          <a:bodyPr anchorCtr="0" anchor="ctr" bIns="91425" lIns="91425" spcFirstLastPara="1" rIns="91425" wrap="square" tIns="91425">
+          <a:bodyPr spcFirstLastPara="1" wrap="square" lIns="91425" tIns="91425" rIns="91425" bIns="91425" anchor="ctr" anchorCtr="0">
             <a:noAutofit/>
           </a:bodyPr>
           <a:lstStyle>
@@ -2653,7 +2723,7 @@
             </a:lvl9pPr>
           </a:lstStyle>
           <a:p>
-            <a:pPr indent="0" lvl="0" marL="0" rtl="0" algn="r">
+            <a:pPr marL="0" lvl="0" indent="0" algn="r" rtl="0">
               <a:spcBef>
                 <a:spcPts val="0"/>
               </a:spcBef>
@@ -2664,7 +2734,7 @@
             </a:pPr>
             <a:fld id="{00000000-1234-1234-1234-123412341234}" type="slidenum">
               <a:rPr lang="en"/>
-              <a:t>‹#›</a:t>
+              <a:t>‹nº›</a:t>
             </a:fld>
             <a:endParaRPr/>
           </a:p>
@@ -2679,11 +2749,11 @@
 </file>
 
 <file path=ppt/slideLayouts/slideLayout5.xml><?xml version="1.0" encoding="utf-8"?>
-<p:sldLayout xmlns:a="http://schemas.openxmlformats.org/drawingml/2006/main" xmlns:r="http://schemas.openxmlformats.org/officeDocument/2006/relationships" xmlns:mc="http://schemas.openxmlformats.org/markup-compatibility/2006" xmlns:mv="urn:schemas-microsoft-com:mac:vml" xmlns:p="http://schemas.openxmlformats.org/presentationml/2006/main" xmlns:c="http://schemas.openxmlformats.org/drawingml/2006/chart" xmlns:dgm="http://schemas.openxmlformats.org/drawingml/2006/diagram" xmlns:o="urn:schemas-microsoft-com:office:office" xmlns:v="urn:schemas-microsoft-com:vml" xmlns:pvml="urn:schemas-microsoft-com:office:powerpoint" xmlns:com="http://schemas.openxmlformats.org/drawingml/2006/compatibility" xmlns:p14="http://schemas.microsoft.com/office/powerpoint/2010/main" xmlns:p15="http://schemas.microsoft.com/office/powerpoint/2012/main" matchingName="Title only" type="titleOnly">
+<p:sldLayout xmlns:a="http://schemas.openxmlformats.org/drawingml/2006/main" xmlns:r="http://schemas.openxmlformats.org/officeDocument/2006/relationships" xmlns:p="http://schemas.openxmlformats.org/presentationml/2006/main" matchingName="Title only" type="titleOnly">
   <p:cSld name="TITLE_ONLY">
     <p:spTree>
       <p:nvGrpSpPr>
-        <p:cNvPr id="25" name="Shape 25"/>
+        <p:cNvPr id="1" name="Shape 25"/>
         <p:cNvGrpSpPr/>
         <p:nvPr/>
       </p:nvGrpSpPr>
@@ -2698,7 +2768,9 @@
       <p:sp>
         <p:nvSpPr>
           <p:cNvPr id="26" name="Google Shape;26;p6"/>
-          <p:cNvSpPr txBox="1"/>
+          <p:cNvSpPr txBox="1">
+            <a:spLocks noGrp="1"/>
+          </p:cNvSpPr>
           <p:nvPr>
             <p:ph type="title"/>
           </p:nvPr>
@@ -2713,7 +2785,7 @@
           </a:prstGeom>
         </p:spPr>
         <p:txBody>
-          <a:bodyPr anchorCtr="0" anchor="t" bIns="91425" lIns="91425" spcFirstLastPara="1" rIns="91425" wrap="square" tIns="91425">
+          <a:bodyPr spcFirstLastPara="1" wrap="square" lIns="91425" tIns="91425" rIns="91425" bIns="91425" anchor="t" anchorCtr="0">
             <a:noAutofit/>
           </a:bodyPr>
           <a:lstStyle>
@@ -2817,15 +2889,19 @@
               <a:defRPr/>
             </a:lvl9pPr>
           </a:lstStyle>
-          <a:p/>
+          <a:p>
+            <a:endParaRPr/>
+          </a:p>
         </p:txBody>
       </p:sp>
       <p:sp>
         <p:nvSpPr>
           <p:cNvPr id="27" name="Google Shape;27;p6"/>
-          <p:cNvSpPr txBox="1"/>
+          <p:cNvSpPr txBox="1">
+            <a:spLocks noGrp="1"/>
+          </p:cNvSpPr>
           <p:nvPr>
-            <p:ph idx="12" type="sldNum"/>
+            <p:ph type="sldNum" idx="12"/>
           </p:nvPr>
         </p:nvSpPr>
         <p:spPr>
@@ -2838,7 +2914,7 @@
           </a:prstGeom>
         </p:spPr>
         <p:txBody>
-          <a:bodyPr anchorCtr="0" anchor="ctr" bIns="91425" lIns="91425" spcFirstLastPara="1" rIns="91425" wrap="square" tIns="91425">
+          <a:bodyPr spcFirstLastPara="1" wrap="square" lIns="91425" tIns="91425" rIns="91425" bIns="91425" anchor="ctr" anchorCtr="0">
             <a:noAutofit/>
           </a:bodyPr>
           <a:lstStyle>
@@ -2880,7 +2956,7 @@
             </a:lvl9pPr>
           </a:lstStyle>
           <a:p>
-            <a:pPr indent="0" lvl="0" marL="0" rtl="0" algn="r">
+            <a:pPr marL="0" lvl="0" indent="0" algn="r" rtl="0">
               <a:spcBef>
                 <a:spcPts val="0"/>
               </a:spcBef>
@@ -2891,7 +2967,7 @@
             </a:pPr>
             <a:fld id="{00000000-1234-1234-1234-123412341234}" type="slidenum">
               <a:rPr lang="en"/>
-              <a:t>‹#›</a:t>
+              <a:t>‹nº›</a:t>
             </a:fld>
             <a:endParaRPr/>
           </a:p>
@@ -2906,11 +2982,11 @@
 </file>
 
 <file path=ppt/slideLayouts/slideLayout6.xml><?xml version="1.0" encoding="utf-8"?>
-<p:sldLayout xmlns:a="http://schemas.openxmlformats.org/drawingml/2006/main" xmlns:r="http://schemas.openxmlformats.org/officeDocument/2006/relationships" xmlns:mc="http://schemas.openxmlformats.org/markup-compatibility/2006" xmlns:mv="urn:schemas-microsoft-com:mac:vml" xmlns:p="http://schemas.openxmlformats.org/presentationml/2006/main" xmlns:c="http://schemas.openxmlformats.org/drawingml/2006/chart" xmlns:dgm="http://schemas.openxmlformats.org/drawingml/2006/diagram" xmlns:o="urn:schemas-microsoft-com:office:office" xmlns:v="urn:schemas-microsoft-com:vml" xmlns:pvml="urn:schemas-microsoft-com:office:powerpoint" xmlns:com="http://schemas.openxmlformats.org/drawingml/2006/compatibility" xmlns:p14="http://schemas.microsoft.com/office/powerpoint/2010/main" xmlns:p15="http://schemas.microsoft.com/office/powerpoint/2012/main" matchingName="One column text">
+<p:sldLayout xmlns:a="http://schemas.openxmlformats.org/drawingml/2006/main" xmlns:r="http://schemas.openxmlformats.org/officeDocument/2006/relationships" xmlns:p="http://schemas.openxmlformats.org/presentationml/2006/main" matchingName="One column text">
   <p:cSld name="ONE_COLUMN_TEXT">
     <p:spTree>
       <p:nvGrpSpPr>
-        <p:cNvPr id="28" name="Shape 28"/>
+        <p:cNvPr id="1" name="Shape 28"/>
         <p:cNvGrpSpPr/>
         <p:nvPr/>
       </p:nvGrpSpPr>
@@ -2925,7 +3001,9 @@
       <p:sp>
         <p:nvSpPr>
           <p:cNvPr id="29" name="Google Shape;29;p7"/>
-          <p:cNvSpPr txBox="1"/>
+          <p:cNvSpPr txBox="1">
+            <a:spLocks noGrp="1"/>
+          </p:cNvSpPr>
           <p:nvPr>
             <p:ph type="title"/>
           </p:nvPr>
@@ -2940,7 +3018,7 @@
           </a:prstGeom>
         </p:spPr>
         <p:txBody>
-          <a:bodyPr anchorCtr="0" anchor="b" bIns="91425" lIns="91425" spcFirstLastPara="1" rIns="91425" wrap="square" tIns="91425">
+          <a:bodyPr spcFirstLastPara="1" wrap="square" lIns="91425" tIns="91425" rIns="91425" bIns="91425" anchor="b" anchorCtr="0">
             <a:noAutofit/>
           </a:bodyPr>
           <a:lstStyle>
@@ -3044,15 +3122,19 @@
               <a:defRPr sz="2400"/>
             </a:lvl9pPr>
           </a:lstStyle>
-          <a:p/>
+          <a:p>
+            <a:endParaRPr/>
+          </a:p>
         </p:txBody>
       </p:sp>
       <p:sp>
         <p:nvSpPr>
           <p:cNvPr id="30" name="Google Shape;30;p7"/>
-          <p:cNvSpPr txBox="1"/>
+          <p:cNvSpPr txBox="1">
+            <a:spLocks noGrp="1"/>
+          </p:cNvSpPr>
           <p:nvPr>
-            <p:ph idx="1" type="body"/>
+            <p:ph type="body" idx="1"/>
           </p:nvPr>
         </p:nvSpPr>
         <p:spPr>
@@ -3065,11 +3147,11 @@
           </a:prstGeom>
         </p:spPr>
         <p:txBody>
-          <a:bodyPr anchorCtr="0" anchor="t" bIns="91425" lIns="91425" spcFirstLastPara="1" rIns="91425" wrap="square" tIns="91425">
+          <a:bodyPr spcFirstLastPara="1" wrap="square" lIns="91425" tIns="91425" rIns="91425" bIns="91425" anchor="t" anchorCtr="0">
             <a:noAutofit/>
           </a:bodyPr>
           <a:lstStyle>
-            <a:lvl1pPr indent="-304800" lvl="0" marL="457200">
+            <a:lvl1pPr marL="457200" lvl="0" indent="-304800">
               <a:spcBef>
                 <a:spcPts val="0"/>
               </a:spcBef>
@@ -3080,7 +3162,7 @@
               <a:buChar char="●"/>
               <a:defRPr sz="1200"/>
             </a:lvl1pPr>
-            <a:lvl2pPr indent="-304800" lvl="1" marL="914400">
+            <a:lvl2pPr marL="914400" lvl="1" indent="-304800">
               <a:spcBef>
                 <a:spcPts val="1600"/>
               </a:spcBef>
@@ -3091,7 +3173,7 @@
               <a:buChar char="○"/>
               <a:defRPr sz="1200"/>
             </a:lvl2pPr>
-            <a:lvl3pPr indent="-304800" lvl="2" marL="1371600">
+            <a:lvl3pPr marL="1371600" lvl="2" indent="-304800">
               <a:spcBef>
                 <a:spcPts val="1600"/>
               </a:spcBef>
@@ -3102,7 +3184,7 @@
               <a:buChar char="■"/>
               <a:defRPr sz="1200"/>
             </a:lvl3pPr>
-            <a:lvl4pPr indent="-304800" lvl="3" marL="1828800">
+            <a:lvl4pPr marL="1828800" lvl="3" indent="-304800">
               <a:spcBef>
                 <a:spcPts val="1600"/>
               </a:spcBef>
@@ -3113,7 +3195,7 @@
               <a:buChar char="●"/>
               <a:defRPr sz="1200"/>
             </a:lvl4pPr>
-            <a:lvl5pPr indent="-304800" lvl="4" marL="2286000">
+            <a:lvl5pPr marL="2286000" lvl="4" indent="-304800">
               <a:spcBef>
                 <a:spcPts val="1600"/>
               </a:spcBef>
@@ -3124,7 +3206,7 @@
               <a:buChar char="○"/>
               <a:defRPr sz="1200"/>
             </a:lvl5pPr>
-            <a:lvl6pPr indent="-304800" lvl="5" marL="2743200">
+            <a:lvl6pPr marL="2743200" lvl="5" indent="-304800">
               <a:spcBef>
                 <a:spcPts val="1600"/>
               </a:spcBef>
@@ -3135,7 +3217,7 @@
               <a:buChar char="■"/>
               <a:defRPr sz="1200"/>
             </a:lvl6pPr>
-            <a:lvl7pPr indent="-304800" lvl="6" marL="3200400">
+            <a:lvl7pPr marL="3200400" lvl="6" indent="-304800">
               <a:spcBef>
                 <a:spcPts val="1600"/>
               </a:spcBef>
@@ -3146,7 +3228,7 @@
               <a:buChar char="●"/>
               <a:defRPr sz="1200"/>
             </a:lvl7pPr>
-            <a:lvl8pPr indent="-304800" lvl="7" marL="3657600">
+            <a:lvl8pPr marL="3657600" lvl="7" indent="-304800">
               <a:spcBef>
                 <a:spcPts val="1600"/>
               </a:spcBef>
@@ -3157,7 +3239,7 @@
               <a:buChar char="○"/>
               <a:defRPr sz="1200"/>
             </a:lvl8pPr>
-            <a:lvl9pPr indent="-304800" lvl="8" marL="4114800">
+            <a:lvl9pPr marL="4114800" lvl="8" indent="-304800">
               <a:spcBef>
                 <a:spcPts val="1600"/>
               </a:spcBef>
@@ -3169,15 +3251,19 @@
               <a:defRPr sz="1200"/>
             </a:lvl9pPr>
           </a:lstStyle>
-          <a:p/>
+          <a:p>
+            <a:endParaRPr/>
+          </a:p>
         </p:txBody>
       </p:sp>
       <p:sp>
         <p:nvSpPr>
           <p:cNvPr id="31" name="Google Shape;31;p7"/>
-          <p:cNvSpPr txBox="1"/>
+          <p:cNvSpPr txBox="1">
+            <a:spLocks noGrp="1"/>
+          </p:cNvSpPr>
           <p:nvPr>
-            <p:ph idx="12" type="sldNum"/>
+            <p:ph type="sldNum" idx="12"/>
           </p:nvPr>
         </p:nvSpPr>
         <p:spPr>
@@ -3190,7 +3276,7 @@
           </a:prstGeom>
         </p:spPr>
         <p:txBody>
-          <a:bodyPr anchorCtr="0" anchor="ctr" bIns="91425" lIns="91425" spcFirstLastPara="1" rIns="91425" wrap="square" tIns="91425">
+          <a:bodyPr spcFirstLastPara="1" wrap="square" lIns="91425" tIns="91425" rIns="91425" bIns="91425" anchor="ctr" anchorCtr="0">
             <a:noAutofit/>
           </a:bodyPr>
           <a:lstStyle>
@@ -3232,7 +3318,7 @@
             </a:lvl9pPr>
           </a:lstStyle>
           <a:p>
-            <a:pPr indent="0" lvl="0" marL="0" rtl="0" algn="r">
+            <a:pPr marL="0" lvl="0" indent="0" algn="r" rtl="0">
               <a:spcBef>
                 <a:spcPts val="0"/>
               </a:spcBef>
@@ -3243,7 +3329,7 @@
             </a:pPr>
             <a:fld id="{00000000-1234-1234-1234-123412341234}" type="slidenum">
               <a:rPr lang="en"/>
-              <a:t>‹#›</a:t>
+              <a:t>‹nº›</a:t>
             </a:fld>
             <a:endParaRPr/>
           </a:p>
@@ -3258,11 +3344,11 @@
 </file>
 
 <file path=ppt/slideLayouts/slideLayout7.xml><?xml version="1.0" encoding="utf-8"?>
-<p:sldLayout xmlns:a="http://schemas.openxmlformats.org/drawingml/2006/main" xmlns:r="http://schemas.openxmlformats.org/officeDocument/2006/relationships" xmlns:mc="http://schemas.openxmlformats.org/markup-compatibility/2006" xmlns:mv="urn:schemas-microsoft-com:mac:vml" xmlns:p="http://schemas.openxmlformats.org/presentationml/2006/main" xmlns:c="http://schemas.openxmlformats.org/drawingml/2006/chart" xmlns:dgm="http://schemas.openxmlformats.org/drawingml/2006/diagram" xmlns:o="urn:schemas-microsoft-com:office:office" xmlns:v="urn:schemas-microsoft-com:vml" xmlns:pvml="urn:schemas-microsoft-com:office:powerpoint" xmlns:com="http://schemas.openxmlformats.org/drawingml/2006/compatibility" xmlns:p14="http://schemas.microsoft.com/office/powerpoint/2010/main" xmlns:p15="http://schemas.microsoft.com/office/powerpoint/2012/main" matchingName="Main point">
+<p:sldLayout xmlns:a="http://schemas.openxmlformats.org/drawingml/2006/main" xmlns:r="http://schemas.openxmlformats.org/officeDocument/2006/relationships" xmlns:p="http://schemas.openxmlformats.org/presentationml/2006/main" matchingName="Main point">
   <p:cSld name="MAIN_POINT">
     <p:spTree>
       <p:nvGrpSpPr>
-        <p:cNvPr id="32" name="Shape 32"/>
+        <p:cNvPr id="1" name="Shape 32"/>
         <p:cNvGrpSpPr/>
         <p:nvPr/>
       </p:nvGrpSpPr>
@@ -3277,7 +3363,9 @@
       <p:sp>
         <p:nvSpPr>
           <p:cNvPr id="33" name="Google Shape;33;p8"/>
-          <p:cNvSpPr txBox="1"/>
+          <p:cNvSpPr txBox="1">
+            <a:spLocks noGrp="1"/>
+          </p:cNvSpPr>
           <p:nvPr>
             <p:ph type="title"/>
           </p:nvPr>
@@ -3292,7 +3380,7 @@
           </a:prstGeom>
         </p:spPr>
         <p:txBody>
-          <a:bodyPr anchorCtr="0" anchor="ctr" bIns="91425" lIns="91425" spcFirstLastPara="1" rIns="91425" wrap="square" tIns="91425">
+          <a:bodyPr spcFirstLastPara="1" wrap="square" lIns="91425" tIns="91425" rIns="91425" bIns="91425" anchor="ctr" anchorCtr="0">
             <a:noAutofit/>
           </a:bodyPr>
           <a:lstStyle>
@@ -3396,15 +3484,19 @@
               <a:defRPr sz="4800"/>
             </a:lvl9pPr>
           </a:lstStyle>
-          <a:p/>
+          <a:p>
+            <a:endParaRPr/>
+          </a:p>
         </p:txBody>
       </p:sp>
       <p:sp>
         <p:nvSpPr>
           <p:cNvPr id="34" name="Google Shape;34;p8"/>
-          <p:cNvSpPr txBox="1"/>
+          <p:cNvSpPr txBox="1">
+            <a:spLocks noGrp="1"/>
+          </p:cNvSpPr>
           <p:nvPr>
-            <p:ph idx="12" type="sldNum"/>
+            <p:ph type="sldNum" idx="12"/>
           </p:nvPr>
         </p:nvSpPr>
         <p:spPr>
@@ -3417,7 +3509,7 @@
           </a:prstGeom>
         </p:spPr>
         <p:txBody>
-          <a:bodyPr anchorCtr="0" anchor="ctr" bIns="91425" lIns="91425" spcFirstLastPara="1" rIns="91425" wrap="square" tIns="91425">
+          <a:bodyPr spcFirstLastPara="1" wrap="square" lIns="91425" tIns="91425" rIns="91425" bIns="91425" anchor="ctr" anchorCtr="0">
             <a:noAutofit/>
           </a:bodyPr>
           <a:lstStyle>
@@ -3459,7 +3551,7 @@
             </a:lvl9pPr>
           </a:lstStyle>
           <a:p>
-            <a:pPr indent="0" lvl="0" marL="0" rtl="0" algn="r">
+            <a:pPr marL="0" lvl="0" indent="0" algn="r" rtl="0">
               <a:spcBef>
                 <a:spcPts val="0"/>
               </a:spcBef>
@@ -3470,7 +3562,7 @@
             </a:pPr>
             <a:fld id="{00000000-1234-1234-1234-123412341234}" type="slidenum">
               <a:rPr lang="en"/>
-              <a:t>‹#›</a:t>
+              <a:t>‹nº›</a:t>
             </a:fld>
             <a:endParaRPr/>
           </a:p>
@@ -3485,11 +3577,11 @@
 </file>
 
 <file path=ppt/slideLayouts/slideLayout8.xml><?xml version="1.0" encoding="utf-8"?>
-<p:sldLayout xmlns:a="http://schemas.openxmlformats.org/drawingml/2006/main" xmlns:r="http://schemas.openxmlformats.org/officeDocument/2006/relationships" xmlns:mc="http://schemas.openxmlformats.org/markup-compatibility/2006" xmlns:mv="urn:schemas-microsoft-com:mac:vml" xmlns:p="http://schemas.openxmlformats.org/presentationml/2006/main" xmlns:c="http://schemas.openxmlformats.org/drawingml/2006/chart" xmlns:dgm="http://schemas.openxmlformats.org/drawingml/2006/diagram" xmlns:o="urn:schemas-microsoft-com:office:office" xmlns:v="urn:schemas-microsoft-com:vml" xmlns:pvml="urn:schemas-microsoft-com:office:powerpoint" xmlns:com="http://schemas.openxmlformats.org/drawingml/2006/compatibility" xmlns:p14="http://schemas.microsoft.com/office/powerpoint/2010/main" xmlns:p15="http://schemas.microsoft.com/office/powerpoint/2012/main" matchingName="Section title and description">
+<p:sldLayout xmlns:a="http://schemas.openxmlformats.org/drawingml/2006/main" xmlns:r="http://schemas.openxmlformats.org/officeDocument/2006/relationships" xmlns:p="http://schemas.openxmlformats.org/presentationml/2006/main" matchingName="Section title and description">
   <p:cSld name="SECTION_TITLE_AND_DESCRIPTION">
     <p:spTree>
       <p:nvGrpSpPr>
-        <p:cNvPr id="35" name="Shape 35"/>
+        <p:cNvPr id="1" name="Shape 35"/>
         <p:cNvGrpSpPr/>
         <p:nvPr/>
       </p:nvGrpSpPr>
@@ -3523,12 +3615,12 @@
           </a:ln>
         </p:spPr>
         <p:txBody>
-          <a:bodyPr anchorCtr="0" anchor="ctr" bIns="91425" lIns="91425" spcFirstLastPara="1" rIns="91425" wrap="square" tIns="91425">
+          <a:bodyPr spcFirstLastPara="1" wrap="square" lIns="91425" tIns="91425" rIns="91425" bIns="91425" anchor="ctr" anchorCtr="0">
             <a:noAutofit/>
           </a:bodyPr>
           <a:lstStyle/>
           <a:p>
-            <a:pPr indent="0" lvl="0" marL="0" rtl="0" algn="l">
+            <a:pPr marL="0" lvl="0" indent="0" algn="l" rtl="0">
               <a:spcBef>
                 <a:spcPts val="0"/>
               </a:spcBef>
@@ -3537,9 +3629,6 @@
               </a:spcAft>
               <a:buNone/>
             </a:pPr>
-            <a:r>
-              <a:t/>
-            </a:r>
             <a:endParaRPr/>
           </a:p>
         </p:txBody>
@@ -3547,7 +3636,9 @@
       <p:sp>
         <p:nvSpPr>
           <p:cNvPr id="37" name="Google Shape;37;p9"/>
-          <p:cNvSpPr txBox="1"/>
+          <p:cNvSpPr txBox="1">
+            <a:spLocks noGrp="1"/>
+          </p:cNvSpPr>
           <p:nvPr>
             <p:ph type="title"/>
           </p:nvPr>
@@ -3562,7 +3653,7 @@
           </a:prstGeom>
         </p:spPr>
         <p:txBody>
-          <a:bodyPr anchorCtr="0" anchor="b" bIns="91425" lIns="91425" spcFirstLastPara="1" rIns="91425" wrap="square" tIns="91425">
+          <a:bodyPr spcFirstLastPara="1" wrap="square" lIns="91425" tIns="91425" rIns="91425" bIns="91425" anchor="b" anchorCtr="0">
             <a:noAutofit/>
           </a:bodyPr>
           <a:lstStyle>
@@ -3666,15 +3757,19 @@
               <a:defRPr sz="4200"/>
             </a:lvl9pPr>
           </a:lstStyle>
-          <a:p/>
+          <a:p>
+            <a:endParaRPr/>
+          </a:p>
         </p:txBody>
       </p:sp>
       <p:sp>
         <p:nvSpPr>
           <p:cNvPr id="38" name="Google Shape;38;p9"/>
-          <p:cNvSpPr txBox="1"/>
+          <p:cNvSpPr txBox="1">
+            <a:spLocks noGrp="1"/>
+          </p:cNvSpPr>
           <p:nvPr>
-            <p:ph idx="1" type="subTitle"/>
+            <p:ph type="subTitle" idx="1"/>
           </p:nvPr>
         </p:nvSpPr>
         <p:spPr>
@@ -3687,7 +3782,7 @@
           </a:prstGeom>
         </p:spPr>
         <p:txBody>
-          <a:bodyPr anchorCtr="0" anchor="t" bIns="91425" lIns="91425" spcFirstLastPara="1" rIns="91425" wrap="square" tIns="91425">
+          <a:bodyPr spcFirstLastPara="1" wrap="square" lIns="91425" tIns="91425" rIns="91425" bIns="91425" anchor="t" anchorCtr="0">
             <a:noAutofit/>
           </a:bodyPr>
           <a:lstStyle>
@@ -3818,15 +3913,19 @@
               <a:defRPr sz="2100"/>
             </a:lvl9pPr>
           </a:lstStyle>
-          <a:p/>
+          <a:p>
+            <a:endParaRPr/>
+          </a:p>
         </p:txBody>
       </p:sp>
       <p:sp>
         <p:nvSpPr>
           <p:cNvPr id="39" name="Google Shape;39;p9"/>
-          <p:cNvSpPr txBox="1"/>
+          <p:cNvSpPr txBox="1">
+            <a:spLocks noGrp="1"/>
+          </p:cNvSpPr>
           <p:nvPr>
-            <p:ph idx="2" type="body"/>
+            <p:ph type="body" idx="2"/>
           </p:nvPr>
         </p:nvSpPr>
         <p:spPr>
@@ -3839,11 +3938,11 @@
           </a:prstGeom>
         </p:spPr>
         <p:txBody>
-          <a:bodyPr anchorCtr="0" anchor="ctr" bIns="91425" lIns="91425" spcFirstLastPara="1" rIns="91425" wrap="square" tIns="91425">
+          <a:bodyPr spcFirstLastPara="1" wrap="square" lIns="91425" tIns="91425" rIns="91425" bIns="91425" anchor="ctr" anchorCtr="0">
             <a:noAutofit/>
           </a:bodyPr>
           <a:lstStyle>
-            <a:lvl1pPr indent="-342900" lvl="0" marL="457200">
+            <a:lvl1pPr marL="457200" lvl="0" indent="-342900">
               <a:spcBef>
                 <a:spcPts val="0"/>
               </a:spcBef>
@@ -3854,7 +3953,7 @@
               <a:buChar char="●"/>
               <a:defRPr/>
             </a:lvl1pPr>
-            <a:lvl2pPr indent="-317500" lvl="1" marL="914400">
+            <a:lvl2pPr marL="914400" lvl="1" indent="-317500">
               <a:spcBef>
                 <a:spcPts val="1600"/>
               </a:spcBef>
@@ -3865,7 +3964,7 @@
               <a:buChar char="○"/>
               <a:defRPr/>
             </a:lvl2pPr>
-            <a:lvl3pPr indent="-317500" lvl="2" marL="1371600">
+            <a:lvl3pPr marL="1371600" lvl="2" indent="-317500">
               <a:spcBef>
                 <a:spcPts val="1600"/>
               </a:spcBef>
@@ -3876,7 +3975,7 @@
               <a:buChar char="■"/>
               <a:defRPr/>
             </a:lvl3pPr>
-            <a:lvl4pPr indent="-317500" lvl="3" marL="1828800">
+            <a:lvl4pPr marL="1828800" lvl="3" indent="-317500">
               <a:spcBef>
                 <a:spcPts val="1600"/>
               </a:spcBef>
@@ -3887,7 +3986,7 @@
               <a:buChar char="●"/>
               <a:defRPr/>
             </a:lvl4pPr>
-            <a:lvl5pPr indent="-317500" lvl="4" marL="2286000">
+            <a:lvl5pPr marL="2286000" lvl="4" indent="-317500">
               <a:spcBef>
                 <a:spcPts val="1600"/>
               </a:spcBef>
@@ -3898,7 +3997,7 @@
               <a:buChar char="○"/>
               <a:defRPr/>
             </a:lvl5pPr>
-            <a:lvl6pPr indent="-317500" lvl="5" marL="2743200">
+            <a:lvl6pPr marL="2743200" lvl="5" indent="-317500">
               <a:spcBef>
                 <a:spcPts val="1600"/>
               </a:spcBef>
@@ -3909,7 +4008,7 @@
               <a:buChar char="■"/>
               <a:defRPr/>
             </a:lvl6pPr>
-            <a:lvl7pPr indent="-317500" lvl="6" marL="3200400">
+            <a:lvl7pPr marL="3200400" lvl="6" indent="-317500">
               <a:spcBef>
                 <a:spcPts val="1600"/>
               </a:spcBef>
@@ -3920,7 +4019,7 @@
               <a:buChar char="●"/>
               <a:defRPr/>
             </a:lvl7pPr>
-            <a:lvl8pPr indent="-317500" lvl="7" marL="3657600">
+            <a:lvl8pPr marL="3657600" lvl="7" indent="-317500">
               <a:spcBef>
                 <a:spcPts val="1600"/>
               </a:spcBef>
@@ -3931,7 +4030,7 @@
               <a:buChar char="○"/>
               <a:defRPr/>
             </a:lvl8pPr>
-            <a:lvl9pPr indent="-317500" lvl="8" marL="4114800">
+            <a:lvl9pPr marL="4114800" lvl="8" indent="-317500">
               <a:spcBef>
                 <a:spcPts val="1600"/>
               </a:spcBef>
@@ -3943,15 +4042,19 @@
               <a:defRPr/>
             </a:lvl9pPr>
           </a:lstStyle>
-          <a:p/>
+          <a:p>
+            <a:endParaRPr/>
+          </a:p>
         </p:txBody>
       </p:sp>
       <p:sp>
         <p:nvSpPr>
           <p:cNvPr id="40" name="Google Shape;40;p9"/>
-          <p:cNvSpPr txBox="1"/>
+          <p:cNvSpPr txBox="1">
+            <a:spLocks noGrp="1"/>
+          </p:cNvSpPr>
           <p:nvPr>
-            <p:ph idx="12" type="sldNum"/>
+            <p:ph type="sldNum" idx="12"/>
           </p:nvPr>
         </p:nvSpPr>
         <p:spPr>
@@ -3964,7 +4067,7 @@
           </a:prstGeom>
         </p:spPr>
         <p:txBody>
-          <a:bodyPr anchorCtr="0" anchor="ctr" bIns="91425" lIns="91425" spcFirstLastPara="1" rIns="91425" wrap="square" tIns="91425">
+          <a:bodyPr spcFirstLastPara="1" wrap="square" lIns="91425" tIns="91425" rIns="91425" bIns="91425" anchor="ctr" anchorCtr="0">
             <a:noAutofit/>
           </a:bodyPr>
           <a:lstStyle>
@@ -4006,7 +4109,7 @@
             </a:lvl9pPr>
           </a:lstStyle>
           <a:p>
-            <a:pPr indent="0" lvl="0" marL="0" rtl="0" algn="r">
+            <a:pPr marL="0" lvl="0" indent="0" algn="r" rtl="0">
               <a:spcBef>
                 <a:spcPts val="0"/>
               </a:spcBef>
@@ -4017,7 +4120,7 @@
             </a:pPr>
             <a:fld id="{00000000-1234-1234-1234-123412341234}" type="slidenum">
               <a:rPr lang="en"/>
-              <a:t>‹#›</a:t>
+              <a:t>‹nº›</a:t>
             </a:fld>
             <a:endParaRPr/>
           </a:p>
@@ -4032,11 +4135,11 @@
 </file>
 
 <file path=ppt/slideLayouts/slideLayout9.xml><?xml version="1.0" encoding="utf-8"?>
-<p:sldLayout xmlns:a="http://schemas.openxmlformats.org/drawingml/2006/main" xmlns:r="http://schemas.openxmlformats.org/officeDocument/2006/relationships" xmlns:mc="http://schemas.openxmlformats.org/markup-compatibility/2006" xmlns:mv="urn:schemas-microsoft-com:mac:vml" xmlns:p="http://schemas.openxmlformats.org/presentationml/2006/main" xmlns:c="http://schemas.openxmlformats.org/drawingml/2006/chart" xmlns:dgm="http://schemas.openxmlformats.org/drawingml/2006/diagram" xmlns:o="urn:schemas-microsoft-com:office:office" xmlns:v="urn:schemas-microsoft-com:vml" xmlns:pvml="urn:schemas-microsoft-com:office:powerpoint" xmlns:com="http://schemas.openxmlformats.org/drawingml/2006/compatibility" xmlns:p14="http://schemas.microsoft.com/office/powerpoint/2010/main" xmlns:p15="http://schemas.microsoft.com/office/powerpoint/2012/main" matchingName="Caption">
+<p:sldLayout xmlns:a="http://schemas.openxmlformats.org/drawingml/2006/main" xmlns:r="http://schemas.openxmlformats.org/officeDocument/2006/relationships" xmlns:p="http://schemas.openxmlformats.org/presentationml/2006/main" matchingName="Caption">
   <p:cSld name="CAPTION_ONLY">
     <p:spTree>
       <p:nvGrpSpPr>
-        <p:cNvPr id="41" name="Shape 41"/>
+        <p:cNvPr id="1" name="Shape 41"/>
         <p:cNvGrpSpPr/>
         <p:nvPr/>
       </p:nvGrpSpPr>
@@ -4051,9 +4154,11 @@
       <p:sp>
         <p:nvSpPr>
           <p:cNvPr id="42" name="Google Shape;42;p10"/>
-          <p:cNvSpPr txBox="1"/>
+          <p:cNvSpPr txBox="1">
+            <a:spLocks noGrp="1"/>
+          </p:cNvSpPr>
           <p:nvPr>
-            <p:ph idx="1" type="body"/>
+            <p:ph type="body" idx="1"/>
           </p:nvPr>
         </p:nvSpPr>
         <p:spPr>
@@ -4066,11 +4171,11 @@
           </a:prstGeom>
         </p:spPr>
         <p:txBody>
-          <a:bodyPr anchorCtr="0" anchor="ctr" bIns="91425" lIns="91425" spcFirstLastPara="1" rIns="91425" wrap="square" tIns="91425">
+          <a:bodyPr spcFirstLastPara="1" wrap="square" lIns="91425" tIns="91425" rIns="91425" bIns="91425" anchor="ctr" anchorCtr="0">
             <a:noAutofit/>
           </a:bodyPr>
           <a:lstStyle>
-            <a:lvl1pPr indent="-228600" lvl="0" marL="457200">
+            <a:lvl1pPr marL="457200" lvl="0" indent="-228600">
               <a:lnSpc>
                 <a:spcPct val="100000"/>
               </a:lnSpc>
@@ -4085,15 +4190,19 @@
               <a:defRPr/>
             </a:lvl1pPr>
           </a:lstStyle>
-          <a:p/>
+          <a:p>
+            <a:endParaRPr/>
+          </a:p>
         </p:txBody>
       </p:sp>
       <p:sp>
         <p:nvSpPr>
           <p:cNvPr id="43" name="Google Shape;43;p10"/>
-          <p:cNvSpPr txBox="1"/>
+          <p:cNvSpPr txBox="1">
+            <a:spLocks noGrp="1"/>
+          </p:cNvSpPr>
           <p:nvPr>
-            <p:ph idx="12" type="sldNum"/>
+            <p:ph type="sldNum" idx="12"/>
           </p:nvPr>
         </p:nvSpPr>
         <p:spPr>
@@ -4106,7 +4215,7 @@
           </a:prstGeom>
         </p:spPr>
         <p:txBody>
-          <a:bodyPr anchorCtr="0" anchor="ctr" bIns="91425" lIns="91425" spcFirstLastPara="1" rIns="91425" wrap="square" tIns="91425">
+          <a:bodyPr spcFirstLastPara="1" wrap="square" lIns="91425" tIns="91425" rIns="91425" bIns="91425" anchor="ctr" anchorCtr="0">
             <a:noAutofit/>
           </a:bodyPr>
           <a:lstStyle>
@@ -4148,7 +4257,7 @@
             </a:lvl9pPr>
           </a:lstStyle>
           <a:p>
-            <a:pPr indent="0" lvl="0" marL="0" rtl="0" algn="r">
+            <a:pPr marL="0" lvl="0" indent="0" algn="r" rtl="0">
               <a:spcBef>
                 <a:spcPts val="0"/>
               </a:spcBef>
@@ -4159,7 +4268,7 @@
             </a:pPr>
             <a:fld id="{00000000-1234-1234-1234-123412341234}" type="slidenum">
               <a:rPr lang="en"/>
-              <a:t>‹#›</a:t>
+              <a:t>‹nº›</a:t>
             </a:fld>
             <a:endParaRPr/>
           </a:p>
@@ -4174,18 +4283,19 @@
 </file>
 
 <file path=ppt/slideMasters/slideMaster1.xml><?xml version="1.0" encoding="utf-8"?>
-<p:sldMaster xmlns:a="http://schemas.openxmlformats.org/drawingml/2006/main" xmlns:r="http://schemas.openxmlformats.org/officeDocument/2006/relationships" xmlns:mc="http://schemas.openxmlformats.org/markup-compatibility/2006" xmlns:mv="urn:schemas-microsoft-com:mac:vml" xmlns:p="http://schemas.openxmlformats.org/presentationml/2006/main" xmlns:c="http://schemas.openxmlformats.org/drawingml/2006/chart" xmlns:dgm="http://schemas.openxmlformats.org/drawingml/2006/diagram" xmlns:o="urn:schemas-microsoft-com:office:office" xmlns:v="urn:schemas-microsoft-com:vml" xmlns:pvml="urn:schemas-microsoft-com:office:powerpoint" xmlns:com="http://schemas.openxmlformats.org/drawingml/2006/compatibility" xmlns:p14="http://schemas.microsoft.com/office/powerpoint/2010/main" xmlns:p15="http://schemas.microsoft.com/office/powerpoint/2012/main">
+<p:sldMaster xmlns:a="http://schemas.openxmlformats.org/drawingml/2006/main" xmlns:r="http://schemas.openxmlformats.org/officeDocument/2006/relationships" xmlns:p="http://schemas.openxmlformats.org/presentationml/2006/main">
   <p:cSld name="simple-light-2">
     <p:bg>
       <p:bgPr>
         <a:solidFill>
           <a:schemeClr val="lt1"/>
         </a:solidFill>
+        <a:effectLst/>
       </p:bgPr>
     </p:bg>
     <p:spTree>
       <p:nvGrpSpPr>
-        <p:cNvPr id="5" name="Shape 5"/>
+        <p:cNvPr id="1" name="Shape 5"/>
         <p:cNvGrpSpPr/>
         <p:nvPr/>
       </p:nvGrpSpPr>
@@ -4200,7 +4310,9 @@
       <p:sp>
         <p:nvSpPr>
           <p:cNvPr id="6" name="Google Shape;6;p1"/>
-          <p:cNvSpPr txBox="1"/>
+          <p:cNvSpPr txBox="1">
+            <a:spLocks noGrp="1"/>
+          </p:cNvSpPr>
           <p:nvPr>
             <p:ph type="title"/>
           </p:nvPr>
@@ -4219,7 +4331,7 @@
           </a:ln>
         </p:spPr>
         <p:txBody>
-          <a:bodyPr anchorCtr="0" anchor="t" bIns="91425" lIns="91425" spcFirstLastPara="1" rIns="91425" wrap="square" tIns="91425">
+          <a:bodyPr spcFirstLastPara="1" wrap="square" lIns="91425" tIns="91425" rIns="91425" bIns="91425" anchor="t" anchorCtr="0">
             <a:noAutofit/>
           </a:bodyPr>
           <a:lstStyle>
@@ -4386,15 +4498,19 @@
               </a:defRPr>
             </a:lvl9pPr>
           </a:lstStyle>
-          <a:p/>
+          <a:p>
+            <a:endParaRPr/>
+          </a:p>
         </p:txBody>
       </p:sp>
       <p:sp>
         <p:nvSpPr>
           <p:cNvPr id="7" name="Google Shape;7;p1"/>
-          <p:cNvSpPr txBox="1"/>
+          <p:cNvSpPr txBox="1">
+            <a:spLocks noGrp="1"/>
+          </p:cNvSpPr>
           <p:nvPr>
-            <p:ph idx="1" type="body"/>
+            <p:ph type="body" idx="1"/>
           </p:nvPr>
         </p:nvSpPr>
         <p:spPr>
@@ -4411,11 +4527,11 @@
           </a:ln>
         </p:spPr>
         <p:txBody>
-          <a:bodyPr anchorCtr="0" anchor="t" bIns="91425" lIns="91425" spcFirstLastPara="1" rIns="91425" wrap="square" tIns="91425">
+          <a:bodyPr spcFirstLastPara="1" wrap="square" lIns="91425" tIns="91425" rIns="91425" bIns="91425" anchor="t" anchorCtr="0">
             <a:noAutofit/>
           </a:bodyPr>
           <a:lstStyle>
-            <a:lvl1pPr indent="-342900" lvl="0" marL="457200">
+            <a:lvl1pPr marL="457200" lvl="0" indent="-342900">
               <a:lnSpc>
                 <a:spcPct val="115000"/>
               </a:lnSpc>
@@ -4436,7 +4552,7 @@
                 </a:solidFill>
               </a:defRPr>
             </a:lvl1pPr>
-            <a:lvl2pPr indent="-317500" lvl="1" marL="914400">
+            <a:lvl2pPr marL="914400" lvl="1" indent="-317500">
               <a:lnSpc>
                 <a:spcPct val="115000"/>
               </a:lnSpc>
@@ -4457,7 +4573,7 @@
                 </a:solidFill>
               </a:defRPr>
             </a:lvl2pPr>
-            <a:lvl3pPr indent="-317500" lvl="2" marL="1371600">
+            <a:lvl3pPr marL="1371600" lvl="2" indent="-317500">
               <a:lnSpc>
                 <a:spcPct val="115000"/>
               </a:lnSpc>
@@ -4478,7 +4594,7 @@
                 </a:solidFill>
               </a:defRPr>
             </a:lvl3pPr>
-            <a:lvl4pPr indent="-317500" lvl="3" marL="1828800">
+            <a:lvl4pPr marL="1828800" lvl="3" indent="-317500">
               <a:lnSpc>
                 <a:spcPct val="115000"/>
               </a:lnSpc>
@@ -4499,7 +4615,7 @@
                 </a:solidFill>
               </a:defRPr>
             </a:lvl4pPr>
-            <a:lvl5pPr indent="-317500" lvl="4" marL="2286000">
+            <a:lvl5pPr marL="2286000" lvl="4" indent="-317500">
               <a:lnSpc>
                 <a:spcPct val="115000"/>
               </a:lnSpc>
@@ -4520,7 +4636,7 @@
                 </a:solidFill>
               </a:defRPr>
             </a:lvl5pPr>
-            <a:lvl6pPr indent="-317500" lvl="5" marL="2743200">
+            <a:lvl6pPr marL="2743200" lvl="5" indent="-317500">
               <a:lnSpc>
                 <a:spcPct val="115000"/>
               </a:lnSpc>
@@ -4541,7 +4657,7 @@
                 </a:solidFill>
               </a:defRPr>
             </a:lvl6pPr>
-            <a:lvl7pPr indent="-317500" lvl="6" marL="3200400">
+            <a:lvl7pPr marL="3200400" lvl="6" indent="-317500">
               <a:lnSpc>
                 <a:spcPct val="115000"/>
               </a:lnSpc>
@@ -4562,7 +4678,7 @@
                 </a:solidFill>
               </a:defRPr>
             </a:lvl7pPr>
-            <a:lvl8pPr indent="-317500" lvl="7" marL="3657600">
+            <a:lvl8pPr marL="3657600" lvl="7" indent="-317500">
               <a:lnSpc>
                 <a:spcPct val="115000"/>
               </a:lnSpc>
@@ -4583,7 +4699,7 @@
                 </a:solidFill>
               </a:defRPr>
             </a:lvl8pPr>
-            <a:lvl9pPr indent="-317500" lvl="8" marL="4114800">
+            <a:lvl9pPr marL="4114800" lvl="8" indent="-317500">
               <a:lnSpc>
                 <a:spcPct val="115000"/>
               </a:lnSpc>
@@ -4605,15 +4721,19 @@
               </a:defRPr>
             </a:lvl9pPr>
           </a:lstStyle>
-          <a:p/>
+          <a:p>
+            <a:endParaRPr/>
+          </a:p>
         </p:txBody>
       </p:sp>
       <p:sp>
         <p:nvSpPr>
           <p:cNvPr id="8" name="Google Shape;8;p1"/>
-          <p:cNvSpPr txBox="1"/>
+          <p:cNvSpPr txBox="1">
+            <a:spLocks noGrp="1"/>
+          </p:cNvSpPr>
           <p:nvPr>
-            <p:ph idx="12" type="sldNum"/>
+            <p:ph type="sldNum" idx="12"/>
           </p:nvPr>
         </p:nvSpPr>
         <p:spPr>
@@ -4630,7 +4750,7 @@
           </a:ln>
         </p:spPr>
         <p:txBody>
-          <a:bodyPr anchorCtr="0" anchor="ctr" bIns="91425" lIns="91425" spcFirstLastPara="1" rIns="91425" wrap="square" tIns="91425">
+          <a:bodyPr spcFirstLastPara="1" wrap="square" lIns="91425" tIns="91425" rIns="91425" bIns="91425" anchor="ctr" anchorCtr="0">
             <a:noAutofit/>
           </a:bodyPr>
           <a:lstStyle>
@@ -4708,7 +4828,7 @@
             </a:lvl9pPr>
           </a:lstStyle>
           <a:p>
-            <a:pPr indent="0" lvl="0" marL="0" rtl="0" algn="r">
+            <a:pPr marL="0" lvl="0" indent="0" algn="r" rtl="0">
               <a:spcBef>
                 <a:spcPts val="0"/>
               </a:spcBef>
@@ -4719,7 +4839,7 @@
             </a:pPr>
             <a:fld id="{00000000-1234-1234-1234-123412341234}" type="slidenum">
               <a:rPr lang="en"/>
-              <a:t>‹#›</a:t>
+              <a:t>‹nº›</a:t>
             </a:fld>
             <a:endParaRPr/>
           </a:p>
@@ -4727,7 +4847,7 @@
       </p:sp>
     </p:spTree>
   </p:cSld>
-  <p:clrMap accent1="accent1" accent2="accent2" accent3="accent3" accent4="accent4" accent5="accent5" accent6="accent6" bg1="lt1" bg2="dk2" tx1="dk1" tx2="lt2" folHlink="folHlink" hlink="hlink"/>
+  <p:clrMap bg1="lt1" tx1="dk1" bg2="dk2" tx2="lt2" accent1="accent1" accent2="accent2" accent3="accent3" accent4="accent4" accent5="accent5" accent6="accent6" hlink="hlink" folHlink="folHlink"/>
   <p:sldLayoutIdLst>
     <p:sldLayoutId id="2147483648" r:id="rId1"/>
     <p:sldLayoutId id="2147483649" r:id="rId2"/>
@@ -4741,10 +4861,10 @@
     <p:sldLayoutId id="2147483657" r:id="rId10"/>
     <p:sldLayoutId id="2147483658" r:id="rId11"/>
   </p:sldLayoutIdLst>
-  <p:hf dt="0" ftr="0" hdr="0" sldNum="0"/>
+  <p:hf sldNum="0" hdr="0" ftr="0" dt="0"/>
   <p:txStyles>
     <p:titleStyle>
-      <a:defPPr lvl="0" marR="0" rtl="0" algn="l">
+      <a:defPPr marR="0" lvl="0" algn="l" rtl="0">
         <a:lnSpc>
           <a:spcPct val="100000"/>
         </a:lnSpc>
@@ -4755,7 +4875,7 @@
           <a:spcPts val="0"/>
         </a:spcAft>
       </a:defPPr>
-      <a:lvl1pPr lvl="0" marR="0" rtl="0" algn="l">
+      <a:lvl1pPr marR="0" lvl="0" algn="l" rtl="0">
         <a:lnSpc>
           <a:spcPct val="100000"/>
         </a:lnSpc>
@@ -4769,7 +4889,7 @@
           <a:srgbClr val="000000"/>
         </a:buClr>
         <a:buFont typeface="Arial"/>
-        <a:defRPr b="0" i="0" sz="1400" u="none" cap="none" strike="noStrike">
+        <a:defRPr sz="1400" b="0" i="0" u="none" strike="noStrike" cap="none">
           <a:solidFill>
             <a:srgbClr val="000000"/>
           </a:solidFill>
@@ -4779,7 +4899,7 @@
           <a:sym typeface="Arial"/>
         </a:defRPr>
       </a:lvl1pPr>
-      <a:lvl2pPr lvl="1" marR="0" rtl="0" algn="l">
+      <a:lvl2pPr marR="0" lvl="1" algn="l" rtl="0">
         <a:lnSpc>
           <a:spcPct val="100000"/>
         </a:lnSpc>
@@ -4793,7 +4913,7 @@
           <a:srgbClr val="000000"/>
         </a:buClr>
         <a:buFont typeface="Arial"/>
-        <a:defRPr b="0" i="0" sz="1400" u="none" cap="none" strike="noStrike">
+        <a:defRPr sz="1400" b="0" i="0" u="none" strike="noStrike" cap="none">
           <a:solidFill>
             <a:srgbClr val="000000"/>
           </a:solidFill>
@@ -4803,7 +4923,7 @@
           <a:sym typeface="Arial"/>
         </a:defRPr>
       </a:lvl2pPr>
-      <a:lvl3pPr lvl="2" marR="0" rtl="0" algn="l">
+      <a:lvl3pPr marR="0" lvl="2" algn="l" rtl="0">
         <a:lnSpc>
           <a:spcPct val="100000"/>
         </a:lnSpc>
@@ -4817,7 +4937,7 @@
           <a:srgbClr val="000000"/>
         </a:buClr>
         <a:buFont typeface="Arial"/>
-        <a:defRPr b="0" i="0" sz="1400" u="none" cap="none" strike="noStrike">
+        <a:defRPr sz="1400" b="0" i="0" u="none" strike="noStrike" cap="none">
           <a:solidFill>
             <a:srgbClr val="000000"/>
           </a:solidFill>
@@ -4827,7 +4947,7 @@
           <a:sym typeface="Arial"/>
         </a:defRPr>
       </a:lvl3pPr>
-      <a:lvl4pPr lvl="3" marR="0" rtl="0" algn="l">
+      <a:lvl4pPr marR="0" lvl="3" algn="l" rtl="0">
         <a:lnSpc>
           <a:spcPct val="100000"/>
         </a:lnSpc>
@@ -4841,7 +4961,7 @@
           <a:srgbClr val="000000"/>
         </a:buClr>
         <a:buFont typeface="Arial"/>
-        <a:defRPr b="0" i="0" sz="1400" u="none" cap="none" strike="noStrike">
+        <a:defRPr sz="1400" b="0" i="0" u="none" strike="noStrike" cap="none">
           <a:solidFill>
             <a:srgbClr val="000000"/>
           </a:solidFill>
@@ -4851,7 +4971,7 @@
           <a:sym typeface="Arial"/>
         </a:defRPr>
       </a:lvl4pPr>
-      <a:lvl5pPr lvl="4" marR="0" rtl="0" algn="l">
+      <a:lvl5pPr marR="0" lvl="4" algn="l" rtl="0">
         <a:lnSpc>
           <a:spcPct val="100000"/>
         </a:lnSpc>
@@ -4865,7 +4985,7 @@
           <a:srgbClr val="000000"/>
         </a:buClr>
         <a:buFont typeface="Arial"/>
-        <a:defRPr b="0" i="0" sz="1400" u="none" cap="none" strike="noStrike">
+        <a:defRPr sz="1400" b="0" i="0" u="none" strike="noStrike" cap="none">
           <a:solidFill>
             <a:srgbClr val="000000"/>
           </a:solidFill>
@@ -4875,7 +4995,7 @@
           <a:sym typeface="Arial"/>
         </a:defRPr>
       </a:lvl5pPr>
-      <a:lvl6pPr lvl="5" marR="0" rtl="0" algn="l">
+      <a:lvl6pPr marR="0" lvl="5" algn="l" rtl="0">
         <a:lnSpc>
           <a:spcPct val="100000"/>
         </a:lnSpc>
@@ -4889,7 +5009,7 @@
           <a:srgbClr val="000000"/>
         </a:buClr>
         <a:buFont typeface="Arial"/>
-        <a:defRPr b="0" i="0" sz="1400" u="none" cap="none" strike="noStrike">
+        <a:defRPr sz="1400" b="0" i="0" u="none" strike="noStrike" cap="none">
           <a:solidFill>
             <a:srgbClr val="000000"/>
           </a:solidFill>
@@ -4899,7 +5019,7 @@
           <a:sym typeface="Arial"/>
         </a:defRPr>
       </a:lvl6pPr>
-      <a:lvl7pPr lvl="6" marR="0" rtl="0" algn="l">
+      <a:lvl7pPr marR="0" lvl="6" algn="l" rtl="0">
         <a:lnSpc>
           <a:spcPct val="100000"/>
         </a:lnSpc>
@@ -4913,7 +5033,7 @@
           <a:srgbClr val="000000"/>
         </a:buClr>
         <a:buFont typeface="Arial"/>
-        <a:defRPr b="0" i="0" sz="1400" u="none" cap="none" strike="noStrike">
+        <a:defRPr sz="1400" b="0" i="0" u="none" strike="noStrike" cap="none">
           <a:solidFill>
             <a:srgbClr val="000000"/>
           </a:solidFill>
@@ -4923,7 +5043,7 @@
           <a:sym typeface="Arial"/>
         </a:defRPr>
       </a:lvl7pPr>
-      <a:lvl8pPr lvl="7" marR="0" rtl="0" algn="l">
+      <a:lvl8pPr marR="0" lvl="7" algn="l" rtl="0">
         <a:lnSpc>
           <a:spcPct val="100000"/>
         </a:lnSpc>
@@ -4937,7 +5057,7 @@
           <a:srgbClr val="000000"/>
         </a:buClr>
         <a:buFont typeface="Arial"/>
-        <a:defRPr b="0" i="0" sz="1400" u="none" cap="none" strike="noStrike">
+        <a:defRPr sz="1400" b="0" i="0" u="none" strike="noStrike" cap="none">
           <a:solidFill>
             <a:srgbClr val="000000"/>
           </a:solidFill>
@@ -4947,7 +5067,7 @@
           <a:sym typeface="Arial"/>
         </a:defRPr>
       </a:lvl8pPr>
-      <a:lvl9pPr lvl="8" marR="0" rtl="0" algn="l">
+      <a:lvl9pPr marR="0" lvl="8" algn="l" rtl="0">
         <a:lnSpc>
           <a:spcPct val="100000"/>
         </a:lnSpc>
@@ -4961,7 +5081,7 @@
           <a:srgbClr val="000000"/>
         </a:buClr>
         <a:buFont typeface="Arial"/>
-        <a:defRPr b="0" i="0" sz="1400" u="none" cap="none" strike="noStrike">
+        <a:defRPr sz="1400" b="0" i="0" u="none" strike="noStrike" cap="none">
           <a:solidFill>
             <a:srgbClr val="000000"/>
           </a:solidFill>
@@ -4973,7 +5093,7 @@
       </a:lvl9pPr>
     </p:titleStyle>
     <p:bodyStyle>
-      <a:defPPr lvl="0" marR="0" rtl="0" algn="l">
+      <a:defPPr marR="0" lvl="0" algn="l" rtl="0">
         <a:lnSpc>
           <a:spcPct val="100000"/>
         </a:lnSpc>
@@ -4984,7 +5104,7 @@
           <a:spcPts val="0"/>
         </a:spcAft>
       </a:defPPr>
-      <a:lvl1pPr lvl="0" marR="0" rtl="0" algn="l">
+      <a:lvl1pPr marR="0" lvl="0" algn="l" rtl="0">
         <a:lnSpc>
           <a:spcPct val="100000"/>
         </a:lnSpc>
@@ -4998,7 +5118,7 @@
           <a:srgbClr val="000000"/>
         </a:buClr>
         <a:buFont typeface="Arial"/>
-        <a:defRPr b="0" i="0" sz="1400" u="none" cap="none" strike="noStrike">
+        <a:defRPr sz="1400" b="0" i="0" u="none" strike="noStrike" cap="none">
           <a:solidFill>
             <a:srgbClr val="000000"/>
           </a:solidFill>
@@ -5008,7 +5128,7 @@
           <a:sym typeface="Arial"/>
         </a:defRPr>
       </a:lvl1pPr>
-      <a:lvl2pPr lvl="1" marR="0" rtl="0" algn="l">
+      <a:lvl2pPr marR="0" lvl="1" algn="l" rtl="0">
         <a:lnSpc>
           <a:spcPct val="100000"/>
         </a:lnSpc>
@@ -5022,7 +5142,7 @@
           <a:srgbClr val="000000"/>
         </a:buClr>
         <a:buFont typeface="Arial"/>
-        <a:defRPr b="0" i="0" sz="1400" u="none" cap="none" strike="noStrike">
+        <a:defRPr sz="1400" b="0" i="0" u="none" strike="noStrike" cap="none">
           <a:solidFill>
             <a:srgbClr val="000000"/>
           </a:solidFill>
@@ -5032,7 +5152,7 @@
           <a:sym typeface="Arial"/>
         </a:defRPr>
       </a:lvl2pPr>
-      <a:lvl3pPr lvl="2" marR="0" rtl="0" algn="l">
+      <a:lvl3pPr marR="0" lvl="2" algn="l" rtl="0">
         <a:lnSpc>
           <a:spcPct val="100000"/>
         </a:lnSpc>
@@ -5046,7 +5166,7 @@
           <a:srgbClr val="000000"/>
         </a:buClr>
         <a:buFont typeface="Arial"/>
-        <a:defRPr b="0" i="0" sz="1400" u="none" cap="none" strike="noStrike">
+        <a:defRPr sz="1400" b="0" i="0" u="none" strike="noStrike" cap="none">
           <a:solidFill>
             <a:srgbClr val="000000"/>
           </a:solidFill>
@@ -5056,7 +5176,7 @@
           <a:sym typeface="Arial"/>
         </a:defRPr>
       </a:lvl3pPr>
-      <a:lvl4pPr lvl="3" marR="0" rtl="0" algn="l">
+      <a:lvl4pPr marR="0" lvl="3" algn="l" rtl="0">
         <a:lnSpc>
           <a:spcPct val="100000"/>
         </a:lnSpc>
@@ -5070,7 +5190,7 @@
           <a:srgbClr val="000000"/>
         </a:buClr>
         <a:buFont typeface="Arial"/>
-        <a:defRPr b="0" i="0" sz="1400" u="none" cap="none" strike="noStrike">
+        <a:defRPr sz="1400" b="0" i="0" u="none" strike="noStrike" cap="none">
           <a:solidFill>
             <a:srgbClr val="000000"/>
           </a:solidFill>
@@ -5080,7 +5200,7 @@
           <a:sym typeface="Arial"/>
         </a:defRPr>
       </a:lvl4pPr>
-      <a:lvl5pPr lvl="4" marR="0" rtl="0" algn="l">
+      <a:lvl5pPr marR="0" lvl="4" algn="l" rtl="0">
         <a:lnSpc>
           <a:spcPct val="100000"/>
         </a:lnSpc>
@@ -5094,7 +5214,7 @@
           <a:srgbClr val="000000"/>
         </a:buClr>
         <a:buFont typeface="Arial"/>
-        <a:defRPr b="0" i="0" sz="1400" u="none" cap="none" strike="noStrike">
+        <a:defRPr sz="1400" b="0" i="0" u="none" strike="noStrike" cap="none">
           <a:solidFill>
             <a:srgbClr val="000000"/>
           </a:solidFill>
@@ -5104,7 +5224,7 @@
           <a:sym typeface="Arial"/>
         </a:defRPr>
       </a:lvl5pPr>
-      <a:lvl6pPr lvl="5" marR="0" rtl="0" algn="l">
+      <a:lvl6pPr marR="0" lvl="5" algn="l" rtl="0">
         <a:lnSpc>
           <a:spcPct val="100000"/>
         </a:lnSpc>
@@ -5118,7 +5238,7 @@
           <a:srgbClr val="000000"/>
         </a:buClr>
         <a:buFont typeface="Arial"/>
-        <a:defRPr b="0" i="0" sz="1400" u="none" cap="none" strike="noStrike">
+        <a:defRPr sz="1400" b="0" i="0" u="none" strike="noStrike" cap="none">
           <a:solidFill>
             <a:srgbClr val="000000"/>
           </a:solidFill>
@@ -5128,7 +5248,7 @@
           <a:sym typeface="Arial"/>
         </a:defRPr>
       </a:lvl6pPr>
-      <a:lvl7pPr lvl="6" marR="0" rtl="0" algn="l">
+      <a:lvl7pPr marR="0" lvl="6" algn="l" rtl="0">
         <a:lnSpc>
           <a:spcPct val="100000"/>
         </a:lnSpc>
@@ -5142,7 +5262,7 @@
           <a:srgbClr val="000000"/>
         </a:buClr>
         <a:buFont typeface="Arial"/>
-        <a:defRPr b="0" i="0" sz="1400" u="none" cap="none" strike="noStrike">
+        <a:defRPr sz="1400" b="0" i="0" u="none" strike="noStrike" cap="none">
           <a:solidFill>
             <a:srgbClr val="000000"/>
           </a:solidFill>
@@ -5152,7 +5272,7 @@
           <a:sym typeface="Arial"/>
         </a:defRPr>
       </a:lvl7pPr>
-      <a:lvl8pPr lvl="7" marR="0" rtl="0" algn="l">
+      <a:lvl8pPr marR="0" lvl="7" algn="l" rtl="0">
         <a:lnSpc>
           <a:spcPct val="100000"/>
         </a:lnSpc>
@@ -5166,7 +5286,7 @@
           <a:srgbClr val="000000"/>
         </a:buClr>
         <a:buFont typeface="Arial"/>
-        <a:defRPr b="0" i="0" sz="1400" u="none" cap="none" strike="noStrike">
+        <a:defRPr sz="1400" b="0" i="0" u="none" strike="noStrike" cap="none">
           <a:solidFill>
             <a:srgbClr val="000000"/>
           </a:solidFill>
@@ -5176,7 +5296,7 @@
           <a:sym typeface="Arial"/>
         </a:defRPr>
       </a:lvl8pPr>
-      <a:lvl9pPr lvl="8" marR="0" rtl="0" algn="l">
+      <a:lvl9pPr marR="0" lvl="8" algn="l" rtl="0">
         <a:lnSpc>
           <a:spcPct val="100000"/>
         </a:lnSpc>
@@ -5190,7 +5310,7 @@
           <a:srgbClr val="000000"/>
         </a:buClr>
         <a:buFont typeface="Arial"/>
-        <a:defRPr b="0" i="0" sz="1400" u="none" cap="none" strike="noStrike">
+        <a:defRPr sz="1400" b="0" i="0" u="none" strike="noStrike" cap="none">
           <a:solidFill>
             <a:srgbClr val="000000"/>
           </a:solidFill>
@@ -5202,7 +5322,7 @@
       </a:lvl9pPr>
     </p:bodyStyle>
     <p:otherStyle>
-      <a:defPPr lvl="0" marR="0" rtl="0" algn="l">
+      <a:defPPr marR="0" lvl="0" algn="l" rtl="0">
         <a:lnSpc>
           <a:spcPct val="100000"/>
         </a:lnSpc>
@@ -5213,7 +5333,7 @@
           <a:spcPts val="0"/>
         </a:spcAft>
       </a:defPPr>
-      <a:lvl1pPr lvl="0" marR="0" rtl="0" algn="l">
+      <a:lvl1pPr marR="0" lvl="0" algn="l" rtl="0">
         <a:lnSpc>
           <a:spcPct val="100000"/>
         </a:lnSpc>
@@ -5227,7 +5347,7 @@
           <a:srgbClr val="000000"/>
         </a:buClr>
         <a:buFont typeface="Arial"/>
-        <a:defRPr b="0" i="0" sz="1400" u="none" cap="none" strike="noStrike">
+        <a:defRPr sz="1400" b="0" i="0" u="none" strike="noStrike" cap="none">
           <a:solidFill>
             <a:srgbClr val="000000"/>
           </a:solidFill>
@@ -5237,7 +5357,7 @@
           <a:sym typeface="Arial"/>
         </a:defRPr>
       </a:lvl1pPr>
-      <a:lvl2pPr lvl="1" marR="0" rtl="0" algn="l">
+      <a:lvl2pPr marR="0" lvl="1" algn="l" rtl="0">
         <a:lnSpc>
           <a:spcPct val="100000"/>
         </a:lnSpc>
@@ -5251,7 +5371,7 @@
           <a:srgbClr val="000000"/>
         </a:buClr>
         <a:buFont typeface="Arial"/>
-        <a:defRPr b="0" i="0" sz="1400" u="none" cap="none" strike="noStrike">
+        <a:defRPr sz="1400" b="0" i="0" u="none" strike="noStrike" cap="none">
           <a:solidFill>
             <a:srgbClr val="000000"/>
           </a:solidFill>
@@ -5261,7 +5381,7 @@
           <a:sym typeface="Arial"/>
         </a:defRPr>
       </a:lvl2pPr>
-      <a:lvl3pPr lvl="2" marR="0" rtl="0" algn="l">
+      <a:lvl3pPr marR="0" lvl="2" algn="l" rtl="0">
         <a:lnSpc>
           <a:spcPct val="100000"/>
         </a:lnSpc>
@@ -5275,7 +5395,7 @@
           <a:srgbClr val="000000"/>
         </a:buClr>
         <a:buFont typeface="Arial"/>
-        <a:defRPr b="0" i="0" sz="1400" u="none" cap="none" strike="noStrike">
+        <a:defRPr sz="1400" b="0" i="0" u="none" strike="noStrike" cap="none">
           <a:solidFill>
             <a:srgbClr val="000000"/>
           </a:solidFill>
@@ -5285,7 +5405,7 @@
           <a:sym typeface="Arial"/>
         </a:defRPr>
       </a:lvl3pPr>
-      <a:lvl4pPr lvl="3" marR="0" rtl="0" algn="l">
+      <a:lvl4pPr marR="0" lvl="3" algn="l" rtl="0">
         <a:lnSpc>
           <a:spcPct val="100000"/>
         </a:lnSpc>
@@ -5299,7 +5419,7 @@
           <a:srgbClr val="000000"/>
         </a:buClr>
         <a:buFont typeface="Arial"/>
-        <a:defRPr b="0" i="0" sz="1400" u="none" cap="none" strike="noStrike">
+        <a:defRPr sz="1400" b="0" i="0" u="none" strike="noStrike" cap="none">
           <a:solidFill>
             <a:srgbClr val="000000"/>
           </a:solidFill>
@@ -5309,7 +5429,7 @@
           <a:sym typeface="Arial"/>
         </a:defRPr>
       </a:lvl4pPr>
-      <a:lvl5pPr lvl="4" marR="0" rtl="0" algn="l">
+      <a:lvl5pPr marR="0" lvl="4" algn="l" rtl="0">
         <a:lnSpc>
           <a:spcPct val="100000"/>
         </a:lnSpc>
@@ -5323,7 +5443,7 @@
           <a:srgbClr val="000000"/>
         </a:buClr>
         <a:buFont typeface="Arial"/>
-        <a:defRPr b="0" i="0" sz="1400" u="none" cap="none" strike="noStrike">
+        <a:defRPr sz="1400" b="0" i="0" u="none" strike="noStrike" cap="none">
           <a:solidFill>
             <a:srgbClr val="000000"/>
           </a:solidFill>
@@ -5333,7 +5453,7 @@
           <a:sym typeface="Arial"/>
         </a:defRPr>
       </a:lvl5pPr>
-      <a:lvl6pPr lvl="5" marR="0" rtl="0" algn="l">
+      <a:lvl6pPr marR="0" lvl="5" algn="l" rtl="0">
         <a:lnSpc>
           <a:spcPct val="100000"/>
         </a:lnSpc>
@@ -5347,7 +5467,7 @@
           <a:srgbClr val="000000"/>
         </a:buClr>
         <a:buFont typeface="Arial"/>
-        <a:defRPr b="0" i="0" sz="1400" u="none" cap="none" strike="noStrike">
+        <a:defRPr sz="1400" b="0" i="0" u="none" strike="noStrike" cap="none">
           <a:solidFill>
             <a:srgbClr val="000000"/>
           </a:solidFill>
@@ -5357,7 +5477,7 @@
           <a:sym typeface="Arial"/>
         </a:defRPr>
       </a:lvl6pPr>
-      <a:lvl7pPr lvl="6" marR="0" rtl="0" algn="l">
+      <a:lvl7pPr marR="0" lvl="6" algn="l" rtl="0">
         <a:lnSpc>
           <a:spcPct val="100000"/>
         </a:lnSpc>
@@ -5371,7 +5491,7 @@
           <a:srgbClr val="000000"/>
         </a:buClr>
         <a:buFont typeface="Arial"/>
-        <a:defRPr b="0" i="0" sz="1400" u="none" cap="none" strike="noStrike">
+        <a:defRPr sz="1400" b="0" i="0" u="none" strike="noStrike" cap="none">
           <a:solidFill>
             <a:srgbClr val="000000"/>
           </a:solidFill>
@@ -5381,7 +5501,7 @@
           <a:sym typeface="Arial"/>
         </a:defRPr>
       </a:lvl7pPr>
-      <a:lvl8pPr lvl="7" marR="0" rtl="0" algn="l">
+      <a:lvl8pPr marR="0" lvl="7" algn="l" rtl="0">
         <a:lnSpc>
           <a:spcPct val="100000"/>
         </a:lnSpc>
@@ -5395,7 +5515,7 @@
           <a:srgbClr val="000000"/>
         </a:buClr>
         <a:buFont typeface="Arial"/>
-        <a:defRPr b="0" i="0" sz="1400" u="none" cap="none" strike="noStrike">
+        <a:defRPr sz="1400" b="0" i="0" u="none" strike="noStrike" cap="none">
           <a:solidFill>
             <a:srgbClr val="000000"/>
           </a:solidFill>
@@ -5405,7 +5525,7 @@
           <a:sym typeface="Arial"/>
         </a:defRPr>
       </a:lvl8pPr>
-      <a:lvl9pPr lvl="8" marR="0" rtl="0" algn="l">
+      <a:lvl9pPr marR="0" lvl="8" algn="l" rtl="0">
         <a:lnSpc>
           <a:spcPct val="100000"/>
         </a:lnSpc>
@@ -5419,7 +5539,7 @@
           <a:srgbClr val="000000"/>
         </a:buClr>
         <a:buFont typeface="Arial"/>
-        <a:defRPr b="0" i="0" sz="1400" u="none" cap="none" strike="noStrike">
+        <a:defRPr sz="1400" b="0" i="0" u="none" strike="noStrike" cap="none">
           <a:solidFill>
             <a:srgbClr val="000000"/>
           </a:solidFill>
@@ -5435,11 +5555,11 @@
 </file>
 
 <file path=ppt/slides/slide1.xml><?xml version="1.0" encoding="utf-8"?>
-<p:sld xmlns:a="http://schemas.openxmlformats.org/drawingml/2006/main" xmlns:r="http://schemas.openxmlformats.org/officeDocument/2006/relationships" xmlns:mc="http://schemas.openxmlformats.org/markup-compatibility/2006" xmlns:mv="urn:schemas-microsoft-com:mac:vml" xmlns:p="http://schemas.openxmlformats.org/presentationml/2006/main" xmlns:c="http://schemas.openxmlformats.org/drawingml/2006/chart" xmlns:dgm="http://schemas.openxmlformats.org/drawingml/2006/diagram" xmlns:o="urn:schemas-microsoft-com:office:office" xmlns:v="urn:schemas-microsoft-com:vml" xmlns:pvml="urn:schemas-microsoft-com:office:powerpoint" xmlns:com="http://schemas.openxmlformats.org/drawingml/2006/compatibility" xmlns:p14="http://schemas.microsoft.com/office/powerpoint/2010/main" xmlns:p15="http://schemas.microsoft.com/office/powerpoint/2012/main">
+<p:sld xmlns:a="http://schemas.openxmlformats.org/drawingml/2006/main" xmlns:r="http://schemas.openxmlformats.org/officeDocument/2006/relationships" xmlns:p="http://schemas.openxmlformats.org/presentationml/2006/main">
   <p:cSld>
     <p:spTree>
       <p:nvGrpSpPr>
-        <p:cNvPr id="53" name="Shape 53"/>
+        <p:cNvPr id="1" name="Shape 53"/>
         <p:cNvGrpSpPr/>
         <p:nvPr/>
       </p:nvGrpSpPr>
@@ -5473,12 +5593,12 @@
           </a:ln>
         </p:spPr>
         <p:txBody>
-          <a:bodyPr anchorCtr="0" anchor="ctr" bIns="91425" lIns="91425" spcFirstLastPara="1" rIns="91425" wrap="square" tIns="91425">
+          <a:bodyPr spcFirstLastPara="1" wrap="square" lIns="91425" tIns="91425" rIns="91425" bIns="91425" anchor="ctr" anchorCtr="0">
             <a:noAutofit/>
           </a:bodyPr>
           <a:lstStyle/>
           <a:p>
-            <a:pPr indent="0" lvl="0" marL="0" rtl="0" algn="ctr">
+            <a:pPr marL="0" lvl="0" indent="0" algn="ctr" rtl="0">
               <a:spcBef>
                 <a:spcPts val="0"/>
               </a:spcBef>
@@ -5503,8 +5623,8 @@
         </p:nvSpPr>
         <p:spPr>
           <a:xfrm>
-            <a:off x="6805175" y="2111425"/>
-            <a:ext cx="1666500" cy="597600"/>
+            <a:off x="6966068" y="2114248"/>
+            <a:ext cx="1742926" cy="597600"/>
           </a:xfrm>
           <a:prstGeom prst="rect">
             <a:avLst/>
@@ -5517,12 +5637,12 @@
           </a:ln>
         </p:spPr>
         <p:txBody>
-          <a:bodyPr anchorCtr="0" anchor="ctr" bIns="91425" lIns="91425" spcFirstLastPara="1" rIns="91425" wrap="square" tIns="91425">
+          <a:bodyPr spcFirstLastPara="1" wrap="square" lIns="91425" tIns="91425" rIns="91425" bIns="91425" anchor="ctr" anchorCtr="0">
             <a:noAutofit/>
           </a:bodyPr>
           <a:lstStyle/>
           <a:p>
-            <a:pPr indent="0" lvl="0" marL="0" rtl="0" algn="ctr">
+            <a:pPr marL="0" lvl="0" indent="0" algn="ctr" rtl="0">
               <a:spcBef>
                 <a:spcPts val="0"/>
               </a:spcBef>
@@ -5532,10 +5652,10 @@
               <a:buNone/>
             </a:pPr>
             <a:r>
-              <a:rPr lang="en" sz="1000"/>
+              <a:rPr lang="en" sz="1000" dirty="0"/>
               <a:t>Deploy cloud configuration or application to environment</a:t>
             </a:r>
-            <a:endParaRPr sz="1000"/>
+            <a:endParaRPr sz="1000" dirty="0"/>
           </a:p>
         </p:txBody>
       </p:sp>
@@ -5561,12 +5681,12 @@
           </a:ln>
         </p:spPr>
         <p:txBody>
-          <a:bodyPr anchorCtr="0" anchor="ctr" bIns="91425" lIns="91425" spcFirstLastPara="1" rIns="91425" wrap="square" tIns="91425">
+          <a:bodyPr spcFirstLastPara="1" wrap="square" lIns="91425" tIns="91425" rIns="91425" bIns="91425" anchor="ctr" anchorCtr="0">
             <a:noAutofit/>
           </a:bodyPr>
           <a:lstStyle/>
           <a:p>
-            <a:pPr indent="0" lvl="0" marL="0" rtl="0" algn="ctr">
+            <a:pPr marL="0" lvl="0" indent="0" algn="ctr" rtl="0">
               <a:spcBef>
                 <a:spcPts val="0"/>
               </a:spcBef>
@@ -5591,8 +5711,8 @@
         </p:nvSpPr>
         <p:spPr>
           <a:xfrm>
-            <a:off x="298375" y="1574400"/>
-            <a:ext cx="1308000" cy="597600"/>
+            <a:off x="179389" y="931959"/>
+            <a:ext cx="1308000" cy="657360"/>
           </a:xfrm>
           <a:prstGeom prst="rect">
             <a:avLst/>
@@ -5605,12 +5725,12 @@
           </a:ln>
         </p:spPr>
         <p:txBody>
-          <a:bodyPr anchorCtr="0" anchor="ctr" bIns="91425" lIns="91425" spcFirstLastPara="1" rIns="91425" wrap="square" tIns="91425">
+          <a:bodyPr spcFirstLastPara="1" wrap="square" lIns="91425" tIns="91425" rIns="91425" bIns="91425" anchor="ctr" anchorCtr="0">
             <a:noAutofit/>
           </a:bodyPr>
           <a:lstStyle/>
           <a:p>
-            <a:pPr indent="0" lvl="0" marL="0" rtl="0" algn="ctr">
+            <a:pPr marL="0" lvl="0" indent="0" algn="ctr" rtl="0">
               <a:spcBef>
                 <a:spcPts val="0"/>
               </a:spcBef>
@@ -5635,7 +5755,7 @@
         </p:nvSpPr>
         <p:spPr>
           <a:xfrm>
-            <a:off x="298375" y="2672300"/>
+            <a:off x="259287" y="3102553"/>
             <a:ext cx="1308000" cy="597600"/>
           </a:xfrm>
           <a:prstGeom prst="rect">
@@ -5649,12 +5769,12 @@
           </a:ln>
         </p:spPr>
         <p:txBody>
-          <a:bodyPr anchorCtr="0" anchor="ctr" bIns="91425" lIns="91425" spcFirstLastPara="1" rIns="91425" wrap="square" tIns="91425">
+          <a:bodyPr spcFirstLastPara="1" wrap="square" lIns="91425" tIns="91425" rIns="91425" bIns="91425" anchor="ctr" anchorCtr="0">
             <a:noAutofit/>
           </a:bodyPr>
           <a:lstStyle/>
           <a:p>
-            <a:pPr indent="0" lvl="0" marL="0" rtl="0" algn="ctr">
+            <a:pPr marL="0" lvl="0" indent="0" algn="ctr" rtl="0">
               <a:spcBef>
                 <a:spcPts val="0"/>
               </a:spcBef>
@@ -5665,11 +5785,7 @@
             </a:pPr>
             <a:r>
               <a:rPr lang="en" sz="1000"/>
-              <a:t>Infrastructure</a:t>
-            </a:r>
-            <a:r>
-              <a:rPr lang="en" sz="1000"/>
-              <a:t> code change</a:t>
+              <a:t>Infrastructure code change</a:t>
             </a:r>
             <a:endParaRPr sz="1000"/>
           </a:p>
@@ -5679,28 +5795,31 @@
         <p:nvCxnSpPr>
           <p:cNvPr id="59" name="Google Shape;59;p13"/>
           <p:cNvCxnSpPr>
+            <a:cxnSpLocks/>
             <a:stCxn id="57" idx="3"/>
-            <a:endCxn id="54" idx="0"/>
+            <a:endCxn id="28" idx="1"/>
           </p:cNvCxnSpPr>
           <p:nvPr/>
         </p:nvCxnSpPr>
         <p:spPr>
-          <a:xfrm>
-            <a:off x="1606375" y="1873200"/>
-            <a:ext cx="1488900" cy="238200"/>
+          <a:xfrm flipV="1">
+            <a:off x="1487389" y="1260530"/>
+            <a:ext cx="953886" cy="109"/>
           </a:xfrm>
-          <a:prstGeom prst="bentConnector2">
-            <a:avLst/>
+          <a:prstGeom prst="bentConnector3">
+            <a:avLst>
+              <a:gd name="adj1" fmla="val 50000"/>
+            </a:avLst>
           </a:prstGeom>
           <a:noFill/>
-          <a:ln cap="flat" cmpd="sng" w="9525">
+          <a:ln w="9525" cap="flat" cmpd="sng">
             <a:solidFill>
               <a:schemeClr val="dk2"/>
             </a:solidFill>
             <a:prstDash val="solid"/>
             <a:round/>
-            <a:headEnd len="med" w="med" type="none"/>
-            <a:tailEnd len="med" w="med" type="triangle"/>
+            <a:headEnd type="none" w="med" len="med"/>
+            <a:tailEnd type="triangle" w="med" len="med"/>
           </a:ln>
         </p:spPr>
       </p:cxnSp>
@@ -5708,28 +5827,31 @@
         <p:nvCxnSpPr>
           <p:cNvPr id="60" name="Google Shape;60;p13"/>
           <p:cNvCxnSpPr>
+            <a:cxnSpLocks/>
             <a:stCxn id="58" idx="3"/>
-            <a:endCxn id="56" idx="2"/>
+            <a:endCxn id="12" idx="1"/>
           </p:cNvCxnSpPr>
           <p:nvPr/>
         </p:nvCxnSpPr>
         <p:spPr>
-          <a:xfrm flipH="1" rot="10800000">
-            <a:off x="1606375" y="2708900"/>
-            <a:ext cx="3670800" cy="262200"/>
+          <a:xfrm flipV="1">
+            <a:off x="1567287" y="3400018"/>
+            <a:ext cx="873988" cy="1335"/>
           </a:xfrm>
-          <a:prstGeom prst="bentConnector2">
-            <a:avLst/>
+          <a:prstGeom prst="bentConnector3">
+            <a:avLst>
+              <a:gd name="adj1" fmla="val 50000"/>
+            </a:avLst>
           </a:prstGeom>
           <a:noFill/>
-          <a:ln cap="flat" cmpd="sng" w="9525">
+          <a:ln w="9525" cap="flat" cmpd="sng">
             <a:solidFill>
               <a:schemeClr val="dk2"/>
             </a:solidFill>
             <a:prstDash val="solid"/>
             <a:round/>
-            <a:headEnd len="med" w="med" type="none"/>
-            <a:tailEnd len="med" w="med" type="triangle"/>
+            <a:headEnd type="none" w="med" len="med"/>
+            <a:tailEnd type="triangle" w="med" len="med"/>
           </a:ln>
         </p:spPr>
       </p:cxnSp>
@@ -5749,25 +5871,548 @@
           </a:xfrm>
           <a:prstGeom prst="bentConnector3">
             <a:avLst>
-              <a:gd fmla="val 50000" name="adj1"/>
+              <a:gd name="adj1" fmla="val 50000"/>
             </a:avLst>
           </a:prstGeom>
           <a:noFill/>
-          <a:ln cap="flat" cmpd="sng" w="9525">
+          <a:ln w="9525" cap="flat" cmpd="sng">
             <a:solidFill>
               <a:schemeClr val="dk2"/>
             </a:solidFill>
             <a:prstDash val="solid"/>
             <a:round/>
-            <a:headEnd len="med" w="med" type="none"/>
-            <a:tailEnd len="med" w="med" type="triangle"/>
+            <a:headEnd type="none" w="med" len="med"/>
+            <a:tailEnd type="triangle" w="med" len="med"/>
+          </a:ln>
+        </p:spPr>
+      </p:cxnSp>
+      <p:sp>
+        <p:nvSpPr>
+          <p:cNvPr id="12" name="Google Shape;57;p13">
+            <a:extLst>
+              <a:ext uri="{FF2B5EF4-FFF2-40B4-BE49-F238E27FC236}">
+                <a16:creationId xmlns:a16="http://schemas.microsoft.com/office/drawing/2014/main" id="{F56ED5D1-2AA5-5143-849D-A9E5243F1BAE}"/>
+              </a:ext>
+            </a:extLst>
+          </p:cNvPr>
+          <p:cNvSpPr/>
+          <p:nvPr/>
+        </p:nvSpPr>
+        <p:spPr>
+          <a:xfrm>
+            <a:off x="2441275" y="3101218"/>
+            <a:ext cx="1308000" cy="597600"/>
+          </a:xfrm>
+          <a:prstGeom prst="rect">
+            <a:avLst/>
+          </a:prstGeom>
+          <a:solidFill>
+            <a:schemeClr val="accent6">
+              <a:lumMod val="50000"/>
+            </a:schemeClr>
+          </a:solidFill>
+          <a:ln>
+            <a:noFill/>
+          </a:ln>
+        </p:spPr>
+        <p:txBody>
+          <a:bodyPr spcFirstLastPara="1" wrap="square" lIns="91425" tIns="91425" rIns="91425" bIns="91425" anchor="ctr" anchorCtr="0">
+            <a:noAutofit/>
+          </a:bodyPr>
+          <a:lstStyle/>
+          <a:p>
+            <a:pPr marL="0" lvl="0" indent="0" algn="ctr" rtl="0">
+              <a:spcBef>
+                <a:spcPts val="0"/>
+              </a:spcBef>
+              <a:spcAft>
+                <a:spcPts val="0"/>
+              </a:spcAft>
+              <a:buNone/>
+            </a:pPr>
+            <a:r>
+              <a:rPr lang="en-US" sz="1000" dirty="0" err="1"/>
+              <a:t>IaC</a:t>
+            </a:r>
+            <a:r>
+              <a:rPr lang="en-US" sz="1000" dirty="0"/>
+              <a:t> Static Code Analysis</a:t>
+            </a:r>
+            <a:endParaRPr sz="1000" dirty="0"/>
+          </a:p>
+        </p:txBody>
+      </p:sp>
+      <p:cxnSp>
+        <p:nvCxnSpPr>
+          <p:cNvPr id="16" name="Google Shape;60;p13">
+            <a:extLst>
+              <a:ext uri="{FF2B5EF4-FFF2-40B4-BE49-F238E27FC236}">
+                <a16:creationId xmlns:a16="http://schemas.microsoft.com/office/drawing/2014/main" id="{2DD7501A-776F-0340-9626-CBCDD3CA044E}"/>
+              </a:ext>
+            </a:extLst>
+          </p:cNvPr>
+          <p:cNvCxnSpPr>
+            <a:cxnSpLocks/>
+            <a:stCxn id="12" idx="3"/>
+            <a:endCxn id="56" idx="2"/>
+          </p:cNvCxnSpPr>
+          <p:nvPr/>
+        </p:nvCxnSpPr>
+        <p:spPr>
+          <a:xfrm flipV="1">
+            <a:off x="3749275" y="2709025"/>
+            <a:ext cx="1527988" cy="690993"/>
+          </a:xfrm>
+          <a:prstGeom prst="bentConnector2">
+            <a:avLst/>
+          </a:prstGeom>
+          <a:noFill/>
+          <a:ln w="9525" cap="flat" cmpd="sng">
+            <a:solidFill>
+              <a:schemeClr val="dk2"/>
+            </a:solidFill>
+            <a:prstDash val="solid"/>
+            <a:round/>
+            <a:headEnd type="none" w="med" len="med"/>
+            <a:tailEnd type="triangle" w="med" len="med"/>
+          </a:ln>
+        </p:spPr>
+      </p:cxnSp>
+      <p:sp>
+        <p:nvSpPr>
+          <p:cNvPr id="19" name="Google Shape;57;p13">
+            <a:extLst>
+              <a:ext uri="{FF2B5EF4-FFF2-40B4-BE49-F238E27FC236}">
+                <a16:creationId xmlns:a16="http://schemas.microsoft.com/office/drawing/2014/main" id="{8E63E854-2402-D44C-B52A-B77ADCA5C396}"/>
+              </a:ext>
+            </a:extLst>
+          </p:cNvPr>
+          <p:cNvSpPr/>
+          <p:nvPr/>
+        </p:nvSpPr>
+        <p:spPr>
+          <a:xfrm>
+            <a:off x="3095275" y="4658709"/>
+            <a:ext cx="2577531" cy="390550"/>
+          </a:xfrm>
+          <a:prstGeom prst="rect">
+            <a:avLst/>
+          </a:prstGeom>
+          <a:solidFill>
+            <a:schemeClr val="accent1">
+              <a:lumMod val="60000"/>
+              <a:lumOff val="40000"/>
+            </a:schemeClr>
+          </a:solidFill>
+          <a:ln>
+            <a:noFill/>
+          </a:ln>
+        </p:spPr>
+        <p:txBody>
+          <a:bodyPr spcFirstLastPara="1" wrap="square" lIns="91425" tIns="91425" rIns="91425" bIns="91425" anchor="ctr" anchorCtr="0">
+            <a:noAutofit/>
+          </a:bodyPr>
+          <a:lstStyle/>
+          <a:p>
+            <a:pPr marL="0" lvl="0" indent="0" algn="ctr" rtl="0">
+              <a:spcBef>
+                <a:spcPts val="0"/>
+              </a:spcBef>
+              <a:spcAft>
+                <a:spcPts val="0"/>
+              </a:spcAft>
+              <a:buNone/>
+            </a:pPr>
+            <a:r>
+              <a:rPr lang="en-US" sz="1000" dirty="0"/>
+              <a:t>Security Monitoring</a:t>
+            </a:r>
+          </a:p>
+        </p:txBody>
+      </p:sp>
+      <p:sp>
+        <p:nvSpPr>
+          <p:cNvPr id="28" name="Google Shape;57;p13">
+            <a:extLst>
+              <a:ext uri="{FF2B5EF4-FFF2-40B4-BE49-F238E27FC236}">
+                <a16:creationId xmlns:a16="http://schemas.microsoft.com/office/drawing/2014/main" id="{61D31E48-D809-5B4B-AF63-B33C8FE5F8F6}"/>
+              </a:ext>
+            </a:extLst>
+          </p:cNvPr>
+          <p:cNvSpPr/>
+          <p:nvPr/>
+        </p:nvSpPr>
+        <p:spPr>
+          <a:xfrm>
+            <a:off x="2441275" y="961730"/>
+            <a:ext cx="1308000" cy="597600"/>
+          </a:xfrm>
+          <a:prstGeom prst="rect">
+            <a:avLst/>
+          </a:prstGeom>
+          <a:solidFill>
+            <a:schemeClr val="accent6">
+              <a:lumMod val="50000"/>
+            </a:schemeClr>
+          </a:solidFill>
+          <a:ln>
+            <a:noFill/>
+          </a:ln>
+        </p:spPr>
+        <p:txBody>
+          <a:bodyPr spcFirstLastPara="1" wrap="square" lIns="91425" tIns="91425" rIns="91425" bIns="91425" anchor="ctr" anchorCtr="0">
+            <a:noAutofit/>
+          </a:bodyPr>
+          <a:lstStyle/>
+          <a:p>
+            <a:pPr marL="0" lvl="0" indent="0" algn="ctr" rtl="0">
+              <a:spcBef>
+                <a:spcPts val="0"/>
+              </a:spcBef>
+              <a:spcAft>
+                <a:spcPts val="0"/>
+              </a:spcAft>
+              <a:buNone/>
+            </a:pPr>
+            <a:r>
+              <a:rPr lang="en-US" sz="1000" dirty="0"/>
+              <a:t>OS/Container Static Vulnerability Scan</a:t>
+            </a:r>
+            <a:endParaRPr sz="1000" dirty="0"/>
+          </a:p>
+        </p:txBody>
+      </p:sp>
+      <p:cxnSp>
+        <p:nvCxnSpPr>
+          <p:cNvPr id="36" name="Google Shape;59;p13">
+            <a:extLst>
+              <a:ext uri="{FF2B5EF4-FFF2-40B4-BE49-F238E27FC236}">
+                <a16:creationId xmlns:a16="http://schemas.microsoft.com/office/drawing/2014/main" id="{4A10FB2D-CD1D-D84F-8ACA-ACCBD80C364E}"/>
+              </a:ext>
+            </a:extLst>
+          </p:cNvPr>
+          <p:cNvCxnSpPr>
+            <a:cxnSpLocks/>
+            <a:stCxn id="28" idx="2"/>
+            <a:endCxn id="54" idx="0"/>
+          </p:cNvCxnSpPr>
+          <p:nvPr/>
+        </p:nvCxnSpPr>
+        <p:spPr>
+          <a:xfrm rot="16200000" flipH="1">
+            <a:off x="2819272" y="1835333"/>
+            <a:ext cx="552095" cy="88"/>
+          </a:xfrm>
+          <a:prstGeom prst="bentConnector3">
+            <a:avLst>
+              <a:gd name="adj1" fmla="val 50000"/>
+            </a:avLst>
+          </a:prstGeom>
+          <a:noFill/>
+          <a:ln w="9525" cap="flat" cmpd="sng">
+            <a:solidFill>
+              <a:schemeClr val="dk2"/>
+            </a:solidFill>
+            <a:prstDash val="solid"/>
+            <a:round/>
+            <a:headEnd type="none" w="med" len="med"/>
+            <a:tailEnd type="triangle" w="med" len="med"/>
+          </a:ln>
+        </p:spPr>
+      </p:cxnSp>
+      <p:sp>
+        <p:nvSpPr>
+          <p:cNvPr id="29" name="CaixaDeTexto 28">
+            <a:extLst>
+              <a:ext uri="{FF2B5EF4-FFF2-40B4-BE49-F238E27FC236}">
+                <a16:creationId xmlns:a16="http://schemas.microsoft.com/office/drawing/2014/main" id="{12D44720-20CA-8740-9DEC-6EEDFF00CC15}"/>
+              </a:ext>
+            </a:extLst>
+          </p:cNvPr>
+          <p:cNvSpPr txBox="1"/>
+          <p:nvPr/>
+        </p:nvSpPr>
+        <p:spPr>
+          <a:xfrm>
+            <a:off x="4073610" y="3138203"/>
+            <a:ext cx="821059" cy="261610"/>
+          </a:xfrm>
+          <a:prstGeom prst="rect">
+            <a:avLst/>
+          </a:prstGeom>
+          <a:noFill/>
+        </p:spPr>
+        <p:txBody>
+          <a:bodyPr wrap="none" rtlCol="0">
+            <a:spAutoFit/>
+          </a:bodyPr>
+          <a:lstStyle/>
+          <a:p>
+            <a:r>
+              <a:rPr lang="pt-BR" sz="1100" dirty="0" err="1"/>
+              <a:t>Compliant</a:t>
+            </a:r>
+            <a:endParaRPr lang="pt-BR" sz="1100" dirty="0"/>
+          </a:p>
+        </p:txBody>
+      </p:sp>
+      <p:sp>
+        <p:nvSpPr>
+          <p:cNvPr id="40" name="CaixaDeTexto 39">
+            <a:extLst>
+              <a:ext uri="{FF2B5EF4-FFF2-40B4-BE49-F238E27FC236}">
+                <a16:creationId xmlns:a16="http://schemas.microsoft.com/office/drawing/2014/main" id="{D808A113-BEFB-D24F-B8B6-5EEB7A8BB64E}"/>
+              </a:ext>
+            </a:extLst>
+          </p:cNvPr>
+          <p:cNvSpPr txBox="1"/>
+          <p:nvPr/>
+        </p:nvSpPr>
+        <p:spPr>
+          <a:xfrm>
+            <a:off x="3097176" y="1681820"/>
+            <a:ext cx="821059" cy="261610"/>
+          </a:xfrm>
+          <a:prstGeom prst="rect">
+            <a:avLst/>
+          </a:prstGeom>
+          <a:noFill/>
+        </p:spPr>
+        <p:txBody>
+          <a:bodyPr wrap="none" rtlCol="0">
+            <a:spAutoFit/>
+          </a:bodyPr>
+          <a:lstStyle/>
+          <a:p>
+            <a:r>
+              <a:rPr lang="pt-BR" sz="1100" dirty="0" err="1"/>
+              <a:t>Compliant</a:t>
+            </a:r>
+            <a:endParaRPr lang="pt-BR" sz="1100" dirty="0"/>
+          </a:p>
+        </p:txBody>
+      </p:sp>
+      <p:sp>
+        <p:nvSpPr>
+          <p:cNvPr id="30" name="Seta para a Direita 29">
+            <a:extLst>
+              <a:ext uri="{FF2B5EF4-FFF2-40B4-BE49-F238E27FC236}">
+                <a16:creationId xmlns:a16="http://schemas.microsoft.com/office/drawing/2014/main" id="{E2A7B391-E328-9648-9864-E49CE20D50CE}"/>
+              </a:ext>
+            </a:extLst>
+          </p:cNvPr>
+          <p:cNvSpPr/>
+          <p:nvPr/>
+        </p:nvSpPr>
+        <p:spPr>
+          <a:xfrm>
+            <a:off x="259287" y="4390941"/>
+            <a:ext cx="8449707" cy="270180"/>
+          </a:xfrm>
+          <a:prstGeom prst="rightArrow">
+            <a:avLst/>
+          </a:prstGeom>
+        </p:spPr>
+        <p:style>
+          <a:lnRef idx="2">
+            <a:schemeClr val="accent1">
+              <a:shade val="50000"/>
+            </a:schemeClr>
+          </a:lnRef>
+          <a:fillRef idx="1">
+            <a:schemeClr val="accent1"/>
+          </a:fillRef>
+          <a:effectRef idx="0">
+            <a:schemeClr val="accent1"/>
+          </a:effectRef>
+          <a:fontRef idx="minor">
+            <a:schemeClr val="lt1"/>
+          </a:fontRef>
+        </p:style>
+        <p:txBody>
+          <a:bodyPr rtlCol="0" anchor="ctr"/>
+          <a:lstStyle/>
+          <a:p>
+            <a:pPr algn="ctr"/>
+            <a:endParaRPr lang="pt-BR"/>
+          </a:p>
+        </p:txBody>
+      </p:sp>
+      <p:cxnSp>
+        <p:nvCxnSpPr>
+          <p:cNvPr id="42" name="Google Shape;59;p13">
+            <a:extLst>
+              <a:ext uri="{FF2B5EF4-FFF2-40B4-BE49-F238E27FC236}">
+                <a16:creationId xmlns:a16="http://schemas.microsoft.com/office/drawing/2014/main" id="{6D20D779-9767-E14A-8059-A3C1E616226D}"/>
+              </a:ext>
+            </a:extLst>
+          </p:cNvPr>
+          <p:cNvCxnSpPr>
+            <a:cxnSpLocks/>
+            <a:stCxn id="28" idx="0"/>
+            <a:endCxn id="57" idx="0"/>
+          </p:cNvCxnSpPr>
+          <p:nvPr/>
+        </p:nvCxnSpPr>
+        <p:spPr>
+          <a:xfrm rot="16200000" flipV="1">
+            <a:off x="1949447" y="-184098"/>
+            <a:ext cx="29771" cy="2261886"/>
+          </a:xfrm>
+          <a:prstGeom prst="bentConnector3">
+            <a:avLst>
+              <a:gd name="adj1" fmla="val 867861"/>
+            </a:avLst>
+          </a:prstGeom>
+          <a:noFill/>
+          <a:ln w="9525" cap="flat" cmpd="sng">
+            <a:solidFill>
+              <a:schemeClr val="dk2"/>
+            </a:solidFill>
+            <a:prstDash val="solid"/>
+            <a:round/>
+            <a:headEnd type="none" w="med" len="med"/>
+            <a:tailEnd type="triangle" w="med" len="med"/>
           </a:ln>
         </p:spPr>
       </p:cxnSp>
       <p:cxnSp>
         <p:nvCxnSpPr>
-          <p:cNvPr id="62" name="Google Shape;62;p13"/>
+          <p:cNvPr id="45" name="Google Shape;59;p13">
+            <a:extLst>
+              <a:ext uri="{FF2B5EF4-FFF2-40B4-BE49-F238E27FC236}">
+                <a16:creationId xmlns:a16="http://schemas.microsoft.com/office/drawing/2014/main" id="{D75F6B53-0B1E-AC46-B316-5DB8CBDF5835}"/>
+              </a:ext>
+            </a:extLst>
+          </p:cNvPr>
           <p:cNvCxnSpPr>
+            <a:cxnSpLocks/>
+            <a:stCxn id="12" idx="2"/>
+            <a:endCxn id="58" idx="2"/>
+          </p:cNvCxnSpPr>
+          <p:nvPr/>
+        </p:nvCxnSpPr>
+        <p:spPr>
+          <a:xfrm rot="5400000">
+            <a:off x="2003614" y="2608491"/>
+            <a:ext cx="1335" cy="2181988"/>
+          </a:xfrm>
+          <a:prstGeom prst="bentConnector3">
+            <a:avLst>
+              <a:gd name="adj1" fmla="val 17223596"/>
+            </a:avLst>
+          </a:prstGeom>
+          <a:noFill/>
+          <a:ln w="9525" cap="flat" cmpd="sng">
+            <a:solidFill>
+              <a:schemeClr val="dk2"/>
+            </a:solidFill>
+            <a:prstDash val="solid"/>
+            <a:round/>
+            <a:headEnd type="none" w="med" len="med"/>
+            <a:tailEnd type="triangle" w="med" len="med"/>
+          </a:ln>
+        </p:spPr>
+      </p:cxnSp>
+      <p:sp>
+        <p:nvSpPr>
+          <p:cNvPr id="48" name="CaixaDeTexto 47">
+            <a:extLst>
+              <a:ext uri="{FF2B5EF4-FFF2-40B4-BE49-F238E27FC236}">
+                <a16:creationId xmlns:a16="http://schemas.microsoft.com/office/drawing/2014/main" id="{AF142644-CD2B-094E-94DF-852D0F59F5FE}"/>
+              </a:ext>
+            </a:extLst>
+          </p:cNvPr>
+          <p:cNvSpPr txBox="1"/>
+          <p:nvPr/>
+        </p:nvSpPr>
+        <p:spPr>
+          <a:xfrm>
+            <a:off x="1464710" y="419915"/>
+            <a:ext cx="1079142" cy="261610"/>
+          </a:xfrm>
+          <a:prstGeom prst="rect">
+            <a:avLst/>
+          </a:prstGeom>
+          <a:noFill/>
+        </p:spPr>
+        <p:txBody>
+          <a:bodyPr wrap="none" rtlCol="0">
+            <a:spAutoFit/>
+          </a:bodyPr>
+          <a:lstStyle/>
+          <a:p>
+            <a:r>
+              <a:rPr lang="pt-BR" sz="1100" dirty="0" err="1"/>
+              <a:t>Not</a:t>
+            </a:r>
+            <a:r>
+              <a:rPr lang="pt-BR" sz="1100" dirty="0"/>
+              <a:t> </a:t>
+            </a:r>
+            <a:r>
+              <a:rPr lang="pt-BR" sz="1100" dirty="0" err="1"/>
+              <a:t>Compliant</a:t>
+            </a:r>
+            <a:endParaRPr lang="pt-BR" sz="1100" dirty="0"/>
+          </a:p>
+        </p:txBody>
+      </p:sp>
+      <p:sp>
+        <p:nvSpPr>
+          <p:cNvPr id="49" name="CaixaDeTexto 48">
+            <a:extLst>
+              <a:ext uri="{FF2B5EF4-FFF2-40B4-BE49-F238E27FC236}">
+                <a16:creationId xmlns:a16="http://schemas.microsoft.com/office/drawing/2014/main" id="{38430DAA-68D9-CF49-BE54-ED04C874AA0C}"/>
+              </a:ext>
+            </a:extLst>
+          </p:cNvPr>
+          <p:cNvSpPr txBox="1"/>
+          <p:nvPr/>
+        </p:nvSpPr>
+        <p:spPr>
+          <a:xfrm>
+            <a:off x="1362133" y="3960953"/>
+            <a:ext cx="1079142" cy="261610"/>
+          </a:xfrm>
+          <a:prstGeom prst="rect">
+            <a:avLst/>
+          </a:prstGeom>
+          <a:noFill/>
+        </p:spPr>
+        <p:txBody>
+          <a:bodyPr wrap="none" rtlCol="0">
+            <a:spAutoFit/>
+          </a:bodyPr>
+          <a:lstStyle/>
+          <a:p>
+            <a:r>
+              <a:rPr lang="pt-BR" sz="1100" dirty="0" err="1"/>
+              <a:t>Not</a:t>
+            </a:r>
+            <a:r>
+              <a:rPr lang="pt-BR" sz="1100" dirty="0"/>
+              <a:t> </a:t>
+            </a:r>
+            <a:r>
+              <a:rPr lang="pt-BR" sz="1100" dirty="0" err="1"/>
+              <a:t>Compliant</a:t>
+            </a:r>
+            <a:endParaRPr lang="pt-BR" sz="1100" dirty="0"/>
+          </a:p>
+        </p:txBody>
+      </p:sp>
+      <p:cxnSp>
+        <p:nvCxnSpPr>
+          <p:cNvPr id="65" name="Google Shape;60;p13">
+            <a:extLst>
+              <a:ext uri="{FF2B5EF4-FFF2-40B4-BE49-F238E27FC236}">
+                <a16:creationId xmlns:a16="http://schemas.microsoft.com/office/drawing/2014/main" id="{377EB9B2-888D-7642-A793-3FD2AB3C9DE7}"/>
+              </a:ext>
+            </a:extLst>
+          </p:cNvPr>
+          <p:cNvCxnSpPr>
+            <a:cxnSpLocks/>
             <a:stCxn id="56" idx="3"/>
             <a:endCxn id="55" idx="1"/>
           </p:cNvCxnSpPr>
@@ -5776,25 +6421,74 @@
         <p:spPr>
           <a:xfrm>
             <a:off x="5931263" y="2410225"/>
-            <a:ext cx="873900" cy="600"/>
+            <a:ext cx="1034805" cy="2823"/>
           </a:xfrm>
           <a:prstGeom prst="bentConnector3">
             <a:avLst>
-              <a:gd fmla="val 50001" name="adj1"/>
+              <a:gd name="adj1" fmla="val 50000"/>
             </a:avLst>
           </a:prstGeom>
           <a:noFill/>
-          <a:ln cap="flat" cmpd="sng" w="9525">
+          <a:ln w="9525" cap="flat" cmpd="sng">
             <a:solidFill>
               <a:schemeClr val="dk2"/>
             </a:solidFill>
             <a:prstDash val="solid"/>
             <a:round/>
-            <a:headEnd len="med" w="med" type="none"/>
-            <a:tailEnd len="med" w="med" type="triangle"/>
+            <a:headEnd type="none" w="med" len="med"/>
+            <a:tailEnd type="triangle" w="med" len="med"/>
           </a:ln>
         </p:spPr>
       </p:cxnSp>
+      <p:sp>
+        <p:nvSpPr>
+          <p:cNvPr id="66" name="Google Shape;57;p13">
+            <a:extLst>
+              <a:ext uri="{FF2B5EF4-FFF2-40B4-BE49-F238E27FC236}">
+                <a16:creationId xmlns:a16="http://schemas.microsoft.com/office/drawing/2014/main" id="{1E259183-7B83-A844-BDB9-B4EF53167B63}"/>
+              </a:ext>
+            </a:extLst>
+          </p:cNvPr>
+          <p:cNvSpPr/>
+          <p:nvPr/>
+        </p:nvSpPr>
+        <p:spPr>
+          <a:xfrm>
+            <a:off x="6221695" y="355445"/>
+            <a:ext cx="2577531" cy="576514"/>
+          </a:xfrm>
+          <a:prstGeom prst="rect">
+            <a:avLst/>
+          </a:prstGeom>
+          <a:solidFill>
+            <a:srgbClr val="C00000"/>
+          </a:solidFill>
+          <a:ln>
+            <a:noFill/>
+          </a:ln>
+        </p:spPr>
+        <p:txBody>
+          <a:bodyPr spcFirstLastPara="1" wrap="square" lIns="91425" tIns="91425" rIns="91425" bIns="91425" anchor="ctr" anchorCtr="0">
+            <a:noAutofit/>
+          </a:bodyPr>
+          <a:lstStyle/>
+          <a:p>
+            <a:pPr marL="0" lvl="0" indent="0" algn="ctr" rtl="0">
+              <a:spcBef>
+                <a:spcPts val="0"/>
+              </a:spcBef>
+              <a:spcAft>
+                <a:spcPts val="0"/>
+              </a:spcAft>
+              <a:buNone/>
+            </a:pPr>
+            <a:r>
+              <a:rPr lang="en-US" sz="1000" dirty="0"/>
+              <a:t>Pipeline to be applied in all environments</a:t>
+            </a:r>
+          </a:p>
+        </p:txBody>
+      </p:sp>
     </p:spTree>
   </p:cSld>
   <p:clrMapOvr>
@@ -5804,7 +6498,288 @@
 </file>
 
 <file path=ppt/theme/theme1.xml><?xml version="1.0" encoding="utf-8"?>
-<a:theme xmlns:a="http://schemas.openxmlformats.org/drawingml/2006/main" xmlns:r="http://schemas.openxmlformats.org/officeDocument/2006/relationships">
+<a:theme xmlns:a="http://schemas.openxmlformats.org/drawingml/2006/main" name="Simple Light">
+  <a:themeElements>
+    <a:clrScheme name="Simple Light">
+      <a:dk1>
+        <a:srgbClr val="000000"/>
+      </a:dk1>
+      <a:lt1>
+        <a:srgbClr val="FFFFFF"/>
+      </a:lt1>
+      <a:dk2>
+        <a:srgbClr val="595959"/>
+      </a:dk2>
+      <a:lt2>
+        <a:srgbClr val="EEEEEE"/>
+      </a:lt2>
+      <a:accent1>
+        <a:srgbClr val="FFAB40"/>
+      </a:accent1>
+      <a:accent2>
+        <a:srgbClr val="212121"/>
+      </a:accent2>
+      <a:accent3>
+        <a:srgbClr val="78909C"/>
+      </a:accent3>
+      <a:accent4>
+        <a:srgbClr val="FFAB40"/>
+      </a:accent4>
+      <a:accent5>
+        <a:srgbClr val="0097A7"/>
+      </a:accent5>
+      <a:accent6>
+        <a:srgbClr val="EEFF41"/>
+      </a:accent6>
+      <a:hlink>
+        <a:srgbClr val="0097A7"/>
+      </a:hlink>
+      <a:folHlink>
+        <a:srgbClr val="0097A7"/>
+      </a:folHlink>
+    </a:clrScheme>
+    <a:fontScheme name="Office">
+      <a:majorFont>
+        <a:latin typeface="Arial"/>
+        <a:ea typeface=""/>
+        <a:cs typeface=""/>
+        <a:font script="Jpan" typeface="ＭＳ Ｐゴシック"/>
+        <a:font script="Hang" typeface="맑은 고딕"/>
+        <a:font script="Hans" typeface="宋体"/>
+        <a:font script="Hant" typeface="新細明體"/>
+        <a:font script="Arab" typeface="Times New Roman"/>
+        <a:font script="Hebr" typeface="Times New Roman"/>
+        <a:font script="Thai" typeface="Angsana New"/>
+        <a:font script="Ethi" typeface="Nyala"/>
+        <a:font script="Beng" typeface="Vrinda"/>
+        <a:font script="Gujr" typeface="Shruti"/>
+        <a:font script="Khmr" typeface="MoolBoran"/>
+        <a:font script="Knda" typeface="Tunga"/>
+        <a:font script="Guru" typeface="Raavi"/>
+        <a:font script="Cans" typeface="Euphemia"/>
+        <a:font script="Cher" typeface="Plantagenet Cherokee"/>
+        <a:font script="Yiii" typeface="Microsoft Yi Baiti"/>
+        <a:font script="Tibt" typeface="Microsoft Himalaya"/>
+        <a:font script="Thaa" typeface="MV Boli"/>
+        <a:font script="Deva" typeface="Mangal"/>
+        <a:font script="Telu" typeface="Gautami"/>
+        <a:font script="Taml" typeface="Latha"/>
+        <a:font script="Syrc" typeface="Estrangelo Edessa"/>
+        <a:font script="Orya" typeface="Kalinga"/>
+        <a:font script="Mlym" typeface="Kartika"/>
+        <a:font script="Laoo" typeface="DokChampa"/>
+        <a:font script="Sinh" typeface="Iskoola Pota"/>
+        <a:font script="Mong" typeface="Mongolian Baiti"/>
+        <a:font script="Viet" typeface="Times New Roman"/>
+        <a:font script="Uigh" typeface="Microsoft Uighur"/>
+        <a:font script="Geor" typeface="Sylfaen"/>
+      </a:majorFont>
+      <a:minorFont>
+        <a:latin typeface="Arial"/>
+        <a:ea typeface=""/>
+        <a:cs typeface=""/>
+        <a:font script="Jpan" typeface="ＭＳ Ｐゴシック"/>
+        <a:font script="Hang" typeface="맑은 고딕"/>
+        <a:font script="Hans" typeface="宋体"/>
+        <a:font script="Hant" typeface="新細明體"/>
+        <a:font script="Arab" typeface="Arial"/>
+        <a:font script="Hebr" typeface="Arial"/>
+        <a:font script="Thai" typeface="Cordia New"/>
+        <a:font script="Ethi" typeface="Nyala"/>
+        <a:font script="Beng" typeface="Vrinda"/>
+        <a:font script="Gujr" typeface="Shruti"/>
+        <a:font script="Khmr" typeface="DaunPenh"/>
+        <a:font script="Knda" typeface="Tunga"/>
+        <a:font script="Guru" typeface="Raavi"/>
+        <a:font script="Cans" typeface="Euphemia"/>
+        <a:font script="Cher" typeface="Plantagenet Cherokee"/>
+        <a:font script="Yiii" typeface="Microsoft Yi Baiti"/>
+        <a:font script="Tibt" typeface="Microsoft Himalaya"/>
+        <a:font script="Thaa" typeface="MV Boli"/>
+        <a:font script="Deva" typeface="Mangal"/>
+        <a:font script="Telu" typeface="Gautami"/>
+        <a:font script="Taml" typeface="Latha"/>
+        <a:font script="Syrc" typeface="Estrangelo Edessa"/>
+        <a:font script="Orya" typeface="Kalinga"/>
+        <a:font script="Mlym" typeface="Kartika"/>
+        <a:font script="Laoo" typeface="DokChampa"/>
+        <a:font script="Sinh" typeface="Iskoola Pota"/>
+        <a:font script="Mong" typeface="Mongolian Baiti"/>
+        <a:font script="Viet" typeface="Arial"/>
+        <a:font script="Uigh" typeface="Microsoft Uighur"/>
+        <a:font script="Geor" typeface="Sylfaen"/>
+      </a:minorFont>
+    </a:fontScheme>
+    <a:fmtScheme name="Office">
+      <a:fillStyleLst>
+        <a:solidFill>
+          <a:schemeClr val="phClr"/>
+        </a:solidFill>
+        <a:gradFill rotWithShape="1">
+          <a:gsLst>
+            <a:gs pos="0">
+              <a:schemeClr val="phClr">
+                <a:tint val="50000"/>
+                <a:satMod val="300000"/>
+              </a:schemeClr>
+            </a:gs>
+            <a:gs pos="35000">
+              <a:schemeClr val="phClr">
+                <a:tint val="37000"/>
+                <a:satMod val="300000"/>
+              </a:schemeClr>
+            </a:gs>
+            <a:gs pos="100000">
+              <a:schemeClr val="phClr">
+                <a:tint val="15000"/>
+                <a:satMod val="350000"/>
+              </a:schemeClr>
+            </a:gs>
+          </a:gsLst>
+          <a:lin ang="16200000" scaled="1"/>
+        </a:gradFill>
+        <a:gradFill rotWithShape="1">
+          <a:gsLst>
+            <a:gs pos="0">
+              <a:schemeClr val="phClr">
+                <a:tint val="100000"/>
+                <a:shade val="100000"/>
+                <a:satMod val="130000"/>
+              </a:schemeClr>
+            </a:gs>
+            <a:gs pos="100000">
+              <a:schemeClr val="phClr">
+                <a:tint val="50000"/>
+                <a:shade val="100000"/>
+                <a:satMod val="350000"/>
+              </a:schemeClr>
+            </a:gs>
+          </a:gsLst>
+          <a:lin ang="16200000" scaled="0"/>
+        </a:gradFill>
+      </a:fillStyleLst>
+      <a:lnStyleLst>
+        <a:ln w="9525" cap="flat" cmpd="sng" algn="ctr">
+          <a:solidFill>
+            <a:schemeClr val="phClr">
+              <a:shade val="95000"/>
+              <a:satMod val="105000"/>
+            </a:schemeClr>
+          </a:solidFill>
+          <a:prstDash val="solid"/>
+        </a:ln>
+        <a:ln w="25400" cap="flat" cmpd="sng" algn="ctr">
+          <a:solidFill>
+            <a:schemeClr val="phClr"/>
+          </a:solidFill>
+          <a:prstDash val="solid"/>
+        </a:ln>
+        <a:ln w="38100" cap="flat" cmpd="sng" algn="ctr">
+          <a:solidFill>
+            <a:schemeClr val="phClr"/>
+          </a:solidFill>
+          <a:prstDash val="solid"/>
+        </a:ln>
+      </a:lnStyleLst>
+      <a:effectStyleLst>
+        <a:effectStyle>
+          <a:effectLst>
+            <a:outerShdw blurRad="40000" dist="20000" dir="5400000" rotWithShape="0">
+              <a:srgbClr val="000000">
+                <a:alpha val="38000"/>
+              </a:srgbClr>
+            </a:outerShdw>
+          </a:effectLst>
+        </a:effectStyle>
+        <a:effectStyle>
+          <a:effectLst>
+            <a:outerShdw blurRad="40000" dist="23000" dir="5400000" rotWithShape="0">
+              <a:srgbClr val="000000">
+                <a:alpha val="35000"/>
+              </a:srgbClr>
+            </a:outerShdw>
+          </a:effectLst>
+        </a:effectStyle>
+        <a:effectStyle>
+          <a:effectLst>
+            <a:outerShdw blurRad="40000" dist="23000" dir="5400000" rotWithShape="0">
+              <a:srgbClr val="000000">
+                <a:alpha val="35000"/>
+              </a:srgbClr>
+            </a:outerShdw>
+          </a:effectLst>
+          <a:scene3d>
+            <a:camera prst="orthographicFront">
+              <a:rot lat="0" lon="0" rev="0"/>
+            </a:camera>
+            <a:lightRig rig="threePt" dir="t">
+              <a:rot lat="0" lon="0" rev="1200000"/>
+            </a:lightRig>
+          </a:scene3d>
+          <a:sp3d>
+            <a:bevelT w="63500" h="25400"/>
+          </a:sp3d>
+        </a:effectStyle>
+      </a:effectStyleLst>
+      <a:bgFillStyleLst>
+        <a:solidFill>
+          <a:schemeClr val="phClr"/>
+        </a:solidFill>
+        <a:gradFill rotWithShape="1">
+          <a:gsLst>
+            <a:gs pos="0">
+              <a:schemeClr val="phClr">
+                <a:tint val="40000"/>
+                <a:satMod val="350000"/>
+              </a:schemeClr>
+            </a:gs>
+            <a:gs pos="40000">
+              <a:schemeClr val="phClr">
+                <a:tint val="45000"/>
+                <a:shade val="99000"/>
+                <a:satMod val="350000"/>
+              </a:schemeClr>
+            </a:gs>
+            <a:gs pos="100000">
+              <a:schemeClr val="phClr">
+                <a:shade val="20000"/>
+                <a:satMod val="255000"/>
+              </a:schemeClr>
+            </a:gs>
+          </a:gsLst>
+          <a:path path="circle">
+            <a:fillToRect l="50000" t="-80000" r="50000" b="180000"/>
+          </a:path>
+        </a:gradFill>
+        <a:gradFill rotWithShape="1">
+          <a:gsLst>
+            <a:gs pos="0">
+              <a:schemeClr val="phClr">
+                <a:tint val="80000"/>
+                <a:satMod val="300000"/>
+              </a:schemeClr>
+            </a:gs>
+            <a:gs pos="100000">
+              <a:schemeClr val="phClr">
+                <a:shade val="30000"/>
+                <a:satMod val="200000"/>
+              </a:schemeClr>
+            </a:gs>
+          </a:gsLst>
+          <a:path path="circle">
+            <a:fillToRect l="50000" t="50000" r="50000" b="50000"/>
+          </a:path>
+        </a:gradFill>
+      </a:bgFillStyleLst>
+    </a:fmtScheme>
+  </a:themeElements>
+  <a:objectDefaults/>
+  <a:extraClrSchemeLst/>
+</a:theme>
+</file>
+
+<file path=ppt/theme/theme2.xml><?xml version="1.0" encoding="utf-8"?>
+<a:theme xmlns:a="http://schemas.openxmlformats.org/drawingml/2006/main">
   <a:themeElements>
     <a:clrScheme name="Default">
       <a:dk1>
@@ -6079,284 +7054,7 @@
       </a:bgFillStyleLst>
     </a:fmtScheme>
   </a:themeElements>
-</a:theme>
-</file>
-
-<file path=ppt/theme/theme2.xml><?xml version="1.0" encoding="utf-8"?>
-<a:theme xmlns:a="http://schemas.openxmlformats.org/drawingml/2006/main" xmlns:r="http://schemas.openxmlformats.org/officeDocument/2006/relationships" name="Simple Light">
-  <a:themeElements>
-    <a:clrScheme name="Simple Light">
-      <a:dk1>
-        <a:srgbClr val="000000"/>
-      </a:dk1>
-      <a:lt1>
-        <a:srgbClr val="FFFFFF"/>
-      </a:lt1>
-      <a:dk2>
-        <a:srgbClr val="595959"/>
-      </a:dk2>
-      <a:lt2>
-        <a:srgbClr val="EEEEEE"/>
-      </a:lt2>
-      <a:accent1>
-        <a:srgbClr val="FFAB40"/>
-      </a:accent1>
-      <a:accent2>
-        <a:srgbClr val="212121"/>
-      </a:accent2>
-      <a:accent3>
-        <a:srgbClr val="78909C"/>
-      </a:accent3>
-      <a:accent4>
-        <a:srgbClr val="FFAB40"/>
-      </a:accent4>
-      <a:accent5>
-        <a:srgbClr val="0097A7"/>
-      </a:accent5>
-      <a:accent6>
-        <a:srgbClr val="EEFF41"/>
-      </a:accent6>
-      <a:hlink>
-        <a:srgbClr val="0097A7"/>
-      </a:hlink>
-      <a:folHlink>
-        <a:srgbClr val="0097A7"/>
-      </a:folHlink>
-    </a:clrScheme>
-    <a:fontScheme name="Office">
-      <a:majorFont>
-        <a:latin typeface="Arial"/>
-        <a:ea typeface=""/>
-        <a:cs typeface=""/>
-        <a:font script="Jpan" typeface="ＭＳ Ｐゴシック"/>
-        <a:font script="Hang" typeface="맑은 고딕"/>
-        <a:font script="Hans" typeface="宋体"/>
-        <a:font script="Hant" typeface="新細明體"/>
-        <a:font script="Arab" typeface="Times New Roman"/>
-        <a:font script="Hebr" typeface="Times New Roman"/>
-        <a:font script="Thai" typeface="Angsana New"/>
-        <a:font script="Ethi" typeface="Nyala"/>
-        <a:font script="Beng" typeface="Vrinda"/>
-        <a:font script="Gujr" typeface="Shruti"/>
-        <a:font script="Khmr" typeface="MoolBoran"/>
-        <a:font script="Knda" typeface="Tunga"/>
-        <a:font script="Guru" typeface="Raavi"/>
-        <a:font script="Cans" typeface="Euphemia"/>
-        <a:font script="Cher" typeface="Plantagenet Cherokee"/>
-        <a:font script="Yiii" typeface="Microsoft Yi Baiti"/>
-        <a:font script="Tibt" typeface="Microsoft Himalaya"/>
-        <a:font script="Thaa" typeface="MV Boli"/>
-        <a:font script="Deva" typeface="Mangal"/>
-        <a:font script="Telu" typeface="Gautami"/>
-        <a:font script="Taml" typeface="Latha"/>
-        <a:font script="Syrc" typeface="Estrangelo Edessa"/>
-        <a:font script="Orya" typeface="Kalinga"/>
-        <a:font script="Mlym" typeface="Kartika"/>
-        <a:font script="Laoo" typeface="DokChampa"/>
-        <a:font script="Sinh" typeface="Iskoola Pota"/>
-        <a:font script="Mong" typeface="Mongolian Baiti"/>
-        <a:font script="Viet" typeface="Times New Roman"/>
-        <a:font script="Uigh" typeface="Microsoft Uighur"/>
-        <a:font script="Geor" typeface="Sylfaen"/>
-      </a:majorFont>
-      <a:minorFont>
-        <a:latin typeface="Arial"/>
-        <a:ea typeface=""/>
-        <a:cs typeface=""/>
-        <a:font script="Jpan" typeface="ＭＳ Ｐゴシック"/>
-        <a:font script="Hang" typeface="맑은 고딕"/>
-        <a:font script="Hans" typeface="宋体"/>
-        <a:font script="Hant" typeface="新細明體"/>
-        <a:font script="Arab" typeface="Arial"/>
-        <a:font script="Hebr" typeface="Arial"/>
-        <a:font script="Thai" typeface="Cordia New"/>
-        <a:font script="Ethi" typeface="Nyala"/>
-        <a:font script="Beng" typeface="Vrinda"/>
-        <a:font script="Gujr" typeface="Shruti"/>
-        <a:font script="Khmr" typeface="DaunPenh"/>
-        <a:font script="Knda" typeface="Tunga"/>
-        <a:font script="Guru" typeface="Raavi"/>
-        <a:font script="Cans" typeface="Euphemia"/>
-        <a:font script="Cher" typeface="Plantagenet Cherokee"/>
-        <a:font script="Yiii" typeface="Microsoft Yi Baiti"/>
-        <a:font script="Tibt" typeface="Microsoft Himalaya"/>
-        <a:font script="Thaa" typeface="MV Boli"/>
-        <a:font script="Deva" typeface="Mangal"/>
-        <a:font script="Telu" typeface="Gautami"/>
-        <a:font script="Taml" typeface="Latha"/>
-        <a:font script="Syrc" typeface="Estrangelo Edessa"/>
-        <a:font script="Orya" typeface="Kalinga"/>
-        <a:font script="Mlym" typeface="Kartika"/>
-        <a:font script="Laoo" typeface="DokChampa"/>
-        <a:font script="Sinh" typeface="Iskoola Pota"/>
-        <a:font script="Mong" typeface="Mongolian Baiti"/>
-        <a:font script="Viet" typeface="Arial"/>
-        <a:font script="Uigh" typeface="Microsoft Uighur"/>
-        <a:font script="Geor" typeface="Sylfaen"/>
-      </a:minorFont>
-    </a:fontScheme>
-    <a:fmtScheme name="Office">
-      <a:fillStyleLst>
-        <a:solidFill>
-          <a:schemeClr val="phClr"/>
-        </a:solidFill>
-        <a:gradFill rotWithShape="1">
-          <a:gsLst>
-            <a:gs pos="0">
-              <a:schemeClr val="phClr">
-                <a:tint val="50000"/>
-                <a:satMod val="300000"/>
-              </a:schemeClr>
-            </a:gs>
-            <a:gs pos="35000">
-              <a:schemeClr val="phClr">
-                <a:tint val="37000"/>
-                <a:satMod val="300000"/>
-              </a:schemeClr>
-            </a:gs>
-            <a:gs pos="100000">
-              <a:schemeClr val="phClr">
-                <a:tint val="15000"/>
-                <a:satMod val="350000"/>
-              </a:schemeClr>
-            </a:gs>
-          </a:gsLst>
-          <a:lin ang="16200000" scaled="1"/>
-        </a:gradFill>
-        <a:gradFill rotWithShape="1">
-          <a:gsLst>
-            <a:gs pos="0">
-              <a:schemeClr val="phClr">
-                <a:tint val="100000"/>
-                <a:shade val="100000"/>
-                <a:satMod val="130000"/>
-              </a:schemeClr>
-            </a:gs>
-            <a:gs pos="100000">
-              <a:schemeClr val="phClr">
-                <a:tint val="50000"/>
-                <a:shade val="100000"/>
-                <a:satMod val="350000"/>
-              </a:schemeClr>
-            </a:gs>
-          </a:gsLst>
-          <a:lin ang="16200000" scaled="0"/>
-        </a:gradFill>
-      </a:fillStyleLst>
-      <a:lnStyleLst>
-        <a:ln w="9525" cap="flat" cmpd="sng" algn="ctr">
-          <a:solidFill>
-            <a:schemeClr val="phClr">
-              <a:shade val="95000"/>
-              <a:satMod val="105000"/>
-            </a:schemeClr>
-          </a:solidFill>
-          <a:prstDash val="solid"/>
-        </a:ln>
-        <a:ln w="25400" cap="flat" cmpd="sng" algn="ctr">
-          <a:solidFill>
-            <a:schemeClr val="phClr"/>
-          </a:solidFill>
-          <a:prstDash val="solid"/>
-        </a:ln>
-        <a:ln w="38100" cap="flat" cmpd="sng" algn="ctr">
-          <a:solidFill>
-            <a:schemeClr val="phClr"/>
-          </a:solidFill>
-          <a:prstDash val="solid"/>
-        </a:ln>
-      </a:lnStyleLst>
-      <a:effectStyleLst>
-        <a:effectStyle>
-          <a:effectLst>
-            <a:outerShdw blurRad="40000" dist="20000" dir="5400000" rotWithShape="0">
-              <a:srgbClr val="000000">
-                <a:alpha val="38000"/>
-              </a:srgbClr>
-            </a:outerShdw>
-          </a:effectLst>
-        </a:effectStyle>
-        <a:effectStyle>
-          <a:effectLst>
-            <a:outerShdw blurRad="40000" dist="23000" dir="5400000" rotWithShape="0">
-              <a:srgbClr val="000000">
-                <a:alpha val="35000"/>
-              </a:srgbClr>
-            </a:outerShdw>
-          </a:effectLst>
-        </a:effectStyle>
-        <a:effectStyle>
-          <a:effectLst>
-            <a:outerShdw blurRad="40000" dist="23000" dir="5400000" rotWithShape="0">
-              <a:srgbClr val="000000">
-                <a:alpha val="35000"/>
-              </a:srgbClr>
-            </a:outerShdw>
-          </a:effectLst>
-          <a:scene3d>
-            <a:camera prst="orthographicFront">
-              <a:rot lat="0" lon="0" rev="0"/>
-            </a:camera>
-            <a:lightRig rig="threePt" dir="t">
-              <a:rot lat="0" lon="0" rev="1200000"/>
-            </a:lightRig>
-          </a:scene3d>
-          <a:sp3d>
-            <a:bevelT w="63500" h="25400"/>
-          </a:sp3d>
-        </a:effectStyle>
-      </a:effectStyleLst>
-      <a:bgFillStyleLst>
-        <a:solidFill>
-          <a:schemeClr val="phClr"/>
-        </a:solidFill>
-        <a:gradFill rotWithShape="1">
-          <a:gsLst>
-            <a:gs pos="0">
-              <a:schemeClr val="phClr">
-                <a:tint val="40000"/>
-                <a:satMod val="350000"/>
-              </a:schemeClr>
-            </a:gs>
-            <a:gs pos="40000">
-              <a:schemeClr val="phClr">
-                <a:tint val="45000"/>
-                <a:shade val="99000"/>
-                <a:satMod val="350000"/>
-              </a:schemeClr>
-            </a:gs>
-            <a:gs pos="100000">
-              <a:schemeClr val="phClr">
-                <a:shade val="20000"/>
-                <a:satMod val="255000"/>
-              </a:schemeClr>
-            </a:gs>
-          </a:gsLst>
-          <a:path path="circle">
-            <a:fillToRect l="50000" t="-80000" r="50000" b="180000"/>
-          </a:path>
-        </a:gradFill>
-        <a:gradFill rotWithShape="1">
-          <a:gsLst>
-            <a:gs pos="0">
-              <a:schemeClr val="phClr">
-                <a:tint val="80000"/>
-                <a:satMod val="300000"/>
-              </a:schemeClr>
-            </a:gs>
-            <a:gs pos="100000">
-              <a:schemeClr val="phClr">
-                <a:shade val="30000"/>
-                <a:satMod val="200000"/>
-              </a:schemeClr>
-            </a:gs>
-          </a:gsLst>
-          <a:path path="circle">
-            <a:fillToRect l="50000" t="50000" r="50000" b="50000"/>
-          </a:path>
-        </a:gradFill>
-      </a:bgFillStyleLst>
-    </a:fmtScheme>
-  </a:themeElements>
+  <a:objectDefaults/>
+  <a:extraClrSchemeLst/>
 </a:theme>
 </file>
</xml_diff>